<commit_message>
Additions to the GridWars intro slides
</commit_message>
<xml_diff>
--- a/presentation/gridwars-intro-2018.pptx
+++ b/presentation/gridwars-intro-2018.pptx
@@ -13,8 +13,11 @@
     <p:sldId id="264" r:id="rId7"/>
     <p:sldId id="263" r:id="rId8"/>
     <p:sldId id="266" r:id="rId9"/>
-    <p:sldId id="265" r:id="rId10"/>
-    <p:sldId id="258" r:id="rId11"/>
+    <p:sldId id="267" r:id="rId10"/>
+    <p:sldId id="268" r:id="rId11"/>
+    <p:sldId id="269" r:id="rId12"/>
+    <p:sldId id="265" r:id="rId13"/>
+    <p:sldId id="258" r:id="rId14"/>
   </p:sldIdLst>
   <p:sldSz cx="12192000" cy="6858000"/>
   <p:notesSz cx="6858000" cy="9144000"/>
@@ -113,6 +116,11 @@
       </a:defRPr>
     </a:lvl9pPr>
   </p:defaultTextStyle>
+  <p:extLst>
+    <p:ext uri="{EFAFB233-063F-42B5-8137-9DF3F51BA10A}">
+      <p15:sldGuideLst xmlns:p15="http://schemas.microsoft.com/office/powerpoint/2012/main"/>
+    </p:ext>
+  </p:extLst>
 </p:presentation>
 </file>
 
@@ -160,7 +168,7 @@
           </a:lstStyle>
           <a:p>
             <a:r>
-              <a:rPr lang="de-DE" smtClean="0"/>
+              <a:rPr lang="de-DE"/>
               <a:t>Titelmasterformat durch Klicken bearbeiten</a:t>
             </a:r>
             <a:endParaRPr lang="en-US" dirty="0"/>
@@ -234,7 +242,7 @@
           </a:lstStyle>
           <a:p>
             <a:r>
-              <a:rPr lang="de-DE" smtClean="0"/>
+              <a:rPr lang="de-DE"/>
               <a:t>Formatvorlage des Untertitelmasters durch Klicken bearbeiten</a:t>
             </a:r>
             <a:endParaRPr lang="en-US" dirty="0"/>
@@ -352,7 +360,7 @@
           <a:lstStyle/>
           <a:p>
             <a:r>
-              <a:rPr lang="de-DE" smtClean="0"/>
+              <a:rPr lang="de-DE"/>
               <a:t>Titelmasterformat durch Klicken bearbeiten</a:t>
             </a:r>
             <a:endParaRPr lang="en-US"/>
@@ -376,35 +384,35 @@
           <a:p>
             <a:pPr lvl="0"/>
             <a:r>
-              <a:rPr lang="de-DE" smtClean="0"/>
+              <a:rPr lang="de-DE"/>
               <a:t>Textmasterformat bearbeiten</a:t>
             </a:r>
           </a:p>
           <a:p>
             <a:pPr lvl="1"/>
             <a:r>
-              <a:rPr lang="de-DE" smtClean="0"/>
+              <a:rPr lang="de-DE"/>
               <a:t>Zweite Ebene</a:t>
             </a:r>
           </a:p>
           <a:p>
             <a:pPr lvl="2"/>
             <a:r>
-              <a:rPr lang="de-DE" smtClean="0"/>
+              <a:rPr lang="de-DE"/>
               <a:t>Dritte Ebene</a:t>
             </a:r>
           </a:p>
           <a:p>
             <a:pPr lvl="3"/>
             <a:r>
-              <a:rPr lang="de-DE" smtClean="0"/>
+              <a:rPr lang="de-DE"/>
               <a:t>Vierte Ebene</a:t>
             </a:r>
           </a:p>
           <a:p>
             <a:pPr lvl="4"/>
             <a:r>
-              <a:rPr lang="de-DE" smtClean="0"/>
+              <a:rPr lang="de-DE"/>
               <a:t>Fünfte Ebene</a:t>
             </a:r>
             <a:endParaRPr lang="en-US" dirty="0"/>
@@ -527,7 +535,7 @@
           <a:lstStyle/>
           <a:p>
             <a:r>
-              <a:rPr lang="de-DE" smtClean="0"/>
+              <a:rPr lang="de-DE"/>
               <a:t>Titelmasterformat durch Klicken bearbeiten</a:t>
             </a:r>
             <a:endParaRPr lang="en-US"/>
@@ -556,35 +564,35 @@
           <a:p>
             <a:pPr lvl="0"/>
             <a:r>
-              <a:rPr lang="de-DE" smtClean="0"/>
+              <a:rPr lang="de-DE"/>
               <a:t>Textmasterformat bearbeiten</a:t>
             </a:r>
           </a:p>
           <a:p>
             <a:pPr lvl="1"/>
             <a:r>
-              <a:rPr lang="de-DE" smtClean="0"/>
+              <a:rPr lang="de-DE"/>
               <a:t>Zweite Ebene</a:t>
             </a:r>
           </a:p>
           <a:p>
             <a:pPr lvl="2"/>
             <a:r>
-              <a:rPr lang="de-DE" smtClean="0"/>
+              <a:rPr lang="de-DE"/>
               <a:t>Dritte Ebene</a:t>
             </a:r>
           </a:p>
           <a:p>
             <a:pPr lvl="3"/>
             <a:r>
-              <a:rPr lang="de-DE" smtClean="0"/>
+              <a:rPr lang="de-DE"/>
               <a:t>Vierte Ebene</a:t>
             </a:r>
           </a:p>
           <a:p>
             <a:pPr lvl="4"/>
             <a:r>
-              <a:rPr lang="de-DE" smtClean="0"/>
+              <a:rPr lang="de-DE"/>
               <a:t>Fünfte Ebene</a:t>
             </a:r>
             <a:endParaRPr lang="en-US"/>
@@ -702,7 +710,7 @@
           <a:lstStyle/>
           <a:p>
             <a:r>
-              <a:rPr lang="de-DE" smtClean="0"/>
+              <a:rPr lang="de-DE"/>
               <a:t>Titelmasterformat durch Klicken bearbeiten</a:t>
             </a:r>
             <a:endParaRPr lang="en-US" dirty="0"/>
@@ -726,35 +734,35 @@
           <a:p>
             <a:pPr lvl="0"/>
             <a:r>
-              <a:rPr lang="de-DE" smtClean="0"/>
+              <a:rPr lang="de-DE"/>
               <a:t>Textmasterformat bearbeiten</a:t>
             </a:r>
           </a:p>
           <a:p>
             <a:pPr lvl="1"/>
             <a:r>
-              <a:rPr lang="de-DE" smtClean="0"/>
+              <a:rPr lang="de-DE"/>
               <a:t>Zweite Ebene</a:t>
             </a:r>
           </a:p>
           <a:p>
             <a:pPr lvl="2"/>
             <a:r>
-              <a:rPr lang="de-DE" smtClean="0"/>
+              <a:rPr lang="de-DE"/>
               <a:t>Dritte Ebene</a:t>
             </a:r>
           </a:p>
           <a:p>
             <a:pPr lvl="3"/>
             <a:r>
-              <a:rPr lang="de-DE" smtClean="0"/>
+              <a:rPr lang="de-DE"/>
               <a:t>Vierte Ebene</a:t>
             </a:r>
           </a:p>
           <a:p>
             <a:pPr lvl="4"/>
             <a:r>
-              <a:rPr lang="de-DE" smtClean="0"/>
+              <a:rPr lang="de-DE"/>
               <a:t>Fünfte Ebene</a:t>
             </a:r>
             <a:endParaRPr lang="en-US" dirty="0"/>
@@ -883,7 +891,7 @@
           </a:lstStyle>
           <a:p>
             <a:r>
-              <a:rPr lang="de-DE" smtClean="0"/>
+              <a:rPr lang="de-DE"/>
               <a:t>Titelmasterformat durch Klicken bearbeiten</a:t>
             </a:r>
             <a:endParaRPr lang="en-US" dirty="0"/>
@@ -1006,7 +1014,7 @@
           <a:p>
             <a:pPr lvl="0"/>
             <a:r>
-              <a:rPr lang="de-DE" smtClean="0"/>
+              <a:rPr lang="de-DE"/>
               <a:t>Textmasterformat bearbeiten</a:t>
             </a:r>
           </a:p>
@@ -1123,7 +1131,7 @@
           <a:lstStyle/>
           <a:p>
             <a:r>
-              <a:rPr lang="de-DE" smtClean="0"/>
+              <a:rPr lang="de-DE"/>
               <a:t>Titelmasterformat durch Klicken bearbeiten</a:t>
             </a:r>
             <a:endParaRPr lang="en-US" dirty="0"/>
@@ -1152,35 +1160,35 @@
           <a:p>
             <a:pPr lvl="0"/>
             <a:r>
-              <a:rPr lang="de-DE" smtClean="0"/>
+              <a:rPr lang="de-DE"/>
               <a:t>Textmasterformat bearbeiten</a:t>
             </a:r>
           </a:p>
           <a:p>
             <a:pPr lvl="1"/>
             <a:r>
-              <a:rPr lang="de-DE" smtClean="0"/>
+              <a:rPr lang="de-DE"/>
               <a:t>Zweite Ebene</a:t>
             </a:r>
           </a:p>
           <a:p>
             <a:pPr lvl="2"/>
             <a:r>
-              <a:rPr lang="de-DE" smtClean="0"/>
+              <a:rPr lang="de-DE"/>
               <a:t>Dritte Ebene</a:t>
             </a:r>
           </a:p>
           <a:p>
             <a:pPr lvl="3"/>
             <a:r>
-              <a:rPr lang="de-DE" smtClean="0"/>
+              <a:rPr lang="de-DE"/>
               <a:t>Vierte Ebene</a:t>
             </a:r>
           </a:p>
           <a:p>
             <a:pPr lvl="4"/>
             <a:r>
-              <a:rPr lang="de-DE" smtClean="0"/>
+              <a:rPr lang="de-DE"/>
               <a:t>Fünfte Ebene</a:t>
             </a:r>
             <a:endParaRPr lang="en-US" dirty="0"/>
@@ -1209,35 +1217,35 @@
           <a:p>
             <a:pPr lvl="0"/>
             <a:r>
-              <a:rPr lang="de-DE" smtClean="0"/>
+              <a:rPr lang="de-DE"/>
               <a:t>Textmasterformat bearbeiten</a:t>
             </a:r>
           </a:p>
           <a:p>
             <a:pPr lvl="1"/>
             <a:r>
-              <a:rPr lang="de-DE" smtClean="0"/>
+              <a:rPr lang="de-DE"/>
               <a:t>Zweite Ebene</a:t>
             </a:r>
           </a:p>
           <a:p>
             <a:pPr lvl="2"/>
             <a:r>
-              <a:rPr lang="de-DE" smtClean="0"/>
+              <a:rPr lang="de-DE"/>
               <a:t>Dritte Ebene</a:t>
             </a:r>
           </a:p>
           <a:p>
             <a:pPr lvl="3"/>
             <a:r>
-              <a:rPr lang="de-DE" smtClean="0"/>
+              <a:rPr lang="de-DE"/>
               <a:t>Vierte Ebene</a:t>
             </a:r>
           </a:p>
           <a:p>
             <a:pPr lvl="4"/>
             <a:r>
-              <a:rPr lang="de-DE" smtClean="0"/>
+              <a:rPr lang="de-DE"/>
               <a:t>Fünfte Ebene</a:t>
             </a:r>
             <a:endParaRPr lang="en-US" dirty="0"/>
@@ -1403,7 +1411,7 @@
           <a:p>
             <a:pPr lvl="0"/>
             <a:r>
-              <a:rPr lang="de-DE" smtClean="0"/>
+              <a:rPr lang="de-DE"/>
               <a:t>Textmasterformat bearbeiten</a:t>
             </a:r>
           </a:p>
@@ -1431,35 +1439,35 @@
           <a:p>
             <a:pPr lvl="0"/>
             <a:r>
-              <a:rPr lang="de-DE" smtClean="0"/>
+              <a:rPr lang="de-DE"/>
               <a:t>Textmasterformat bearbeiten</a:t>
             </a:r>
           </a:p>
           <a:p>
             <a:pPr lvl="1"/>
             <a:r>
-              <a:rPr lang="de-DE" smtClean="0"/>
+              <a:rPr lang="de-DE"/>
               <a:t>Zweite Ebene</a:t>
             </a:r>
           </a:p>
           <a:p>
             <a:pPr lvl="2"/>
             <a:r>
-              <a:rPr lang="de-DE" smtClean="0"/>
+              <a:rPr lang="de-DE"/>
               <a:t>Dritte Ebene</a:t>
             </a:r>
           </a:p>
           <a:p>
             <a:pPr lvl="3"/>
             <a:r>
-              <a:rPr lang="de-DE" smtClean="0"/>
+              <a:rPr lang="de-DE"/>
               <a:t>Vierte Ebene</a:t>
             </a:r>
           </a:p>
           <a:p>
             <a:pPr lvl="4"/>
             <a:r>
-              <a:rPr lang="de-DE" smtClean="0"/>
+              <a:rPr lang="de-DE"/>
               <a:t>Fünfte Ebene</a:t>
             </a:r>
             <a:endParaRPr lang="en-US" dirty="0"/>
@@ -1528,7 +1536,7 @@
           <a:p>
             <a:pPr lvl="0"/>
             <a:r>
-              <a:rPr lang="de-DE" smtClean="0"/>
+              <a:rPr lang="de-DE"/>
               <a:t>Textmasterformat bearbeiten</a:t>
             </a:r>
           </a:p>
@@ -1556,35 +1564,35 @@
           <a:p>
             <a:pPr lvl="0"/>
             <a:r>
-              <a:rPr lang="de-DE" smtClean="0"/>
+              <a:rPr lang="de-DE"/>
               <a:t>Textmasterformat bearbeiten</a:t>
             </a:r>
           </a:p>
           <a:p>
             <a:pPr lvl="1"/>
             <a:r>
-              <a:rPr lang="de-DE" smtClean="0"/>
+              <a:rPr lang="de-DE"/>
               <a:t>Zweite Ebene</a:t>
             </a:r>
           </a:p>
           <a:p>
             <a:pPr lvl="2"/>
             <a:r>
-              <a:rPr lang="de-DE" smtClean="0"/>
+              <a:rPr lang="de-DE"/>
               <a:t>Dritte Ebene</a:t>
             </a:r>
           </a:p>
           <a:p>
             <a:pPr lvl="3"/>
             <a:r>
-              <a:rPr lang="de-DE" smtClean="0"/>
+              <a:rPr lang="de-DE"/>
               <a:t>Vierte Ebene</a:t>
             </a:r>
           </a:p>
           <a:p>
             <a:pPr lvl="4"/>
             <a:r>
-              <a:rPr lang="de-DE" smtClean="0"/>
+              <a:rPr lang="de-DE"/>
               <a:t>Fünfte Ebene</a:t>
             </a:r>
             <a:endParaRPr lang="en-US"/>
@@ -1672,7 +1680,7 @@
           <a:lstStyle/>
           <a:p>
             <a:r>
-              <a:rPr lang="de-DE" smtClean="0"/>
+              <a:rPr lang="de-DE"/>
               <a:t>Titelmasterformat durch Klicken bearbeiten</a:t>
             </a:r>
             <a:endParaRPr lang="en-US" dirty="0"/>
@@ -1790,7 +1798,7 @@
           <a:lstStyle/>
           <a:p>
             <a:r>
-              <a:rPr lang="de-DE" smtClean="0"/>
+              <a:rPr lang="de-DE"/>
               <a:t>Titelmasterformat durch Klicken bearbeiten</a:t>
             </a:r>
             <a:endParaRPr lang="en-US"/>
@@ -1949,7 +1957,7 @@
           </a:lstStyle>
           <a:p>
             <a:r>
-              <a:rPr lang="de-DE" smtClean="0"/>
+              <a:rPr lang="de-DE"/>
               <a:t>Titelmasterformat durch Klicken bearbeiten</a:t>
             </a:r>
             <a:endParaRPr lang="en-US" dirty="0"/>
@@ -2006,35 +2014,35 @@
           <a:p>
             <a:pPr lvl="0"/>
             <a:r>
-              <a:rPr lang="de-DE" smtClean="0"/>
+              <a:rPr lang="de-DE"/>
               <a:t>Textmasterformat bearbeiten</a:t>
             </a:r>
           </a:p>
           <a:p>
             <a:pPr lvl="1"/>
             <a:r>
-              <a:rPr lang="de-DE" smtClean="0"/>
+              <a:rPr lang="de-DE"/>
               <a:t>Zweite Ebene</a:t>
             </a:r>
           </a:p>
           <a:p>
             <a:pPr lvl="2"/>
             <a:r>
-              <a:rPr lang="de-DE" smtClean="0"/>
+              <a:rPr lang="de-DE"/>
               <a:t>Dritte Ebene</a:t>
             </a:r>
           </a:p>
           <a:p>
             <a:pPr lvl="3"/>
             <a:r>
-              <a:rPr lang="de-DE" smtClean="0"/>
+              <a:rPr lang="de-DE"/>
               <a:t>Vierte Ebene</a:t>
             </a:r>
           </a:p>
           <a:p>
             <a:pPr lvl="4"/>
             <a:r>
-              <a:rPr lang="de-DE" smtClean="0"/>
+              <a:rPr lang="de-DE"/>
               <a:t>Fünfte Ebene</a:t>
             </a:r>
             <a:endParaRPr lang="en-US" dirty="0"/>
@@ -2105,7 +2113,7 @@
           <a:p>
             <a:pPr lvl="0"/>
             <a:r>
-              <a:rPr lang="de-DE" smtClean="0"/>
+              <a:rPr lang="de-DE"/>
               <a:t>Textmasterformat bearbeiten</a:t>
             </a:r>
           </a:p>
@@ -2233,7 +2241,7 @@
           </a:lstStyle>
           <a:p>
             <a:r>
-              <a:rPr lang="de-DE" smtClean="0"/>
+              <a:rPr lang="de-DE"/>
               <a:t>Titelmasterformat durch Klicken bearbeiten</a:t>
             </a:r>
             <a:endParaRPr lang="en-US" dirty="0"/>
@@ -2298,7 +2306,7 @@
           </a:lstStyle>
           <a:p>
             <a:r>
-              <a:rPr lang="de-DE" smtClean="0"/>
+              <a:rPr lang="de-DE"/>
               <a:t>Bild durch Klicken auf Symbol hinzufügen</a:t>
             </a:r>
             <a:endParaRPr lang="en-US" dirty="0"/>
@@ -2369,7 +2377,7 @@
           <a:p>
             <a:pPr lvl="0"/>
             <a:r>
-              <a:rPr lang="de-DE" smtClean="0"/>
+              <a:rPr lang="de-DE"/>
               <a:t>Textmasterformat bearbeiten</a:t>
             </a:r>
           </a:p>
@@ -2501,7 +2509,7 @@
           <a:lstStyle/>
           <a:p>
             <a:r>
-              <a:rPr lang="de-DE" smtClean="0"/>
+              <a:rPr lang="de-DE"/>
               <a:t>Titelmasterformat durch Klicken bearbeiten</a:t>
             </a:r>
             <a:endParaRPr lang="en-US" dirty="0"/>
@@ -2535,35 +2543,35 @@
           <a:p>
             <a:pPr lvl="0"/>
             <a:r>
-              <a:rPr lang="de-DE" smtClean="0"/>
+              <a:rPr lang="de-DE"/>
               <a:t>Textmasterformat bearbeiten</a:t>
             </a:r>
           </a:p>
           <a:p>
             <a:pPr lvl="1"/>
             <a:r>
-              <a:rPr lang="de-DE" smtClean="0"/>
+              <a:rPr lang="de-DE"/>
               <a:t>Zweite Ebene</a:t>
             </a:r>
           </a:p>
           <a:p>
             <a:pPr lvl="2"/>
             <a:r>
-              <a:rPr lang="de-DE" smtClean="0"/>
+              <a:rPr lang="de-DE"/>
               <a:t>Dritte Ebene</a:t>
             </a:r>
           </a:p>
           <a:p>
             <a:pPr lvl="3"/>
             <a:r>
-              <a:rPr lang="de-DE" smtClean="0"/>
+              <a:rPr lang="de-DE"/>
               <a:t>Vierte Ebene</a:t>
             </a:r>
           </a:p>
           <a:p>
             <a:pPr lvl="4"/>
             <a:r>
-              <a:rPr lang="de-DE" smtClean="0"/>
+              <a:rPr lang="de-DE"/>
               <a:t>Fünfte Ebene</a:t>
             </a:r>
             <a:endParaRPr lang="en-US" dirty="0"/>
@@ -3016,15 +3024,15 @@
           <a:lstStyle/>
           <a:p>
             <a:r>
-              <a:rPr lang="de-DE" b="1" dirty="0" err="1" smtClean="0"/>
+              <a:rPr lang="de-DE" b="1" dirty="0" err="1"/>
               <a:t>Grid</a:t>
             </a:r>
             <a:r>
-              <a:rPr lang="de-DE" b="1" dirty="0" smtClean="0"/>
-              <a:t> </a:t>
-            </a:r>
-            <a:r>
-              <a:rPr lang="de-DE" b="1" dirty="0" err="1" smtClean="0"/>
+              <a:rPr lang="de-DE" b="1" dirty="0"/>
+              <a:t> </a:t>
+            </a:r>
+            <a:r>
+              <a:rPr lang="de-DE" b="1" dirty="0" err="1"/>
               <a:t>Wars</a:t>
             </a:r>
             <a:endParaRPr lang="de-DE" b="1" dirty="0"/>
@@ -3052,32 +3060,31 @@
           <a:lstStyle/>
           <a:p>
             <a:r>
-              <a:rPr lang="de-DE" dirty="0" smtClean="0"/>
+              <a:rPr lang="de-DE" dirty="0"/>
               <a:t>A Game AI </a:t>
             </a:r>
             <a:r>
-              <a:rPr lang="de-DE" dirty="0" err="1" smtClean="0"/>
+              <a:rPr lang="de-DE" dirty="0" err="1"/>
               <a:t>Coding</a:t>
             </a:r>
             <a:r>
-              <a:rPr lang="de-DE" dirty="0" smtClean="0"/>
-              <a:t> </a:t>
-            </a:r>
-            <a:r>
-              <a:rPr lang="de-DE" dirty="0" err="1" smtClean="0"/>
+              <a:rPr lang="de-DE" dirty="0"/>
+              <a:t> </a:t>
+            </a:r>
+            <a:r>
+              <a:rPr lang="de-DE" dirty="0" err="1"/>
               <a:t>Competition</a:t>
             </a:r>
-            <a:endParaRPr lang="de-DE" dirty="0" smtClean="0"/>
-          </a:p>
-          <a:p>
             <a:endParaRPr lang="de-DE" dirty="0"/>
           </a:p>
           <a:p>
-            <a:r>
-              <a:rPr lang="de-DE" dirty="0" smtClean="0"/>
+            <a:endParaRPr lang="de-DE" dirty="0"/>
+          </a:p>
+          <a:p>
+            <a:r>
+              <a:rPr lang="de-DE" dirty="0"/>
               <a:t>Benjamin Wolff (CERN/AIS)</a:t>
             </a:r>
-            <a:endParaRPr lang="de-DE" dirty="0"/>
           </a:p>
         </p:txBody>
       </p:sp>
@@ -3118,6 +3125,968 @@
             <a:spLocks noGrp="1"/>
           </p:cNvSpPr>
           <p:nvPr>
+            <p:ph type="title"/>
+          </p:nvPr>
+        </p:nvSpPr>
+        <p:spPr/>
+        <p:txBody>
+          <a:bodyPr/>
+          <a:lstStyle/>
+          <a:p>
+            <a:pPr algn="ctr"/>
+            <a:r>
+              <a:rPr lang="de-DE" b="1" dirty="0"/>
+              <a:t>Bot Development</a:t>
+            </a:r>
+          </a:p>
+        </p:txBody>
+      </p:sp>
+      <p:sp>
+        <p:nvSpPr>
+          <p:cNvPr id="3" name="Inhaltsplatzhalter 2"/>
+          <p:cNvSpPr>
+            <a:spLocks noGrp="1"/>
+          </p:cNvSpPr>
+          <p:nvPr>
+            <p:ph idx="1"/>
+          </p:nvPr>
+        </p:nvSpPr>
+        <p:spPr>
+          <a:xfrm>
+            <a:off x="845127" y="1303638"/>
+            <a:ext cx="10515600" cy="4876499"/>
+          </a:xfrm>
+        </p:spPr>
+        <p:txBody>
+          <a:bodyPr anchor="ctr">
+            <a:normAutofit/>
+          </a:bodyPr>
+          <a:lstStyle/>
+          <a:p>
+            <a:pPr marL="0" indent="0" algn="ctr">
+              <a:buNone/>
+            </a:pPr>
+            <a:r>
+              <a:rPr lang="de-DE" sz="4800" dirty="0"/>
+              <a:t>Demo</a:t>
+            </a:r>
+          </a:p>
+        </p:txBody>
+      </p:sp>
+    </p:spTree>
+    <p:extLst>
+      <p:ext uri="{BB962C8B-B14F-4D97-AF65-F5344CB8AC3E}">
+        <p14:creationId xmlns:p14="http://schemas.microsoft.com/office/powerpoint/2010/main" val="387549978"/>
+      </p:ext>
+    </p:extLst>
+  </p:cSld>
+  <p:clrMapOvr>
+    <a:masterClrMapping/>
+  </p:clrMapOvr>
+</p:sld>
+</file>
+
+<file path=ppt/slides/slide11.xml><?xml version="1.0" encoding="utf-8"?>
+<p:sld xmlns:a="http://schemas.openxmlformats.org/drawingml/2006/main" xmlns:r="http://schemas.openxmlformats.org/officeDocument/2006/relationships" xmlns:p="http://schemas.openxmlformats.org/presentationml/2006/main">
+  <p:cSld>
+    <p:spTree>
+      <p:nvGrpSpPr>
+        <p:cNvPr id="1" name=""/>
+        <p:cNvGrpSpPr/>
+        <p:nvPr/>
+      </p:nvGrpSpPr>
+      <p:grpSpPr>
+        <a:xfrm>
+          <a:off x="0" y="0"/>
+          <a:ext cx="0" cy="0"/>
+          <a:chOff x="0" y="0"/>
+          <a:chExt cx="0" cy="0"/>
+        </a:xfrm>
+      </p:grpSpPr>
+      <p:sp>
+        <p:nvSpPr>
+          <p:cNvPr id="2" name="Titel 1"/>
+          <p:cNvSpPr>
+            <a:spLocks noGrp="1"/>
+          </p:cNvSpPr>
+          <p:nvPr>
+            <p:ph type="title"/>
+          </p:nvPr>
+        </p:nvSpPr>
+        <p:spPr/>
+        <p:txBody>
+          <a:bodyPr/>
+          <a:lstStyle/>
+          <a:p>
+            <a:pPr algn="ctr"/>
+            <a:r>
+              <a:rPr lang="de-DE" b="1" dirty="0" err="1"/>
+              <a:t>Some</a:t>
+            </a:r>
+            <a:r>
+              <a:rPr lang="de-DE" b="1" dirty="0"/>
+              <a:t> </a:t>
+            </a:r>
+            <a:r>
+              <a:rPr lang="de-DE" b="1" dirty="0" err="1"/>
+              <a:t>more</a:t>
+            </a:r>
+            <a:r>
+              <a:rPr lang="de-DE" b="1" dirty="0"/>
+              <a:t> </a:t>
+            </a:r>
+            <a:r>
+              <a:rPr lang="de-DE" b="1" dirty="0" err="1"/>
+              <a:t>rules</a:t>
+            </a:r>
+            <a:endParaRPr lang="de-DE" b="1" dirty="0"/>
+          </a:p>
+        </p:txBody>
+      </p:sp>
+      <p:sp>
+        <p:nvSpPr>
+          <p:cNvPr id="3" name="Inhaltsplatzhalter 2"/>
+          <p:cNvSpPr>
+            <a:spLocks noGrp="1"/>
+          </p:cNvSpPr>
+          <p:nvPr>
+            <p:ph idx="1"/>
+          </p:nvPr>
+        </p:nvSpPr>
+        <p:spPr>
+          <a:xfrm>
+            <a:off x="845127" y="1691322"/>
+            <a:ext cx="10515600" cy="4488815"/>
+          </a:xfrm>
+        </p:spPr>
+        <p:txBody>
+          <a:bodyPr/>
+          <a:lstStyle/>
+          <a:p>
+            <a:r>
+              <a:rPr lang="de-DE" dirty="0"/>
+              <a:t>Illegal </a:t>
+            </a:r>
+            <a:r>
+              <a:rPr lang="de-DE" dirty="0" err="1"/>
+              <a:t>move</a:t>
+            </a:r>
+            <a:r>
+              <a:rPr lang="de-DE" dirty="0"/>
+              <a:t> = all </a:t>
+            </a:r>
+            <a:r>
+              <a:rPr lang="de-DE" dirty="0" err="1"/>
+              <a:t>moves</a:t>
+            </a:r>
+            <a:r>
+              <a:rPr lang="de-DE" dirty="0"/>
+              <a:t> </a:t>
+            </a:r>
+            <a:r>
+              <a:rPr lang="de-DE" dirty="0" err="1"/>
+              <a:t>for</a:t>
+            </a:r>
+            <a:r>
+              <a:rPr lang="de-DE" dirty="0"/>
+              <a:t> </a:t>
+            </a:r>
+            <a:r>
+              <a:rPr lang="de-DE" dirty="0" err="1"/>
+              <a:t>the</a:t>
+            </a:r>
+            <a:r>
+              <a:rPr lang="de-DE" dirty="0"/>
+              <a:t> turn </a:t>
+            </a:r>
+            <a:r>
+              <a:rPr lang="de-DE" dirty="0" err="1"/>
+              <a:t>are</a:t>
+            </a:r>
+            <a:r>
+              <a:rPr lang="de-DE" dirty="0"/>
+              <a:t> </a:t>
+            </a:r>
+            <a:r>
+              <a:rPr lang="de-DE" dirty="0" err="1"/>
+              <a:t>ignored</a:t>
+            </a:r>
+            <a:endParaRPr lang="de-DE" dirty="0"/>
+          </a:p>
+          <a:p>
+            <a:r>
+              <a:rPr lang="de-DE" dirty="0"/>
+              <a:t>Timeout on bot </a:t>
+            </a:r>
+            <a:r>
+              <a:rPr lang="de-DE" dirty="0" err="1"/>
+              <a:t>initialisation</a:t>
+            </a:r>
+            <a:r>
+              <a:rPr lang="de-DE" dirty="0"/>
+              <a:t> (3s)</a:t>
+            </a:r>
+          </a:p>
+          <a:p>
+            <a:pPr lvl="1"/>
+            <a:r>
+              <a:rPr lang="de-DE" dirty="0" err="1"/>
+              <a:t>If</a:t>
+            </a:r>
+            <a:r>
+              <a:rPr lang="de-DE" dirty="0"/>
+              <a:t> </a:t>
+            </a:r>
+            <a:r>
+              <a:rPr lang="de-DE" dirty="0" err="1"/>
+              <a:t>the</a:t>
+            </a:r>
+            <a:r>
+              <a:rPr lang="de-DE" dirty="0"/>
+              <a:t> bot </a:t>
+            </a:r>
+            <a:r>
+              <a:rPr lang="de-DE" dirty="0" err="1"/>
+              <a:t>fails</a:t>
+            </a:r>
+            <a:r>
+              <a:rPr lang="de-DE" dirty="0"/>
+              <a:t> </a:t>
+            </a:r>
+            <a:r>
+              <a:rPr lang="de-DE" dirty="0" err="1"/>
+              <a:t>to</a:t>
+            </a:r>
+            <a:r>
+              <a:rPr lang="de-DE" dirty="0"/>
+              <a:t> </a:t>
+            </a:r>
+            <a:r>
+              <a:rPr lang="de-DE" dirty="0" err="1"/>
+              <a:t>initialise</a:t>
+            </a:r>
+            <a:r>
+              <a:rPr lang="de-DE" dirty="0"/>
+              <a:t> in time, </a:t>
+            </a:r>
+            <a:r>
+              <a:rPr lang="de-DE" dirty="0" err="1"/>
+              <a:t>it</a:t>
+            </a:r>
+            <a:r>
+              <a:rPr lang="de-DE" dirty="0"/>
+              <a:t> will </a:t>
+            </a:r>
+            <a:r>
+              <a:rPr lang="de-DE" dirty="0" err="1"/>
+              <a:t>idle</a:t>
+            </a:r>
+            <a:r>
+              <a:rPr lang="de-DE" dirty="0"/>
+              <a:t> </a:t>
+            </a:r>
+            <a:r>
+              <a:rPr lang="de-DE" dirty="0" err="1"/>
+              <a:t>for</a:t>
+            </a:r>
+            <a:r>
+              <a:rPr lang="de-DE" dirty="0"/>
+              <a:t> </a:t>
+            </a:r>
+            <a:r>
+              <a:rPr lang="de-DE" dirty="0" err="1"/>
+              <a:t>the</a:t>
+            </a:r>
+            <a:r>
+              <a:rPr lang="de-DE" dirty="0"/>
+              <a:t> </a:t>
+            </a:r>
+            <a:r>
+              <a:rPr lang="de-DE" dirty="0" err="1"/>
+              <a:t>whole</a:t>
+            </a:r>
+            <a:r>
+              <a:rPr lang="de-DE" dirty="0"/>
+              <a:t> </a:t>
+            </a:r>
+            <a:r>
+              <a:rPr lang="de-DE" dirty="0" err="1"/>
+              <a:t>match</a:t>
+            </a:r>
+            <a:r>
+              <a:rPr lang="de-DE" dirty="0"/>
+              <a:t>.</a:t>
+            </a:r>
+          </a:p>
+          <a:p>
+            <a:r>
+              <a:rPr lang="de-DE" dirty="0"/>
+              <a:t>Timeout </a:t>
+            </a:r>
+            <a:r>
+              <a:rPr lang="de-DE" dirty="0" err="1"/>
+              <a:t>getting</a:t>
+            </a:r>
+            <a:r>
+              <a:rPr lang="de-DE" dirty="0"/>
+              <a:t> </a:t>
+            </a:r>
+            <a:r>
+              <a:rPr lang="de-DE" dirty="0" err="1"/>
+              <a:t>the</a:t>
+            </a:r>
+            <a:r>
+              <a:rPr lang="de-DE" dirty="0"/>
+              <a:t> </a:t>
+            </a:r>
+            <a:r>
+              <a:rPr lang="de-DE" dirty="0" err="1"/>
+              <a:t>next</a:t>
+            </a:r>
+            <a:r>
+              <a:rPr lang="de-DE" dirty="0"/>
+              <a:t> </a:t>
+            </a:r>
+            <a:r>
+              <a:rPr lang="de-DE" dirty="0" err="1"/>
+              <a:t>moves</a:t>
+            </a:r>
+            <a:r>
+              <a:rPr lang="de-DE" dirty="0"/>
+              <a:t> </a:t>
+            </a:r>
+            <a:r>
+              <a:rPr lang="de-DE" dirty="0" err="1"/>
+              <a:t>for</a:t>
+            </a:r>
+            <a:r>
+              <a:rPr lang="de-DE" dirty="0"/>
+              <a:t> a turn (50ms)</a:t>
+            </a:r>
+          </a:p>
+          <a:p>
+            <a:pPr lvl="1"/>
+            <a:r>
+              <a:rPr lang="de-DE" dirty="0"/>
+              <a:t>All </a:t>
+            </a:r>
+            <a:r>
+              <a:rPr lang="de-DE" dirty="0" err="1"/>
+              <a:t>moves</a:t>
+            </a:r>
+            <a:r>
+              <a:rPr lang="de-DE" dirty="0"/>
+              <a:t> </a:t>
+            </a:r>
+            <a:r>
+              <a:rPr lang="de-DE" dirty="0" err="1"/>
+              <a:t>added</a:t>
+            </a:r>
+            <a:r>
+              <a:rPr lang="de-DE" dirty="0"/>
+              <a:t> after </a:t>
+            </a:r>
+            <a:r>
+              <a:rPr lang="de-DE" dirty="0" err="1"/>
+              <a:t>the</a:t>
+            </a:r>
+            <a:r>
+              <a:rPr lang="de-DE" dirty="0"/>
+              <a:t> </a:t>
+            </a:r>
+            <a:r>
+              <a:rPr lang="de-DE" dirty="0" err="1"/>
+              <a:t>timeout</a:t>
+            </a:r>
+            <a:r>
+              <a:rPr lang="de-DE" dirty="0"/>
+              <a:t> </a:t>
+            </a:r>
+            <a:r>
+              <a:rPr lang="de-DE" dirty="0" err="1"/>
+              <a:t>are</a:t>
+            </a:r>
+            <a:r>
+              <a:rPr lang="de-DE" dirty="0"/>
+              <a:t> </a:t>
+            </a:r>
+            <a:r>
+              <a:rPr lang="de-DE" dirty="0" err="1"/>
+              <a:t>ignored</a:t>
+            </a:r>
+            <a:endParaRPr lang="de-DE" dirty="0"/>
+          </a:p>
+          <a:p>
+            <a:r>
+              <a:rPr lang="de-DE" dirty="0" err="1"/>
+              <a:t>Stateful</a:t>
+            </a:r>
+            <a:r>
+              <a:rPr lang="de-DE" dirty="0"/>
+              <a:t> bots </a:t>
+            </a:r>
+            <a:r>
+              <a:rPr lang="de-DE" dirty="0" err="1"/>
+              <a:t>are</a:t>
+            </a:r>
+            <a:r>
+              <a:rPr lang="de-DE" dirty="0"/>
+              <a:t> </a:t>
+            </a:r>
+            <a:r>
+              <a:rPr lang="de-DE" dirty="0" err="1"/>
+              <a:t>allowed</a:t>
+            </a:r>
+            <a:endParaRPr lang="de-DE" dirty="0"/>
+          </a:p>
+          <a:p>
+            <a:r>
+              <a:rPr lang="de-DE" dirty="0"/>
+              <a:t>Use </a:t>
+            </a:r>
+            <a:r>
+              <a:rPr lang="de-DE" dirty="0" err="1"/>
+              <a:t>of</a:t>
+            </a:r>
+            <a:r>
+              <a:rPr lang="de-DE" dirty="0"/>
+              <a:t> 3rd </a:t>
+            </a:r>
+            <a:r>
+              <a:rPr lang="de-DE" dirty="0" err="1"/>
+              <a:t>party</a:t>
+            </a:r>
+            <a:r>
+              <a:rPr lang="de-DE" dirty="0"/>
+              <a:t> </a:t>
+            </a:r>
+            <a:r>
+              <a:rPr lang="de-DE" dirty="0" err="1"/>
+              <a:t>libraries</a:t>
+            </a:r>
+            <a:r>
+              <a:rPr lang="de-DE" dirty="0"/>
+              <a:t> </a:t>
+            </a:r>
+            <a:r>
+              <a:rPr lang="de-DE" dirty="0" err="1"/>
+              <a:t>is</a:t>
+            </a:r>
+            <a:r>
+              <a:rPr lang="de-DE" dirty="0"/>
+              <a:t> </a:t>
+            </a:r>
+            <a:r>
+              <a:rPr lang="de-DE" b="1" dirty="0"/>
+              <a:t>not</a:t>
+            </a:r>
+            <a:r>
+              <a:rPr lang="de-DE" dirty="0"/>
+              <a:t> </a:t>
+            </a:r>
+            <a:r>
+              <a:rPr lang="de-DE" dirty="0" err="1"/>
+              <a:t>allowed</a:t>
+            </a:r>
+            <a:endParaRPr lang="de-DE" dirty="0"/>
+          </a:p>
+          <a:p>
+            <a:r>
+              <a:rPr lang="de-DE" dirty="0"/>
+              <a:t>Java </a:t>
+            </a:r>
+            <a:r>
+              <a:rPr lang="de-DE" dirty="0" err="1"/>
+              <a:t>reflection</a:t>
+            </a:r>
+            <a:r>
+              <a:rPr lang="de-DE" dirty="0"/>
+              <a:t> &amp; </a:t>
+            </a:r>
+            <a:r>
+              <a:rPr lang="de-DE" dirty="0" err="1"/>
+              <a:t>file</a:t>
+            </a:r>
+            <a:r>
+              <a:rPr lang="de-DE" dirty="0"/>
+              <a:t> </a:t>
+            </a:r>
+            <a:r>
+              <a:rPr lang="de-DE" dirty="0" err="1"/>
+              <a:t>access</a:t>
+            </a:r>
+            <a:r>
+              <a:rPr lang="de-DE" dirty="0"/>
+              <a:t> etc. </a:t>
+            </a:r>
+            <a:r>
+              <a:rPr lang="de-DE" dirty="0" err="1"/>
+              <a:t>is</a:t>
+            </a:r>
+            <a:r>
+              <a:rPr lang="de-DE" dirty="0"/>
+              <a:t> </a:t>
+            </a:r>
+            <a:r>
+              <a:rPr lang="de-DE" b="1" dirty="0"/>
+              <a:t>not</a:t>
+            </a:r>
+            <a:r>
+              <a:rPr lang="de-DE" dirty="0"/>
+              <a:t> </a:t>
+            </a:r>
+            <a:r>
+              <a:rPr lang="de-DE" dirty="0" err="1"/>
+              <a:t>allowed</a:t>
+            </a:r>
+            <a:endParaRPr lang="de-DE" dirty="0"/>
+          </a:p>
+          <a:p>
+            <a:r>
+              <a:rPr lang="de-DE" dirty="0"/>
+              <a:t>More </a:t>
+            </a:r>
+            <a:r>
+              <a:rPr lang="de-DE" dirty="0" err="1"/>
+              <a:t>infos</a:t>
+            </a:r>
+            <a:r>
+              <a:rPr lang="de-DE" dirty="0"/>
+              <a:t> in </a:t>
+            </a:r>
+            <a:r>
+              <a:rPr lang="de-DE" dirty="0" err="1"/>
+              <a:t>the</a:t>
+            </a:r>
+            <a:r>
+              <a:rPr lang="de-DE" dirty="0"/>
+              <a:t> FAQ: </a:t>
+            </a:r>
+            <a:r>
+              <a:rPr lang="de-DE" dirty="0">
+                <a:hlinkClick r:id="rId2"/>
+              </a:rPr>
+              <a:t>https://gridwars.cern.ch/docs/getting-started</a:t>
+            </a:r>
+            <a:endParaRPr lang="de-DE" dirty="0"/>
+          </a:p>
+          <a:p>
+            <a:endParaRPr lang="de-DE" dirty="0"/>
+          </a:p>
+          <a:p>
+            <a:endParaRPr lang="de-DE" dirty="0"/>
+          </a:p>
+        </p:txBody>
+      </p:sp>
+    </p:spTree>
+    <p:extLst>
+      <p:ext uri="{BB962C8B-B14F-4D97-AF65-F5344CB8AC3E}">
+        <p14:creationId xmlns:p14="http://schemas.microsoft.com/office/powerpoint/2010/main" val="2448946825"/>
+      </p:ext>
+    </p:extLst>
+  </p:cSld>
+  <p:clrMapOvr>
+    <a:masterClrMapping/>
+  </p:clrMapOvr>
+</p:sld>
+</file>
+
+<file path=ppt/slides/slide12.xml><?xml version="1.0" encoding="utf-8"?>
+<p:sld xmlns:a="http://schemas.openxmlformats.org/drawingml/2006/main" xmlns:r="http://schemas.openxmlformats.org/officeDocument/2006/relationships" xmlns:p="http://schemas.openxmlformats.org/presentationml/2006/main">
+  <p:cSld>
+    <p:spTree>
+      <p:nvGrpSpPr>
+        <p:cNvPr id="1" name=""/>
+        <p:cNvGrpSpPr/>
+        <p:nvPr/>
+      </p:nvGrpSpPr>
+      <p:grpSpPr>
+        <a:xfrm>
+          <a:off x="0" y="0"/>
+          <a:ext cx="0" cy="0"/>
+          <a:chOff x="0" y="0"/>
+          <a:chExt cx="0" cy="0"/>
+        </a:xfrm>
+      </p:grpSpPr>
+      <p:sp>
+        <p:nvSpPr>
+          <p:cNvPr id="2" name="Titel 1"/>
+          <p:cNvSpPr>
+            <a:spLocks noGrp="1"/>
+          </p:cNvSpPr>
+          <p:nvPr>
+            <p:ph type="title"/>
+          </p:nvPr>
+        </p:nvSpPr>
+        <p:spPr/>
+        <p:txBody>
+          <a:bodyPr/>
+          <a:lstStyle/>
+          <a:p>
+            <a:pPr algn="ctr"/>
+            <a:r>
+              <a:rPr lang="de-DE" b="1" dirty="0"/>
+              <a:t>Schedule</a:t>
+            </a:r>
+          </a:p>
+        </p:txBody>
+      </p:sp>
+      <p:graphicFrame>
+        <p:nvGraphicFramePr>
+          <p:cNvPr id="4" name="Inhaltsplatzhalter 3">
+            <a:extLst>
+              <a:ext uri="{FF2B5EF4-FFF2-40B4-BE49-F238E27FC236}">
+                <a16:creationId xmlns:a16="http://schemas.microsoft.com/office/drawing/2014/main" id="{254ECB4F-16DC-4E09-BE63-ACD0AC3EE298}"/>
+              </a:ext>
+            </a:extLst>
+          </p:cNvPr>
+          <p:cNvGraphicFramePr>
+            <a:graphicFrameLocks noGrp="1"/>
+          </p:cNvGraphicFramePr>
+          <p:nvPr>
+            <p:ph idx="1"/>
+            <p:extLst>
+              <p:ext uri="{D42A27DB-BD31-4B8C-83A1-F6EECF244321}">
+                <p14:modId xmlns:p14="http://schemas.microsoft.com/office/powerpoint/2010/main" val="3643208384"/>
+              </p:ext>
+            </p:extLst>
+          </p:nvPr>
+        </p:nvGraphicFramePr>
+        <p:xfrm>
+          <a:off x="2914135" y="1690688"/>
+          <a:ext cx="6363730" cy="2225040"/>
+        </p:xfrm>
+        <a:graphic>
+          <a:graphicData uri="http://schemas.openxmlformats.org/drawingml/2006/table">
+            <a:tbl>
+              <a:tblPr firstRow="1" bandRow="1">
+                <a:tableStyleId>{5C22544A-7EE6-4342-B048-85BDC9FD1C3A}</a:tableStyleId>
+              </a:tblPr>
+              <a:tblGrid>
+                <a:gridCol w="3179515">
+                  <a:extLst>
+                    <a:ext uri="{9D8B030D-6E8A-4147-A177-3AD203B41FA5}">
+                      <a16:colId xmlns:a16="http://schemas.microsoft.com/office/drawing/2014/main" val="2290721960"/>
+                    </a:ext>
+                  </a:extLst>
+                </a:gridCol>
+                <a:gridCol w="3184215">
+                  <a:extLst>
+                    <a:ext uri="{9D8B030D-6E8A-4147-A177-3AD203B41FA5}">
+                      <a16:colId xmlns:a16="http://schemas.microsoft.com/office/drawing/2014/main" val="3290447473"/>
+                    </a:ext>
+                  </a:extLst>
+                </a:gridCol>
+              </a:tblGrid>
+              <a:tr h="370840">
+                <a:tc>
+                  <a:txBody>
+                    <a:bodyPr/>
+                    <a:lstStyle/>
+                    <a:p>
+                      <a:pPr algn="ctr"/>
+                      <a:r>
+                        <a:rPr lang="de-DE" dirty="0" err="1"/>
+                        <a:t>When</a:t>
+                      </a:r>
+                      <a:endParaRPr lang="de-DE" dirty="0"/>
+                    </a:p>
+                  </a:txBody>
+                  <a:tcPr/>
+                </a:tc>
+                <a:tc>
+                  <a:txBody>
+                    <a:bodyPr/>
+                    <a:lstStyle/>
+                    <a:p>
+                      <a:pPr algn="ctr"/>
+                      <a:r>
+                        <a:rPr lang="de-DE" dirty="0" err="1"/>
+                        <a:t>What</a:t>
+                      </a:r>
+                      <a:endParaRPr lang="de-DE" dirty="0"/>
+                    </a:p>
+                  </a:txBody>
+                  <a:tcPr/>
+                </a:tc>
+                <a:extLst>
+                  <a:ext uri="{0D108BD9-81ED-4DB2-BD59-A6C34878D82A}">
+                    <a16:rowId xmlns:a16="http://schemas.microsoft.com/office/drawing/2014/main" val="1666283748"/>
+                  </a:ext>
+                </a:extLst>
+              </a:tr>
+              <a:tr h="370840">
+                <a:tc>
+                  <a:txBody>
+                    <a:bodyPr/>
+                    <a:lstStyle/>
+                    <a:p>
+                      <a:r>
+                        <a:rPr lang="de-DE" dirty="0"/>
+                        <a:t>Today, after lunch time</a:t>
+                      </a:r>
+                    </a:p>
+                  </a:txBody>
+                  <a:tcPr/>
+                </a:tc>
+                <a:tc>
+                  <a:txBody>
+                    <a:bodyPr/>
+                    <a:lstStyle/>
+                    <a:p>
+                      <a:r>
+                        <a:rPr lang="de-DE" dirty="0" err="1"/>
+                        <a:t>Registrations</a:t>
+                      </a:r>
+                      <a:r>
+                        <a:rPr lang="de-DE" dirty="0"/>
+                        <a:t> will </a:t>
+                      </a:r>
+                      <a:r>
+                        <a:rPr lang="de-DE" dirty="0" err="1"/>
+                        <a:t>be</a:t>
+                      </a:r>
+                      <a:r>
+                        <a:rPr lang="de-DE" dirty="0"/>
+                        <a:t> open</a:t>
+                      </a:r>
+                    </a:p>
+                  </a:txBody>
+                  <a:tcPr/>
+                </a:tc>
+                <a:extLst>
+                  <a:ext uri="{0D108BD9-81ED-4DB2-BD59-A6C34878D82A}">
+                    <a16:rowId xmlns:a16="http://schemas.microsoft.com/office/drawing/2014/main" val="219365017"/>
+                  </a:ext>
+                </a:extLst>
+              </a:tr>
+              <a:tr h="370840">
+                <a:tc>
+                  <a:txBody>
+                    <a:bodyPr/>
+                    <a:lstStyle/>
+                    <a:p>
+                      <a:r>
+                        <a:rPr lang="de-DE" dirty="0"/>
+                        <a:t>Tuesday, 18h45 – 19h45</a:t>
+                      </a:r>
+                    </a:p>
+                  </a:txBody>
+                  <a:tcPr/>
+                </a:tc>
+                <a:tc>
+                  <a:txBody>
+                    <a:bodyPr/>
+                    <a:lstStyle/>
+                    <a:p>
+                      <a:r>
+                        <a:rPr lang="de-DE" dirty="0"/>
+                        <a:t>Hackathon</a:t>
+                      </a:r>
+                    </a:p>
+                  </a:txBody>
+                  <a:tcPr/>
+                </a:tc>
+                <a:extLst>
+                  <a:ext uri="{0D108BD9-81ED-4DB2-BD59-A6C34878D82A}">
+                    <a16:rowId xmlns:a16="http://schemas.microsoft.com/office/drawing/2014/main" val="3352012886"/>
+                  </a:ext>
+                </a:extLst>
+              </a:tr>
+              <a:tr h="370840">
+                <a:tc>
+                  <a:txBody>
+                    <a:bodyPr/>
+                    <a:lstStyle/>
+                    <a:p>
+                      <a:r>
+                        <a:rPr lang="de-DE" dirty="0"/>
+                        <a:t>Wednesday, 18h45 – 19h45</a:t>
+                      </a:r>
+                    </a:p>
+                  </a:txBody>
+                  <a:tcPr/>
+                </a:tc>
+                <a:tc>
+                  <a:txBody>
+                    <a:bodyPr/>
+                    <a:lstStyle/>
+                    <a:p>
+                      <a:r>
+                        <a:rPr lang="de-DE" dirty="0"/>
+                        <a:t>Hackathon</a:t>
+                      </a:r>
+                    </a:p>
+                  </a:txBody>
+                  <a:tcPr/>
+                </a:tc>
+                <a:extLst>
+                  <a:ext uri="{0D108BD9-81ED-4DB2-BD59-A6C34878D82A}">
+                    <a16:rowId xmlns:a16="http://schemas.microsoft.com/office/drawing/2014/main" val="4269047107"/>
+                  </a:ext>
+                </a:extLst>
+              </a:tr>
+              <a:tr h="370840">
+                <a:tc>
+                  <a:txBody>
+                    <a:bodyPr/>
+                    <a:lstStyle/>
+                    <a:p>
+                      <a:r>
+                        <a:rPr lang="de-DE" dirty="0" err="1"/>
+                        <a:t>Thursday</a:t>
+                      </a:r>
+                      <a:r>
+                        <a:rPr lang="de-DE" dirty="0"/>
+                        <a:t>, </a:t>
+                      </a:r>
+                      <a:r>
+                        <a:rPr lang="de-DE" dirty="0" err="1"/>
+                        <a:t>around</a:t>
+                      </a:r>
+                      <a:r>
+                        <a:rPr lang="de-DE" dirty="0"/>
+                        <a:t> lunch time</a:t>
+                      </a:r>
+                    </a:p>
+                  </a:txBody>
+                  <a:tcPr/>
+                </a:tc>
+                <a:tc>
+                  <a:txBody>
+                    <a:bodyPr/>
+                    <a:lstStyle/>
+                    <a:p>
+                      <a:r>
+                        <a:rPr lang="de-DE" dirty="0"/>
+                        <a:t>Closing </a:t>
+                      </a:r>
+                      <a:r>
+                        <a:rPr lang="de-DE" dirty="0" err="1"/>
+                        <a:t>of</a:t>
+                      </a:r>
+                      <a:r>
+                        <a:rPr lang="de-DE" dirty="0"/>
+                        <a:t> bot </a:t>
+                      </a:r>
+                      <a:r>
+                        <a:rPr lang="de-DE" dirty="0" err="1"/>
+                        <a:t>upload</a:t>
+                      </a:r>
+                      <a:r>
+                        <a:rPr lang="de-DE" dirty="0"/>
+                        <a:t>, </a:t>
+                      </a:r>
+                      <a:r>
+                        <a:rPr lang="de-DE" dirty="0" err="1"/>
+                        <a:t>playoffs</a:t>
+                      </a:r>
+                      <a:endParaRPr lang="de-DE" dirty="0"/>
+                    </a:p>
+                  </a:txBody>
+                  <a:tcPr/>
+                </a:tc>
+                <a:extLst>
+                  <a:ext uri="{0D108BD9-81ED-4DB2-BD59-A6C34878D82A}">
+                    <a16:rowId xmlns:a16="http://schemas.microsoft.com/office/drawing/2014/main" val="3586547574"/>
+                  </a:ext>
+                </a:extLst>
+              </a:tr>
+              <a:tr h="370840">
+                <a:tc>
+                  <a:txBody>
+                    <a:bodyPr/>
+                    <a:lstStyle/>
+                    <a:p>
+                      <a:r>
+                        <a:rPr lang="de-DE" dirty="0" err="1"/>
+                        <a:t>Thursday</a:t>
+                      </a:r>
+                      <a:r>
+                        <a:rPr lang="de-DE" dirty="0"/>
+                        <a:t>, 16h15</a:t>
+                      </a:r>
+                    </a:p>
+                  </a:txBody>
+                  <a:tcPr/>
+                </a:tc>
+                <a:tc>
+                  <a:txBody>
+                    <a:bodyPr/>
+                    <a:lstStyle/>
+                    <a:p>
+                      <a:r>
+                        <a:rPr lang="de-DE" dirty="0" err="1"/>
+                        <a:t>Results</a:t>
+                      </a:r>
+                      <a:r>
+                        <a:rPr lang="de-DE" dirty="0"/>
+                        <a:t> &amp; </a:t>
+                      </a:r>
+                      <a:r>
+                        <a:rPr lang="de-DE" dirty="0" err="1"/>
+                        <a:t>winner</a:t>
+                      </a:r>
+                      <a:r>
+                        <a:rPr lang="de-DE" dirty="0"/>
+                        <a:t> </a:t>
+                      </a:r>
+                      <a:r>
+                        <a:rPr lang="de-DE" dirty="0" err="1"/>
+                        <a:t>ceremony</a:t>
+                      </a:r>
+                      <a:endParaRPr lang="de-DE" dirty="0"/>
+                    </a:p>
+                  </a:txBody>
+                  <a:tcPr/>
+                </a:tc>
+                <a:extLst>
+                  <a:ext uri="{0D108BD9-81ED-4DB2-BD59-A6C34878D82A}">
+                    <a16:rowId xmlns:a16="http://schemas.microsoft.com/office/drawing/2014/main" val="3478169864"/>
+                  </a:ext>
+                </a:extLst>
+              </a:tr>
+            </a:tbl>
+          </a:graphicData>
+        </a:graphic>
+      </p:graphicFrame>
+    </p:spTree>
+    <p:extLst>
+      <p:ext uri="{BB962C8B-B14F-4D97-AF65-F5344CB8AC3E}">
+        <p14:creationId xmlns:p14="http://schemas.microsoft.com/office/powerpoint/2010/main" val="3628761174"/>
+      </p:ext>
+    </p:extLst>
+  </p:cSld>
+  <p:clrMapOvr>
+    <a:masterClrMapping/>
+  </p:clrMapOvr>
+</p:sld>
+</file>
+
+<file path=ppt/slides/slide13.xml><?xml version="1.0" encoding="utf-8"?>
+<p:sld xmlns:a="http://schemas.openxmlformats.org/drawingml/2006/main" xmlns:r="http://schemas.openxmlformats.org/officeDocument/2006/relationships" xmlns:p="http://schemas.openxmlformats.org/presentationml/2006/main">
+  <p:cSld>
+    <p:spTree>
+      <p:nvGrpSpPr>
+        <p:cNvPr id="1" name=""/>
+        <p:cNvGrpSpPr/>
+        <p:nvPr/>
+      </p:nvGrpSpPr>
+      <p:grpSpPr>
+        <a:xfrm>
+          <a:off x="0" y="0"/>
+          <a:ext cx="0" cy="0"/>
+          <a:chOff x="0" y="0"/>
+          <a:chExt cx="0" cy="0"/>
+        </a:xfrm>
+      </p:grpSpPr>
+      <p:sp>
+        <p:nvSpPr>
+          <p:cNvPr id="2" name="Titel 1"/>
+          <p:cNvSpPr>
+            <a:spLocks noGrp="1"/>
+          </p:cNvSpPr>
+          <p:nvPr>
             <p:ph type="ctrTitle"/>
           </p:nvPr>
         </p:nvSpPr>
@@ -3127,14 +4096,13 @@
           <a:lstStyle/>
           <a:p>
             <a:r>
-              <a:rPr lang="de-DE" b="1" dirty="0" err="1" smtClean="0"/>
+              <a:rPr lang="de-DE" b="1" dirty="0" err="1"/>
               <a:t>Questions</a:t>
             </a:r>
             <a:r>
-              <a:rPr lang="de-DE" b="1" dirty="0" smtClean="0"/>
+              <a:rPr lang="de-DE" b="1" dirty="0"/>
               <a:t>?</a:t>
             </a:r>
-            <a:endParaRPr lang="de-DE" b="1" dirty="0"/>
           </a:p>
         </p:txBody>
       </p:sp>
@@ -3161,63 +4129,63 @@
           <a:lstStyle/>
           <a:p>
             <a:r>
-              <a:rPr lang="de-DE" dirty="0" smtClean="0"/>
+              <a:rPr lang="de-DE" dirty="0"/>
               <a:t>Talk </a:t>
             </a:r>
             <a:r>
-              <a:rPr lang="de-DE" dirty="0" err="1" smtClean="0"/>
+              <a:rPr lang="de-DE" dirty="0" err="1"/>
               <a:t>to</a:t>
             </a:r>
             <a:r>
-              <a:rPr lang="de-DE" dirty="0" smtClean="0"/>
-              <a:t> </a:t>
-            </a:r>
-            <a:r>
-              <a:rPr lang="de-DE" dirty="0" err="1" smtClean="0"/>
+              <a:rPr lang="de-DE" dirty="0"/>
+              <a:t> </a:t>
+            </a:r>
+            <a:r>
+              <a:rPr lang="de-DE" dirty="0" err="1"/>
               <a:t>me</a:t>
             </a:r>
-            <a:endParaRPr lang="de-DE" dirty="0" smtClean="0"/>
-          </a:p>
-          <a:p>
-            <a:endParaRPr lang="de-DE" dirty="0" smtClean="0"/>
-          </a:p>
-          <a:p>
-            <a:r>
-              <a:rPr lang="de-DE" dirty="0" err="1" smtClean="0"/>
+            <a:endParaRPr lang="de-DE" dirty="0"/>
+          </a:p>
+          <a:p>
+            <a:endParaRPr lang="de-DE" dirty="0"/>
+          </a:p>
+          <a:p>
+            <a:r>
+              <a:rPr lang="de-DE" dirty="0" err="1"/>
               <a:t>Join</a:t>
             </a:r>
             <a:r>
-              <a:rPr lang="de-DE" dirty="0" smtClean="0"/>
-              <a:t> </a:t>
-            </a:r>
-            <a:r>
-              <a:rPr lang="de-DE" dirty="0" err="1" smtClean="0"/>
+              <a:rPr lang="de-DE" dirty="0"/>
+              <a:t> </a:t>
+            </a:r>
+            <a:r>
+              <a:rPr lang="de-DE" dirty="0" err="1"/>
               <a:t>the</a:t>
             </a:r>
             <a:r>
-              <a:rPr lang="de-DE" dirty="0" smtClean="0"/>
-              <a:t> </a:t>
-            </a:r>
-            <a:r>
-              <a:rPr lang="de-DE" dirty="0" err="1" smtClean="0"/>
+              <a:rPr lang="de-DE" dirty="0"/>
+              <a:t> </a:t>
+            </a:r>
+            <a:r>
+              <a:rPr lang="de-DE" dirty="0" err="1"/>
               <a:t>hackathons</a:t>
             </a:r>
-            <a:endParaRPr lang="de-DE" dirty="0" smtClean="0"/>
-          </a:p>
-          <a:p>
             <a:endParaRPr lang="de-DE" dirty="0"/>
           </a:p>
           <a:p>
-            <a:r>
-              <a:rPr lang="de-DE" dirty="0" smtClean="0">
+            <a:endParaRPr lang="de-DE" dirty="0"/>
+          </a:p>
+          <a:p>
+            <a:r>
+              <a:rPr lang="de-DE" dirty="0">
                 <a:hlinkClick r:id="rId2"/>
               </a:rPr>
               <a:t>grid.wars@cern.ch</a:t>
             </a:r>
-            <a:endParaRPr lang="de-DE" dirty="0" smtClean="0"/>
-          </a:p>
-          <a:p>
-            <a:endParaRPr lang="de-DE" dirty="0" smtClean="0"/>
+            <a:endParaRPr lang="de-DE" dirty="0"/>
+          </a:p>
+          <a:p>
+            <a:endParaRPr lang="de-DE" dirty="0"/>
           </a:p>
         </p:txBody>
       </p:sp>
@@ -3268,10 +4236,9 @@
           <a:p>
             <a:pPr algn="ctr"/>
             <a:r>
-              <a:rPr lang="de-DE" b="1" dirty="0" smtClean="0"/>
+              <a:rPr lang="de-DE" b="1" dirty="0"/>
               <a:t>Game Setup</a:t>
             </a:r>
-            <a:endParaRPr lang="de-DE" b="1" dirty="0"/>
           </a:p>
         </p:txBody>
       </p:sp>
@@ -3296,16 +4263,12 @@
           <a:lstStyle/>
           <a:p>
             <a:r>
-              <a:rPr lang="de-DE" dirty="0" err="1" smtClean="0"/>
+              <a:rPr lang="de-DE" dirty="0" err="1"/>
               <a:t>Universe</a:t>
             </a:r>
             <a:r>
-              <a:rPr lang="de-DE" dirty="0" smtClean="0"/>
-              <a:t>: </a:t>
-            </a:r>
-            <a:r>
-              <a:rPr lang="de-DE" dirty="0"/>
-              <a:t>50x50 </a:t>
+              <a:rPr lang="de-DE" dirty="0"/>
+              <a:t>: 50x50 </a:t>
             </a:r>
             <a:r>
               <a:rPr lang="de-DE" dirty="0" err="1"/>
@@ -3316,165 +4279,164 @@
               <a:t> </a:t>
             </a:r>
             <a:r>
-              <a:rPr lang="de-DE" dirty="0" err="1" smtClean="0"/>
+              <a:rPr lang="de-DE" dirty="0" err="1"/>
               <a:t>board</a:t>
             </a:r>
-            <a:endParaRPr lang="de-DE" dirty="0" smtClean="0"/>
-          </a:p>
-          <a:p>
-            <a:r>
-              <a:rPr lang="de-DE" dirty="0" smtClean="0"/>
+            <a:endParaRPr lang="de-DE" dirty="0"/>
+          </a:p>
+          <a:p>
+            <a:r>
+              <a:rPr lang="de-DE" dirty="0"/>
               <a:t>1vs1 </a:t>
             </a:r>
             <a:r>
-              <a:rPr lang="de-DE" dirty="0" err="1" smtClean="0"/>
+              <a:rPr lang="de-DE" dirty="0" err="1"/>
               <a:t>matches</a:t>
             </a:r>
             <a:r>
-              <a:rPr lang="de-DE" dirty="0" smtClean="0"/>
-              <a:t> </a:t>
-            </a:r>
-            <a:r>
-              <a:rPr lang="de-DE" dirty="0" err="1" smtClean="0"/>
+              <a:rPr lang="de-DE" dirty="0"/>
+              <a:t> </a:t>
+            </a:r>
+            <a:r>
+              <a:rPr lang="de-DE" dirty="0" err="1"/>
               <a:t>between</a:t>
             </a:r>
             <a:r>
-              <a:rPr lang="de-DE" dirty="0" smtClean="0"/>
+              <a:rPr lang="de-DE" dirty="0"/>
               <a:t> 2 „</a:t>
             </a:r>
             <a:r>
-              <a:rPr lang="de-DE" dirty="0" err="1" smtClean="0"/>
+              <a:rPr lang="de-DE" dirty="0" err="1"/>
               <a:t>bots</a:t>
             </a:r>
             <a:r>
-              <a:rPr lang="de-DE" dirty="0" smtClean="0"/>
+              <a:rPr lang="de-DE" dirty="0"/>
               <a:t>“</a:t>
             </a:r>
           </a:p>
           <a:p>
             <a:r>
-              <a:rPr lang="de-DE" dirty="0" smtClean="0"/>
+              <a:rPr lang="de-DE" dirty="0"/>
               <a:t>Bots </a:t>
             </a:r>
             <a:r>
-              <a:rPr lang="de-DE" dirty="0" err="1" smtClean="0"/>
+              <a:rPr lang="de-DE" dirty="0" err="1"/>
               <a:t>start</a:t>
             </a:r>
             <a:r>
-              <a:rPr lang="de-DE" dirty="0" smtClean="0"/>
+              <a:rPr lang="de-DE" dirty="0"/>
               <a:t> at a </a:t>
             </a:r>
             <a:r>
-              <a:rPr lang="de-DE" dirty="0" err="1" smtClean="0"/>
+              <a:rPr lang="de-DE" dirty="0" err="1"/>
               <a:t>random</a:t>
             </a:r>
             <a:r>
-              <a:rPr lang="de-DE" dirty="0" smtClean="0"/>
-              <a:t> </a:t>
-            </a:r>
-            <a:r>
-              <a:rPr lang="de-DE" dirty="0" err="1" smtClean="0"/>
+              <a:rPr lang="de-DE" dirty="0"/>
+              <a:t> </a:t>
+            </a:r>
+            <a:r>
+              <a:rPr lang="de-DE" dirty="0" err="1"/>
               <a:t>cell</a:t>
             </a:r>
             <a:r>
-              <a:rPr lang="de-DE" dirty="0" smtClean="0"/>
-              <a:t> </a:t>
-            </a:r>
-            <a:r>
-              <a:rPr lang="de-DE" dirty="0" err="1" smtClean="0"/>
+              <a:rPr lang="de-DE" dirty="0"/>
+              <a:t> </a:t>
+            </a:r>
+            <a:r>
+              <a:rPr lang="de-DE" dirty="0" err="1"/>
               <a:t>with</a:t>
             </a:r>
             <a:r>
-              <a:rPr lang="de-DE" dirty="0" smtClean="0"/>
+              <a:rPr lang="de-DE" dirty="0"/>
               <a:t> 100 </a:t>
             </a:r>
             <a:r>
-              <a:rPr lang="de-DE" dirty="0" err="1" smtClean="0"/>
+              <a:rPr lang="de-DE" dirty="0" err="1"/>
               <a:t>units</a:t>
             </a:r>
             <a:r>
-              <a:rPr lang="de-DE" dirty="0" smtClean="0"/>
+              <a:rPr lang="de-DE" dirty="0"/>
               <a:t> (</a:t>
             </a:r>
             <a:r>
-              <a:rPr lang="de-DE" dirty="0" err="1" smtClean="0"/>
+              <a:rPr lang="de-DE" dirty="0" err="1"/>
               <a:t>population</a:t>
             </a:r>
             <a:r>
-              <a:rPr lang="de-DE" dirty="0" smtClean="0"/>
+              <a:rPr lang="de-DE" dirty="0"/>
               <a:t>)</a:t>
             </a:r>
           </a:p>
           <a:p>
             <a:r>
-              <a:rPr lang="de-DE" dirty="0" smtClean="0"/>
+              <a:rPr lang="de-DE" dirty="0"/>
               <a:t>Bots </a:t>
             </a:r>
             <a:r>
-              <a:rPr lang="de-DE" dirty="0" err="1" smtClean="0"/>
+              <a:rPr lang="de-DE" dirty="0" err="1"/>
               <a:t>take</a:t>
             </a:r>
             <a:r>
-              <a:rPr lang="de-DE" dirty="0" smtClean="0"/>
-              <a:t> </a:t>
-            </a:r>
-            <a:r>
-              <a:rPr lang="de-DE" dirty="0" err="1" smtClean="0"/>
+              <a:rPr lang="de-DE" dirty="0"/>
+              <a:t> </a:t>
+            </a:r>
+            <a:r>
+              <a:rPr lang="de-DE" dirty="0" err="1"/>
               <a:t>alternating</a:t>
             </a:r>
             <a:r>
-              <a:rPr lang="de-DE" dirty="0" smtClean="0"/>
-              <a:t> </a:t>
-            </a:r>
-            <a:r>
-              <a:rPr lang="de-DE" dirty="0" err="1" smtClean="0"/>
+              <a:rPr lang="de-DE" dirty="0"/>
+              <a:t> </a:t>
+            </a:r>
+            <a:r>
+              <a:rPr lang="de-DE" dirty="0" err="1"/>
               <a:t>turns</a:t>
             </a:r>
             <a:r>
-              <a:rPr lang="de-DE" dirty="0" smtClean="0"/>
-              <a:t> </a:t>
-            </a:r>
-            <a:r>
-              <a:rPr lang="de-DE" dirty="0" err="1" smtClean="0"/>
+              <a:rPr lang="de-DE" dirty="0"/>
+              <a:t> </a:t>
+            </a:r>
+            <a:r>
+              <a:rPr lang="de-DE" dirty="0" err="1"/>
               <a:t>to</a:t>
             </a:r>
             <a:r>
-              <a:rPr lang="de-DE" dirty="0" smtClean="0"/>
-              <a:t> </a:t>
-            </a:r>
-            <a:r>
-              <a:rPr lang="de-DE" dirty="0" err="1" smtClean="0"/>
+              <a:rPr lang="de-DE" dirty="0"/>
+              <a:t> </a:t>
+            </a:r>
+            <a:r>
+              <a:rPr lang="de-DE" dirty="0" err="1"/>
               <a:t>move</a:t>
             </a:r>
             <a:r>
-              <a:rPr lang="de-DE" dirty="0" smtClean="0"/>
-              <a:t> </a:t>
-            </a:r>
-            <a:r>
-              <a:rPr lang="de-DE" dirty="0" err="1" smtClean="0"/>
+              <a:rPr lang="de-DE" dirty="0"/>
+              <a:t> </a:t>
+            </a:r>
+            <a:r>
+              <a:rPr lang="de-DE" dirty="0" err="1"/>
               <a:t>units</a:t>
             </a:r>
             <a:r>
-              <a:rPr lang="de-DE" dirty="0" smtClean="0"/>
+              <a:rPr lang="de-DE" dirty="0"/>
               <a:t> (2 </a:t>
             </a:r>
             <a:r>
-              <a:rPr lang="de-DE" dirty="0" err="1" smtClean="0"/>
+              <a:rPr lang="de-DE" dirty="0" err="1"/>
               <a:t>turns</a:t>
             </a:r>
             <a:r>
-              <a:rPr lang="de-DE" dirty="0" smtClean="0"/>
+              <a:rPr lang="de-DE" dirty="0"/>
               <a:t> = 1 </a:t>
             </a:r>
             <a:r>
-              <a:rPr lang="de-DE" dirty="0" err="1" smtClean="0"/>
+              <a:rPr lang="de-DE" dirty="0" err="1"/>
               <a:t>round</a:t>
             </a:r>
             <a:r>
               <a:rPr lang="de-DE" dirty="0"/>
               <a:t>)</a:t>
             </a:r>
-            <a:endParaRPr lang="de-DE" dirty="0" smtClean="0"/>
           </a:p>
           <a:p>
             <a:pPr lvl="1"/>
@@ -3535,10 +4497,9 @@
           <a:lstStyle/>
           <a:p>
             <a:r>
-              <a:rPr lang="de-DE" sz="2400" dirty="0" smtClean="0"/>
+              <a:rPr lang="de-DE" sz="2400" dirty="0"/>
               <a:t>Start</a:t>
             </a:r>
-            <a:endParaRPr lang="de-DE" sz="2400" dirty="0"/>
           </a:p>
         </p:txBody>
       </p:sp>
@@ -3565,18 +4526,17 @@
           <a:lstStyle/>
           <a:p>
             <a:r>
-              <a:rPr lang="de-DE" sz="2400" dirty="0" smtClean="0"/>
+              <a:rPr lang="de-DE" sz="2400" dirty="0"/>
               <a:t>Turn 1 (</a:t>
             </a:r>
             <a:r>
-              <a:rPr lang="de-DE" sz="2400" dirty="0" err="1" smtClean="0"/>
+              <a:rPr lang="de-DE" sz="2400" dirty="0" err="1"/>
               <a:t>red</a:t>
             </a:r>
             <a:r>
-              <a:rPr lang="de-DE" sz="2400" dirty="0" smtClean="0"/>
+              <a:rPr lang="de-DE" sz="2400" dirty="0"/>
               <a:t>)</a:t>
             </a:r>
-            <a:endParaRPr lang="de-DE" sz="2400" dirty="0"/>
           </a:p>
         </p:txBody>
       </p:sp>
@@ -3603,18 +4563,17 @@
           <a:lstStyle/>
           <a:p>
             <a:r>
-              <a:rPr lang="de-DE" sz="2400" dirty="0" smtClean="0"/>
+              <a:rPr lang="de-DE" sz="2400" dirty="0"/>
               <a:t>Turn 2 (</a:t>
             </a:r>
             <a:r>
-              <a:rPr lang="de-DE" sz="2400" dirty="0" err="1" smtClean="0"/>
+              <a:rPr lang="de-DE" sz="2400" dirty="0" err="1"/>
               <a:t>blue</a:t>
             </a:r>
             <a:r>
-              <a:rPr lang="de-DE" sz="2400" dirty="0" smtClean="0"/>
+              <a:rPr lang="de-DE" sz="2400" dirty="0"/>
               <a:t>)</a:t>
             </a:r>
-            <a:endParaRPr lang="de-DE" sz="2400" dirty="0"/>
           </a:p>
         </p:txBody>
       </p:sp>
@@ -3665,7 +4624,7 @@
           <a:p>
             <a:pPr algn="ctr"/>
             <a:r>
-              <a:rPr lang="de-DE" b="1" dirty="0" err="1" smtClean="0"/>
+              <a:rPr lang="de-DE" b="1" dirty="0" err="1"/>
               <a:t>Movements</a:t>
             </a:r>
             <a:endParaRPr lang="de-DE" b="1" dirty="0"/>
@@ -3721,136 +4680,136 @@
               <a:t> </a:t>
             </a:r>
             <a:r>
-              <a:rPr lang="de-DE" dirty="0" err="1" smtClean="0"/>
+              <a:rPr lang="de-DE" dirty="0" err="1"/>
               <a:t>into</a:t>
             </a:r>
             <a:r>
-              <a:rPr lang="de-DE" dirty="0" smtClean="0"/>
-              <a:t> </a:t>
-            </a:r>
-            <a:r>
-              <a:rPr lang="de-DE" dirty="0" err="1" smtClean="0"/>
+              <a:rPr lang="de-DE" dirty="0"/>
+              <a:t> </a:t>
+            </a:r>
+            <a:r>
+              <a:rPr lang="de-DE" dirty="0" err="1"/>
               <a:t>directly</a:t>
             </a:r>
             <a:r>
-              <a:rPr lang="de-DE" dirty="0" smtClean="0"/>
-              <a:t> </a:t>
-            </a:r>
-            <a:r>
-              <a:rPr lang="de-DE" dirty="0" err="1" smtClean="0"/>
+              <a:rPr lang="de-DE" dirty="0"/>
+              <a:t> </a:t>
+            </a:r>
+            <a:r>
+              <a:rPr lang="de-DE" dirty="0" err="1"/>
               <a:t>neighbouring</a:t>
             </a:r>
             <a:r>
-              <a:rPr lang="de-DE" dirty="0" smtClean="0"/>
-              <a:t> </a:t>
-            </a:r>
-            <a:r>
-              <a:rPr lang="de-DE" dirty="0" err="1" smtClean="0"/>
+              <a:rPr lang="de-DE" dirty="0"/>
+              <a:t> </a:t>
+            </a:r>
+            <a:r>
+              <a:rPr lang="de-DE" dirty="0" err="1"/>
               <a:t>cells</a:t>
             </a:r>
-            <a:endParaRPr lang="de-DE" dirty="0" smtClean="0"/>
-          </a:p>
-          <a:p>
-            <a:r>
-              <a:rPr lang="de-DE" dirty="0" err="1" smtClean="0"/>
+            <a:endParaRPr lang="de-DE" dirty="0"/>
+          </a:p>
+          <a:p>
+            <a:r>
+              <a:rPr lang="de-DE" dirty="0" err="1"/>
               <a:t>Up</a:t>
             </a:r>
             <a:r>
-              <a:rPr lang="de-DE" dirty="0" smtClean="0"/>
+              <a:rPr lang="de-DE" dirty="0"/>
               <a:t>, down, </a:t>
             </a:r>
             <a:r>
-              <a:rPr lang="de-DE" dirty="0" err="1" smtClean="0"/>
+              <a:rPr lang="de-DE" dirty="0" err="1"/>
               <a:t>left</a:t>
             </a:r>
             <a:r>
-              <a:rPr lang="de-DE" dirty="0" smtClean="0"/>
+              <a:rPr lang="de-DE" dirty="0"/>
               <a:t>, </a:t>
             </a:r>
             <a:r>
-              <a:rPr lang="de-DE" dirty="0" err="1" smtClean="0"/>
+              <a:rPr lang="de-DE" dirty="0" err="1"/>
               <a:t>right</a:t>
             </a:r>
             <a:r>
-              <a:rPr lang="de-DE" dirty="0" smtClean="0"/>
+              <a:rPr lang="de-DE" dirty="0"/>
               <a:t> (</a:t>
             </a:r>
             <a:r>
-              <a:rPr lang="de-DE" dirty="0" err="1" smtClean="0"/>
+              <a:rPr lang="de-DE" dirty="0" err="1"/>
               <a:t>no</a:t>
             </a:r>
             <a:r>
-              <a:rPr lang="de-DE" dirty="0" smtClean="0"/>
-              <a:t> </a:t>
-            </a:r>
-            <a:r>
-              <a:rPr lang="de-DE" dirty="0" err="1" smtClean="0"/>
+              <a:rPr lang="de-DE" dirty="0"/>
+              <a:t> </a:t>
+            </a:r>
+            <a:r>
+              <a:rPr lang="de-DE" dirty="0" err="1"/>
               <a:t>diagonals</a:t>
             </a:r>
             <a:r>
-              <a:rPr lang="de-DE" dirty="0" smtClean="0"/>
+              <a:rPr lang="de-DE" dirty="0"/>
               <a:t>)</a:t>
             </a:r>
           </a:p>
           <a:p>
             <a:r>
-              <a:rPr lang="de-DE" dirty="0" smtClean="0"/>
+              <a:rPr lang="de-DE" dirty="0"/>
               <a:t>The </a:t>
             </a:r>
             <a:r>
-              <a:rPr lang="de-DE" dirty="0" err="1" smtClean="0"/>
+              <a:rPr lang="de-DE" dirty="0" err="1"/>
               <a:t>board</a:t>
             </a:r>
             <a:r>
-              <a:rPr lang="de-DE" dirty="0" smtClean="0"/>
-              <a:t> </a:t>
-            </a:r>
-            <a:r>
-              <a:rPr lang="de-DE" dirty="0" err="1" smtClean="0"/>
+              <a:rPr lang="de-DE" dirty="0"/>
+              <a:t> </a:t>
+            </a:r>
+            <a:r>
+              <a:rPr lang="de-DE" dirty="0" err="1"/>
               <a:t>is</a:t>
             </a:r>
             <a:r>
-              <a:rPr lang="de-DE" dirty="0" smtClean="0"/>
+              <a:rPr lang="de-DE" dirty="0"/>
               <a:t> a </a:t>
             </a:r>
             <a:r>
-              <a:rPr lang="de-DE" dirty="0" err="1" smtClean="0"/>
+              <a:rPr lang="de-DE" dirty="0" err="1"/>
               <a:t>torus</a:t>
             </a:r>
             <a:r>
-              <a:rPr lang="de-DE" dirty="0" smtClean="0"/>
+              <a:rPr lang="de-DE" dirty="0"/>
               <a:t> (</a:t>
             </a:r>
             <a:r>
-              <a:rPr lang="de-DE" dirty="0" err="1" smtClean="0"/>
+              <a:rPr lang="de-DE" dirty="0" err="1"/>
               <a:t>the</a:t>
             </a:r>
             <a:r>
-              <a:rPr lang="de-DE" dirty="0" smtClean="0"/>
-              <a:t> </a:t>
-            </a:r>
-            <a:r>
-              <a:rPr lang="de-DE" dirty="0" err="1" smtClean="0"/>
+              <a:rPr lang="de-DE" dirty="0"/>
+              <a:t> </a:t>
+            </a:r>
+            <a:r>
+              <a:rPr lang="de-DE" dirty="0" err="1"/>
               <a:t>edges</a:t>
             </a:r>
             <a:r>
-              <a:rPr lang="de-DE" dirty="0" smtClean="0"/>
-              <a:t> </a:t>
-            </a:r>
-            <a:r>
-              <a:rPr lang="de-DE" dirty="0" err="1" smtClean="0"/>
+              <a:rPr lang="de-DE" dirty="0"/>
+              <a:t> </a:t>
+            </a:r>
+            <a:r>
+              <a:rPr lang="de-DE" dirty="0" err="1"/>
               <a:t>wrap</a:t>
             </a:r>
             <a:r>
-              <a:rPr lang="de-DE" dirty="0" smtClean="0"/>
-              <a:t> </a:t>
-            </a:r>
-            <a:r>
-              <a:rPr lang="de-DE" dirty="0" err="1" smtClean="0"/>
+              <a:rPr lang="de-DE" dirty="0"/>
+              <a:t> </a:t>
+            </a:r>
+            <a:r>
+              <a:rPr lang="de-DE" dirty="0" err="1"/>
               <a:t>around</a:t>
             </a:r>
             <a:r>
-              <a:rPr lang="de-DE" dirty="0" smtClean="0"/>
+              <a:rPr lang="de-DE" dirty="0"/>
               <a:t>)</a:t>
             </a:r>
           </a:p>
@@ -3933,10 +4892,9 @@
           <a:p>
             <a:pPr algn="ctr"/>
             <a:r>
-              <a:rPr lang="de-DE" b="1" dirty="0" smtClean="0"/>
+              <a:rPr lang="de-DE" b="1" dirty="0"/>
               <a:t>Battle</a:t>
             </a:r>
-            <a:endParaRPr lang="de-DE" b="1" dirty="0"/>
           </a:p>
         </p:txBody>
       </p:sp>
@@ -3961,177 +4919,175 @@
           <a:lstStyle/>
           <a:p>
             <a:r>
-              <a:rPr lang="de-DE" dirty="0" err="1" smtClean="0"/>
+              <a:rPr lang="de-DE" dirty="0" err="1"/>
               <a:t>If</a:t>
             </a:r>
             <a:r>
-              <a:rPr lang="de-DE" dirty="0" smtClean="0"/>
-              <a:t> </a:t>
-            </a:r>
-            <a:r>
-              <a:rPr lang="de-DE" dirty="0" err="1" smtClean="0"/>
+              <a:rPr lang="de-DE" dirty="0"/>
+              <a:t> </a:t>
+            </a:r>
+            <a:r>
+              <a:rPr lang="de-DE" dirty="0" err="1"/>
               <a:t>two</a:t>
             </a:r>
             <a:r>
-              <a:rPr lang="de-DE" dirty="0" smtClean="0"/>
-              <a:t> </a:t>
-            </a:r>
-            <a:r>
-              <a:rPr lang="de-DE" dirty="0" err="1" smtClean="0"/>
+              <a:rPr lang="de-DE" dirty="0"/>
+              <a:t> </a:t>
+            </a:r>
+            <a:r>
+              <a:rPr lang="de-DE" dirty="0" err="1"/>
               <a:t>bots</a:t>
             </a:r>
             <a:r>
-              <a:rPr lang="de-DE" dirty="0" smtClean="0"/>
-              <a:t> </a:t>
-            </a:r>
-            <a:r>
-              <a:rPr lang="de-DE" dirty="0" err="1" smtClean="0"/>
+              <a:rPr lang="de-DE" dirty="0"/>
+              <a:t> </a:t>
+            </a:r>
+            <a:r>
+              <a:rPr lang="de-DE" dirty="0" err="1"/>
               <a:t>meet</a:t>
             </a:r>
             <a:r>
-              <a:rPr lang="de-DE" dirty="0" smtClean="0"/>
+              <a:rPr lang="de-DE" dirty="0"/>
               <a:t> in a </a:t>
             </a:r>
             <a:r>
-              <a:rPr lang="de-DE" dirty="0" err="1" smtClean="0"/>
+              <a:rPr lang="de-DE" dirty="0" err="1"/>
               <a:t>cell</a:t>
             </a:r>
             <a:r>
-              <a:rPr lang="de-DE" dirty="0" smtClean="0"/>
+              <a:rPr lang="de-DE" dirty="0"/>
               <a:t>? Fight!</a:t>
             </a:r>
           </a:p>
           <a:p>
             <a:r>
-              <a:rPr lang="de-DE" dirty="0" smtClean="0"/>
+              <a:rPr lang="de-DE" dirty="0"/>
               <a:t>Simple </a:t>
             </a:r>
             <a:r>
-              <a:rPr lang="de-DE" dirty="0" err="1" smtClean="0"/>
+              <a:rPr lang="de-DE" dirty="0" err="1"/>
               <a:t>comparison</a:t>
             </a:r>
             <a:r>
-              <a:rPr lang="de-DE" dirty="0" smtClean="0"/>
+              <a:rPr lang="de-DE" dirty="0"/>
               <a:t> (</a:t>
             </a:r>
             <a:r>
-              <a:rPr lang="de-DE" dirty="0" err="1" smtClean="0"/>
+              <a:rPr lang="de-DE" dirty="0" err="1"/>
               <a:t>more</a:t>
             </a:r>
             <a:r>
-              <a:rPr lang="de-DE" dirty="0" smtClean="0"/>
-              <a:t> </a:t>
-            </a:r>
-            <a:r>
-              <a:rPr lang="de-DE" dirty="0" err="1" smtClean="0"/>
+              <a:rPr lang="de-DE" dirty="0"/>
+              <a:t> </a:t>
+            </a:r>
+            <a:r>
+              <a:rPr lang="de-DE" dirty="0" err="1"/>
               <a:t>units</a:t>
             </a:r>
             <a:r>
-              <a:rPr lang="de-DE" dirty="0" smtClean="0"/>
+              <a:rPr lang="de-DE" dirty="0"/>
               <a:t> will </a:t>
             </a:r>
             <a:r>
-              <a:rPr lang="de-DE" dirty="0" err="1" smtClean="0"/>
+              <a:rPr lang="de-DE" dirty="0" err="1"/>
               <a:t>win</a:t>
             </a:r>
             <a:r>
               <a:rPr lang="de-DE" dirty="0"/>
               <a:t>)</a:t>
             </a:r>
-            <a:endParaRPr lang="de-DE" dirty="0" smtClean="0"/>
-          </a:p>
-          <a:p>
-            <a:r>
-              <a:rPr lang="de-DE" dirty="0" err="1" smtClean="0"/>
+          </a:p>
+          <a:p>
+            <a:r>
+              <a:rPr lang="de-DE" dirty="0" err="1"/>
               <a:t>Surviving</a:t>
             </a:r>
             <a:r>
-              <a:rPr lang="de-DE" dirty="0" smtClean="0"/>
-              <a:t> </a:t>
-            </a:r>
-            <a:r>
-              <a:rPr lang="de-DE" dirty="0" err="1" smtClean="0"/>
+              <a:rPr lang="de-DE" dirty="0"/>
+              <a:t> </a:t>
+            </a:r>
+            <a:r>
+              <a:rPr lang="de-DE" dirty="0" err="1"/>
               <a:t>units</a:t>
             </a:r>
             <a:r>
-              <a:rPr lang="de-DE" dirty="0" smtClean="0"/>
+              <a:rPr lang="de-DE" dirty="0"/>
               <a:t> = </a:t>
             </a:r>
             <a:r>
-              <a:rPr lang="de-DE" dirty="0" err="1" smtClean="0"/>
+              <a:rPr lang="de-DE" dirty="0" err="1"/>
               <a:t>attacking</a:t>
             </a:r>
             <a:r>
-              <a:rPr lang="de-DE" dirty="0" smtClean="0"/>
+              <a:rPr lang="de-DE" dirty="0"/>
               <a:t> – </a:t>
             </a:r>
             <a:r>
-              <a:rPr lang="de-DE" dirty="0" err="1" smtClean="0"/>
+              <a:rPr lang="de-DE" dirty="0" err="1"/>
               <a:t>defending</a:t>
             </a:r>
             <a:r>
-              <a:rPr lang="de-DE" dirty="0" smtClean="0"/>
-              <a:t> </a:t>
-            </a:r>
-            <a:r>
-              <a:rPr lang="de-DE" dirty="0" err="1" smtClean="0"/>
+              <a:rPr lang="de-DE" dirty="0"/>
+              <a:t> </a:t>
+            </a:r>
+            <a:r>
+              <a:rPr lang="de-DE" dirty="0" err="1"/>
               <a:t>units</a:t>
             </a:r>
             <a:r>
-              <a:rPr lang="de-DE" dirty="0" smtClean="0"/>
+              <a:rPr lang="de-DE" dirty="0"/>
               <a:t> (</a:t>
             </a:r>
             <a:r>
-              <a:rPr lang="de-DE" dirty="0" err="1" smtClean="0"/>
+              <a:rPr lang="de-DE" dirty="0" err="1"/>
               <a:t>can</a:t>
             </a:r>
             <a:r>
-              <a:rPr lang="de-DE" dirty="0" smtClean="0"/>
-              <a:t> </a:t>
-            </a:r>
-            <a:r>
-              <a:rPr lang="de-DE" dirty="0" err="1" smtClean="0"/>
-              <a:t>be</a:t>
-            </a:r>
-            <a:r>
-              <a:rPr lang="de-DE" dirty="0" smtClean="0"/>
-              <a:t> 0)</a:t>
-            </a:r>
-          </a:p>
-          <a:p>
-            <a:r>
-              <a:rPr lang="de-DE" dirty="0" err="1" smtClean="0"/>
+              <a:rPr lang="de-DE" dirty="0"/>
+              <a:t> </a:t>
+            </a:r>
+            <a:r>
+              <a:rPr lang="de-DE" dirty="0" err="1"/>
+              <a:t>result</a:t>
+            </a:r>
+            <a:r>
+              <a:rPr lang="de-DE" dirty="0"/>
+              <a:t> in 0)</a:t>
+            </a:r>
+          </a:p>
+          <a:p>
+            <a:r>
+              <a:rPr lang="de-DE" dirty="0" err="1"/>
               <a:t>Battles</a:t>
             </a:r>
             <a:r>
-              <a:rPr lang="de-DE" dirty="0" smtClean="0"/>
-              <a:t> </a:t>
-            </a:r>
-            <a:r>
-              <a:rPr lang="de-DE" dirty="0" err="1" smtClean="0"/>
+              <a:rPr lang="de-DE" dirty="0"/>
+              <a:t> </a:t>
+            </a:r>
+            <a:r>
+              <a:rPr lang="de-DE" dirty="0" err="1"/>
               <a:t>occur</a:t>
             </a:r>
             <a:r>
-              <a:rPr lang="de-DE" dirty="0" smtClean="0"/>
+              <a:rPr lang="de-DE" dirty="0"/>
               <a:t> after </a:t>
             </a:r>
             <a:r>
-              <a:rPr lang="de-DE" dirty="0" err="1" smtClean="0"/>
+              <a:rPr lang="de-DE" dirty="0" err="1"/>
               <a:t>every</a:t>
             </a:r>
             <a:r>
-              <a:rPr lang="de-DE" dirty="0" smtClean="0"/>
+              <a:rPr lang="de-DE" dirty="0"/>
               <a:t> turn (not </a:t>
             </a:r>
             <a:r>
-              <a:rPr lang="de-DE" dirty="0" err="1" smtClean="0"/>
+              <a:rPr lang="de-DE" dirty="0" err="1"/>
               <a:t>round</a:t>
             </a:r>
             <a:r>
               <a:rPr lang="de-DE" dirty="0"/>
               <a:t>)</a:t>
             </a:r>
-            <a:endParaRPr lang="de-DE" dirty="0" smtClean="0"/>
           </a:p>
         </p:txBody>
       </p:sp>
@@ -4212,10 +5168,9 @@
           <a:p>
             <a:pPr algn="ctr"/>
             <a:r>
-              <a:rPr lang="de-DE" b="1" dirty="0" smtClean="0"/>
+              <a:rPr lang="de-DE" b="1" dirty="0"/>
               <a:t>Population Growth</a:t>
             </a:r>
-            <a:endParaRPr lang="de-DE" b="1" dirty="0"/>
           </a:p>
         </p:txBody>
       </p:sp>
@@ -4240,138 +5195,118 @@
           <a:lstStyle/>
           <a:p>
             <a:r>
-              <a:rPr lang="de-DE" dirty="0" smtClean="0"/>
+              <a:rPr lang="de-DE" dirty="0"/>
               <a:t>After </a:t>
             </a:r>
             <a:r>
-              <a:rPr lang="de-DE" dirty="0" err="1" smtClean="0"/>
+              <a:rPr lang="de-DE" dirty="0" err="1"/>
               <a:t>every</a:t>
             </a:r>
             <a:r>
-              <a:rPr lang="de-DE" dirty="0" smtClean="0"/>
-              <a:t> </a:t>
-            </a:r>
-            <a:r>
-              <a:rPr lang="de-DE" dirty="0" err="1" smtClean="0"/>
+              <a:rPr lang="de-DE" dirty="0"/>
+              <a:t> </a:t>
+            </a:r>
+            <a:r>
+              <a:rPr lang="de-DE" dirty="0" err="1"/>
               <a:t>round</a:t>
             </a:r>
             <a:r>
-              <a:rPr lang="de-DE" dirty="0" smtClean="0"/>
+              <a:rPr lang="de-DE" dirty="0"/>
               <a:t> (2 </a:t>
             </a:r>
             <a:r>
-              <a:rPr lang="de-DE" dirty="0" err="1" smtClean="0"/>
+              <a:rPr lang="de-DE" dirty="0" err="1"/>
               <a:t>turns</a:t>
             </a:r>
             <a:r>
-              <a:rPr lang="de-DE" dirty="0" smtClean="0"/>
+              <a:rPr lang="de-DE" dirty="0"/>
               <a:t> = </a:t>
             </a:r>
             <a:r>
-              <a:rPr lang="de-DE" dirty="0" err="1" smtClean="0"/>
+              <a:rPr lang="de-DE" dirty="0" err="1"/>
               <a:t>one</a:t>
             </a:r>
             <a:r>
-              <a:rPr lang="de-DE" dirty="0" smtClean="0"/>
+              <a:rPr lang="de-DE" dirty="0"/>
               <a:t> turn per bot)</a:t>
             </a:r>
           </a:p>
           <a:p>
             <a:r>
-              <a:rPr lang="de-DE" dirty="0" smtClean="0"/>
+              <a:rPr lang="de-DE" dirty="0"/>
               <a:t>Population </a:t>
             </a:r>
             <a:r>
-              <a:rPr lang="de-DE" dirty="0" err="1" smtClean="0"/>
+              <a:rPr lang="de-DE" dirty="0" err="1"/>
               <a:t>increased</a:t>
             </a:r>
             <a:r>
-              <a:rPr lang="de-DE" dirty="0" smtClean="0"/>
-              <a:t> </a:t>
-            </a:r>
-            <a:r>
-              <a:rPr lang="de-DE" dirty="0" err="1" smtClean="0"/>
+              <a:rPr lang="de-DE" dirty="0"/>
+              <a:t> </a:t>
+            </a:r>
+            <a:r>
+              <a:rPr lang="de-DE" dirty="0" err="1"/>
               <a:t>by</a:t>
             </a:r>
             <a:r>
-              <a:rPr lang="de-DE" dirty="0" smtClean="0"/>
+              <a:rPr lang="de-DE" dirty="0"/>
               <a:t> 10% (</a:t>
             </a:r>
             <a:r>
-              <a:rPr lang="de-DE" dirty="0" err="1" smtClean="0"/>
+              <a:rPr lang="de-DE" dirty="0" err="1"/>
               <a:t>growth</a:t>
             </a:r>
             <a:r>
-              <a:rPr lang="de-DE" dirty="0" smtClean="0"/>
+              <a:rPr lang="de-DE" dirty="0"/>
               <a:t> rate)</a:t>
             </a:r>
           </a:p>
           <a:p>
             <a:r>
-              <a:rPr lang="de-DE" dirty="0" err="1" smtClean="0"/>
+              <a:rPr lang="de-DE" dirty="0" err="1"/>
               <a:t>Rounding</a:t>
             </a:r>
             <a:r>
-              <a:rPr lang="de-DE" dirty="0" smtClean="0"/>
-              <a:t> </a:t>
-            </a:r>
-            <a:r>
-              <a:rPr lang="de-DE" dirty="0" err="1" smtClean="0"/>
+              <a:rPr lang="de-DE" dirty="0"/>
+              <a:t> </a:t>
+            </a:r>
+            <a:r>
+              <a:rPr lang="de-DE" dirty="0" err="1"/>
               <a:t>to</a:t>
             </a:r>
             <a:r>
-              <a:rPr lang="de-DE" dirty="0" smtClean="0"/>
-              <a:t> </a:t>
-            </a:r>
-            <a:r>
-              <a:rPr lang="de-DE" dirty="0" err="1" smtClean="0"/>
+              <a:rPr lang="de-DE" dirty="0"/>
+              <a:t> </a:t>
+            </a:r>
+            <a:r>
+              <a:rPr lang="de-DE" dirty="0" err="1"/>
               <a:t>nearest</a:t>
             </a:r>
             <a:r>
-              <a:rPr lang="de-DE" dirty="0" smtClean="0"/>
-              <a:t> integer (e.g. </a:t>
-            </a:r>
-            <a:r>
-              <a:rPr lang="de-DE" dirty="0"/>
-              <a:t>4</a:t>
-            </a:r>
-            <a:r>
-              <a:rPr lang="de-DE" dirty="0" smtClean="0"/>
-              <a:t>.4 = 4, </a:t>
-            </a:r>
-            <a:r>
-              <a:rPr lang="de-DE" dirty="0"/>
-              <a:t>5</a:t>
-            </a:r>
-            <a:r>
-              <a:rPr lang="de-DE" dirty="0" smtClean="0"/>
-              <a:t>.5 = 6)</a:t>
-            </a:r>
-          </a:p>
-          <a:p>
-            <a:r>
-              <a:rPr lang="de-DE" dirty="0" smtClean="0"/>
+              <a:rPr lang="de-DE" dirty="0"/>
+              <a:t> integer (e.g. 4.4 = 4, 5.5 = 6)</a:t>
+            </a:r>
+          </a:p>
+          <a:p>
+            <a:r>
+              <a:rPr lang="de-DE" dirty="0"/>
               <a:t>Maximum </a:t>
             </a:r>
             <a:r>
-              <a:rPr lang="de-DE" dirty="0" err="1" smtClean="0"/>
+              <a:rPr lang="de-DE" dirty="0" err="1"/>
               <a:t>population</a:t>
             </a:r>
             <a:r>
-              <a:rPr lang="de-DE" dirty="0" smtClean="0"/>
+              <a:rPr lang="de-DE" dirty="0"/>
               <a:t> per </a:t>
             </a:r>
             <a:r>
-              <a:rPr lang="de-DE" dirty="0" err="1" smtClean="0"/>
+              <a:rPr lang="de-DE" dirty="0" err="1"/>
               <a:t>cell</a:t>
             </a:r>
             <a:r>
               <a:rPr lang="de-DE" dirty="0"/>
-              <a:t> </a:t>
-            </a:r>
-            <a:r>
-              <a:rPr lang="de-DE" dirty="0" smtClean="0"/>
-              <a:t>= 100</a:t>
+              <a:t> = 100</a:t>
             </a:r>
           </a:p>
         </p:txBody>
@@ -4483,7 +5418,7 @@
           <a:p>
             <a:pPr algn="ctr"/>
             <a:r>
-              <a:rPr lang="de-DE" b="1" dirty="0" err="1" smtClean="0"/>
+              <a:rPr lang="de-DE" b="1" dirty="0" err="1"/>
               <a:t>Winning</a:t>
             </a:r>
             <a:endParaRPr lang="de-DE" b="1" dirty="0"/>
@@ -4511,48 +5446,48 @@
           <a:lstStyle/>
           <a:p>
             <a:r>
-              <a:rPr lang="de-DE" dirty="0" smtClean="0"/>
+              <a:rPr lang="de-DE" dirty="0"/>
               <a:t>Last </a:t>
             </a:r>
             <a:r>
-              <a:rPr lang="de-DE" dirty="0" err="1" smtClean="0"/>
+              <a:rPr lang="de-DE" dirty="0" err="1"/>
               <a:t>surviving</a:t>
             </a:r>
             <a:r>
-              <a:rPr lang="de-DE" dirty="0" smtClean="0"/>
+              <a:rPr lang="de-DE" dirty="0"/>
               <a:t> bot</a:t>
             </a:r>
           </a:p>
           <a:p>
             <a:r>
-              <a:rPr lang="de-DE" dirty="0" err="1" smtClean="0"/>
+              <a:rPr lang="de-DE" dirty="0" err="1"/>
               <a:t>Or</a:t>
             </a:r>
             <a:r>
-              <a:rPr lang="de-DE" dirty="0" smtClean="0"/>
-              <a:t> </a:t>
-            </a:r>
-            <a:r>
-              <a:rPr lang="de-DE" dirty="0" err="1" smtClean="0"/>
+              <a:rPr lang="de-DE" dirty="0"/>
+              <a:t> </a:t>
+            </a:r>
+            <a:r>
+              <a:rPr lang="de-DE" dirty="0" err="1"/>
               <a:t>highest</a:t>
             </a:r>
             <a:r>
-              <a:rPr lang="de-DE" dirty="0" smtClean="0"/>
+              <a:rPr lang="de-DE" dirty="0"/>
               <a:t> total </a:t>
             </a:r>
             <a:r>
-              <a:rPr lang="de-DE" dirty="0" err="1" smtClean="0"/>
+              <a:rPr lang="de-DE" dirty="0" err="1"/>
               <a:t>population</a:t>
             </a:r>
             <a:r>
-              <a:rPr lang="de-DE" dirty="0" smtClean="0"/>
+              <a:rPr lang="de-DE" dirty="0"/>
               <a:t> after 2000 </a:t>
             </a:r>
             <a:r>
-              <a:rPr lang="de-DE" dirty="0" err="1" smtClean="0"/>
+              <a:rPr lang="de-DE" dirty="0" err="1"/>
               <a:t>rounds</a:t>
             </a:r>
-            <a:endParaRPr lang="de-DE" dirty="0" smtClean="0"/>
+            <a:endParaRPr lang="de-DE" dirty="0"/>
           </a:p>
         </p:txBody>
       </p:sp>
@@ -4708,15 +5643,15 @@
           <a:p>
             <a:pPr algn="ctr"/>
             <a:r>
-              <a:rPr lang="de-DE" b="1" dirty="0" err="1" smtClean="0"/>
+              <a:rPr lang="de-DE" b="1" dirty="0" err="1"/>
               <a:t>Coding</a:t>
             </a:r>
             <a:r>
-              <a:rPr lang="de-DE" b="1" dirty="0" smtClean="0"/>
-              <a:t> </a:t>
-            </a:r>
-            <a:r>
-              <a:rPr lang="de-DE" b="1" dirty="0" err="1" smtClean="0"/>
+              <a:rPr lang="de-DE" b="1" dirty="0"/>
+              <a:t> </a:t>
+            </a:r>
+            <a:r>
+              <a:rPr lang="de-DE" b="1" dirty="0" err="1"/>
               <a:t>Competition</a:t>
             </a:r>
             <a:endParaRPr lang="de-DE" b="1" dirty="0"/>
@@ -4745,97 +5680,93 @@
           <a:p>
             <a:r>
               <a:rPr lang="de-DE" dirty="0"/>
-              <a:t>F</a:t>
-            </a:r>
-            <a:r>
-              <a:rPr lang="de-DE" dirty="0" smtClean="0"/>
-              <a:t>orm </a:t>
-            </a:r>
-            <a:r>
-              <a:rPr lang="de-DE" dirty="0" err="1" smtClean="0"/>
+              <a:t>Form </a:t>
+            </a:r>
+            <a:r>
+              <a:rPr lang="de-DE" dirty="0" err="1"/>
               <a:t>small</a:t>
             </a:r>
             <a:r>
-              <a:rPr lang="de-DE" dirty="0" smtClean="0"/>
-              <a:t> </a:t>
-            </a:r>
-            <a:r>
-              <a:rPr lang="de-DE" dirty="0" err="1" smtClean="0"/>
+              <a:rPr lang="de-DE" dirty="0"/>
+              <a:t> </a:t>
+            </a:r>
+            <a:r>
+              <a:rPr lang="de-DE" dirty="0" err="1"/>
               <a:t>teams</a:t>
             </a:r>
             <a:r>
-              <a:rPr lang="de-DE" dirty="0" smtClean="0"/>
+              <a:rPr lang="de-DE" dirty="0"/>
               <a:t> (</a:t>
             </a:r>
             <a:r>
-              <a:rPr lang="de-DE" dirty="0" err="1" smtClean="0"/>
+              <a:rPr lang="de-DE" dirty="0" err="1"/>
               <a:t>team</a:t>
             </a:r>
             <a:r>
-              <a:rPr lang="de-DE" dirty="0" smtClean="0"/>
+              <a:rPr lang="de-DE" dirty="0"/>
               <a:t> == </a:t>
             </a:r>
             <a:r>
-              <a:rPr lang="de-DE" dirty="0" err="1" smtClean="0"/>
+              <a:rPr lang="de-DE" dirty="0" err="1"/>
               <a:t>more</a:t>
             </a:r>
             <a:r>
-              <a:rPr lang="de-DE" dirty="0" smtClean="0"/>
-              <a:t> </a:t>
-            </a:r>
-            <a:r>
-              <a:rPr lang="de-DE" dirty="0" err="1" smtClean="0"/>
+              <a:rPr lang="de-DE" dirty="0"/>
+              <a:t> </a:t>
+            </a:r>
+            <a:r>
+              <a:rPr lang="de-DE" dirty="0" err="1"/>
               <a:t>than</a:t>
             </a:r>
             <a:r>
-              <a:rPr lang="de-DE" dirty="0" smtClean="0"/>
+              <a:rPr lang="de-DE" dirty="0"/>
               <a:t> 1 </a:t>
             </a:r>
             <a:r>
-              <a:rPr lang="de-DE" dirty="0" err="1" smtClean="0"/>
+              <a:rPr lang="de-DE" dirty="0" err="1"/>
               <a:t>person</a:t>
             </a:r>
             <a:r>
-              <a:rPr lang="de-DE" dirty="0" smtClean="0"/>
+              <a:rPr lang="de-DE" dirty="0"/>
               <a:t> ;))</a:t>
             </a:r>
           </a:p>
           <a:p>
             <a:r>
-              <a:rPr lang="de-DE" dirty="0" smtClean="0"/>
+              <a:rPr lang="de-DE" dirty="0"/>
               <a:t>Register on </a:t>
             </a:r>
             <a:r>
-              <a:rPr lang="de-DE" dirty="0" err="1" smtClean="0"/>
+              <a:rPr lang="de-DE" dirty="0" err="1"/>
               <a:t>the</a:t>
             </a:r>
             <a:r>
-              <a:rPr lang="de-DE" dirty="0" smtClean="0"/>
-              <a:t> </a:t>
-            </a:r>
-            <a:r>
-              <a:rPr lang="de-DE" dirty="0" err="1" smtClean="0"/>
+              <a:rPr lang="de-DE" dirty="0"/>
+              <a:t> </a:t>
+            </a:r>
+            <a:r>
+              <a:rPr lang="de-DE" dirty="0" err="1"/>
               <a:t>GridWars</a:t>
             </a:r>
             <a:r>
-              <a:rPr lang="de-DE" dirty="0" smtClean="0"/>
-              <a:t> </a:t>
-            </a:r>
-            <a:r>
-              <a:rPr lang="de-DE" dirty="0" err="1" smtClean="0"/>
+              <a:rPr lang="de-DE" dirty="0"/>
+              <a:t> </a:t>
+            </a:r>
+            <a:r>
+              <a:rPr lang="de-DE" dirty="0" err="1"/>
               <a:t>platform</a:t>
             </a:r>
             <a:r>
-              <a:rPr lang="de-DE" dirty="0" smtClean="0"/>
+              <a:rPr lang="de-DE" dirty="0"/>
               <a:t>: </a:t>
             </a:r>
             <a:r>
-              <a:rPr lang="de-DE" dirty="0" smtClean="0">
+              <a:rPr lang="de-DE" dirty="0">
                 <a:hlinkClick r:id="rId2"/>
               </a:rPr>
               <a:t>https://gridwars.cern.ch/</a:t>
             </a:r>
-            <a:endParaRPr lang="de-DE" dirty="0" smtClean="0"/>
+            <a:endParaRPr lang="de-DE" dirty="0"/>
           </a:p>
           <a:p>
             <a:pPr lvl="1"/>
@@ -4860,19 +5791,19 @@
               <a:t> per </a:t>
             </a:r>
             <a:r>
-              <a:rPr lang="de-DE" dirty="0" err="1" smtClean="0"/>
+              <a:rPr lang="de-DE" dirty="0" err="1"/>
               <a:t>team</a:t>
             </a:r>
-            <a:endParaRPr lang="de-DE" dirty="0" smtClean="0"/>
+            <a:endParaRPr lang="de-DE" dirty="0"/>
           </a:p>
           <a:p>
             <a:pPr lvl="1"/>
             <a:r>
-              <a:rPr lang="de-DE" dirty="0" smtClean="0"/>
+              <a:rPr lang="de-DE" dirty="0"/>
               <a:t>Registration </a:t>
             </a:r>
             <a:r>
-              <a:rPr lang="de-DE" dirty="0" err="1" smtClean="0"/>
+              <a:rPr lang="de-DE" dirty="0" err="1"/>
               <a:t>password</a:t>
             </a:r>
             <a:r>
@@ -4880,144 +5811,136 @@
               <a:t>: </a:t>
             </a:r>
             <a:r>
-              <a:rPr lang="de-DE" b="1" dirty="0" smtClean="0"/>
+              <a:rPr lang="de-DE" sz="2800" b="1" dirty="0"/>
               <a:t>5pr1ngC4mpu52018!</a:t>
             </a:r>
           </a:p>
           <a:p>
             <a:pPr lvl="1"/>
             <a:r>
-              <a:rPr lang="de-DE" dirty="0" err="1" smtClean="0"/>
+              <a:rPr lang="de-DE" dirty="0" err="1"/>
               <a:t>Please</a:t>
             </a:r>
             <a:r>
-              <a:rPr lang="de-DE" dirty="0" smtClean="0"/>
-              <a:t> </a:t>
-            </a:r>
-            <a:r>
-              <a:rPr lang="de-DE" dirty="0" err="1" smtClean="0"/>
+              <a:rPr lang="de-DE" dirty="0"/>
+              <a:t> </a:t>
+            </a:r>
+            <a:r>
+              <a:rPr lang="de-DE" dirty="0" err="1"/>
               <a:t>provide</a:t>
             </a:r>
             <a:r>
-              <a:rPr lang="de-DE" dirty="0" smtClean="0"/>
+              <a:rPr lang="de-DE" dirty="0"/>
               <a:t> a valid </a:t>
             </a:r>
             <a:r>
-              <a:rPr lang="de-DE" dirty="0" err="1" smtClean="0"/>
+              <a:rPr lang="de-DE" dirty="0" err="1"/>
               <a:t>e-mail</a:t>
             </a:r>
             <a:r>
-              <a:rPr lang="de-DE" dirty="0" smtClean="0"/>
-              <a:t> </a:t>
-            </a:r>
-            <a:r>
-              <a:rPr lang="de-DE" dirty="0" err="1" smtClean="0"/>
+              <a:rPr lang="de-DE" dirty="0"/>
+              <a:t> </a:t>
+            </a:r>
+            <a:r>
+              <a:rPr lang="de-DE" dirty="0" err="1"/>
               <a:t>address</a:t>
             </a:r>
-            <a:endParaRPr lang="de-DE" dirty="0" smtClean="0"/>
-          </a:p>
-          <a:p>
-            <a:r>
-              <a:rPr lang="de-DE" dirty="0" err="1" smtClean="0"/>
+            <a:endParaRPr lang="de-DE" dirty="0"/>
+          </a:p>
+          <a:p>
+            <a:r>
+              <a:rPr lang="de-DE" dirty="0" err="1"/>
               <a:t>Develop</a:t>
             </a:r>
             <a:r>
-              <a:rPr lang="de-DE" dirty="0" smtClean="0"/>
-              <a:t> </a:t>
-            </a:r>
-            <a:r>
-              <a:rPr lang="de-DE" dirty="0" err="1" smtClean="0"/>
+              <a:rPr lang="de-DE" dirty="0"/>
+              <a:t> </a:t>
+            </a:r>
+            <a:r>
+              <a:rPr lang="de-DE" dirty="0" err="1"/>
               <a:t>your</a:t>
             </a:r>
             <a:r>
-              <a:rPr lang="de-DE" dirty="0" smtClean="0"/>
+              <a:rPr lang="de-DE" dirty="0"/>
               <a:t> bot </a:t>
             </a:r>
             <a:r>
-              <a:rPr lang="de-DE" dirty="0" err="1" smtClean="0"/>
+              <a:rPr lang="de-DE" dirty="0" err="1"/>
               <a:t>locally</a:t>
             </a:r>
             <a:r>
-              <a:rPr lang="de-DE" dirty="0" smtClean="0"/>
-              <a:t> an </a:t>
-            </a:r>
-            <a:r>
-              <a:rPr lang="de-DE" dirty="0" err="1" smtClean="0"/>
+              <a:rPr lang="de-DE" dirty="0"/>
+              <a:t> and </a:t>
+            </a:r>
+            <a:r>
+              <a:rPr lang="de-DE" dirty="0" err="1"/>
               <a:t>upload</a:t>
             </a:r>
             <a:r>
-              <a:rPr lang="de-DE" dirty="0" smtClean="0"/>
-              <a:t> </a:t>
-            </a:r>
-            <a:r>
-              <a:rPr lang="de-DE" dirty="0" err="1" smtClean="0"/>
+              <a:rPr lang="de-DE" dirty="0"/>
+              <a:t> </a:t>
+            </a:r>
+            <a:r>
+              <a:rPr lang="de-DE" dirty="0" err="1"/>
               <a:t>it</a:t>
             </a:r>
             <a:r>
-              <a:rPr lang="de-DE" dirty="0" smtClean="0"/>
-              <a:t> </a:t>
-            </a:r>
-            <a:r>
-              <a:rPr lang="de-DE" dirty="0" err="1" smtClean="0"/>
+              <a:rPr lang="de-DE" dirty="0"/>
+              <a:t> </a:t>
+            </a:r>
+            <a:r>
+              <a:rPr lang="de-DE" dirty="0" err="1"/>
               <a:t>to</a:t>
             </a:r>
             <a:r>
-              <a:rPr lang="de-DE" dirty="0" smtClean="0"/>
-              <a:t> </a:t>
-            </a:r>
-            <a:r>
-              <a:rPr lang="de-DE" dirty="0" err="1" smtClean="0"/>
+              <a:rPr lang="de-DE" dirty="0"/>
+              <a:t> </a:t>
+            </a:r>
+            <a:r>
+              <a:rPr lang="de-DE" dirty="0" err="1"/>
               <a:t>compete</a:t>
             </a:r>
             <a:r>
-              <a:rPr lang="de-DE" dirty="0" smtClean="0"/>
-              <a:t> </a:t>
-            </a:r>
-            <a:r>
-              <a:rPr lang="de-DE" dirty="0" err="1" smtClean="0"/>
+              <a:rPr lang="de-DE" dirty="0"/>
+              <a:t> </a:t>
+            </a:r>
+            <a:r>
+              <a:rPr lang="de-DE" dirty="0" err="1"/>
               <a:t>against</a:t>
             </a:r>
             <a:r>
-              <a:rPr lang="de-DE" dirty="0" smtClean="0"/>
-              <a:t> </a:t>
-            </a:r>
-            <a:r>
-              <a:rPr lang="de-DE" dirty="0" err="1" smtClean="0"/>
+              <a:rPr lang="de-DE" dirty="0"/>
+              <a:t> </a:t>
+            </a:r>
+            <a:r>
+              <a:rPr lang="de-DE" dirty="0" err="1"/>
               <a:t>the</a:t>
             </a:r>
             <a:r>
-              <a:rPr lang="de-DE" dirty="0" smtClean="0"/>
-              <a:t> </a:t>
-            </a:r>
-            <a:r>
-              <a:rPr lang="de-DE" dirty="0" err="1" smtClean="0"/>
-              <a:t>bots</a:t>
-            </a:r>
-            <a:r>
-              <a:rPr lang="de-DE" dirty="0" smtClean="0"/>
-              <a:t> </a:t>
-            </a:r>
-            <a:r>
-              <a:rPr lang="de-DE" dirty="0" err="1" smtClean="0"/>
+              <a:rPr lang="de-DE" dirty="0"/>
+              <a:t> bots </a:t>
+            </a:r>
+            <a:r>
+              <a:rPr lang="de-DE" dirty="0" err="1"/>
               <a:t>of</a:t>
             </a:r>
             <a:r>
-              <a:rPr lang="de-DE" dirty="0" smtClean="0"/>
-              <a:t> </a:t>
-            </a:r>
-            <a:r>
-              <a:rPr lang="de-DE" dirty="0" err="1" smtClean="0"/>
+              <a:rPr lang="de-DE" dirty="0"/>
+              <a:t> </a:t>
+            </a:r>
+            <a:r>
+              <a:rPr lang="de-DE" dirty="0" err="1"/>
               <a:t>other</a:t>
             </a:r>
             <a:r>
-              <a:rPr lang="de-DE" dirty="0" smtClean="0"/>
-              <a:t> </a:t>
-            </a:r>
-            <a:r>
-              <a:rPr lang="de-DE" dirty="0" err="1" smtClean="0"/>
+              <a:rPr lang="de-DE" dirty="0"/>
+              <a:t> </a:t>
+            </a:r>
+            <a:r>
+              <a:rPr lang="de-DE" dirty="0" err="1"/>
               <a:t>teams</a:t>
             </a:r>
-            <a:endParaRPr lang="de-DE" dirty="0" smtClean="0"/>
+            <a:endParaRPr lang="de-DE" dirty="0"/>
           </a:p>
         </p:txBody>
       </p:sp>
@@ -5068,10 +5991,9 @@
           <a:p>
             <a:pPr algn="ctr"/>
             <a:r>
-              <a:rPr lang="de-DE" b="1" dirty="0" smtClean="0"/>
+              <a:rPr lang="de-DE" b="1" dirty="0"/>
               <a:t>Bot Development</a:t>
             </a:r>
-            <a:endParaRPr lang="de-DE" b="1" dirty="0"/>
           </a:p>
         </p:txBody>
       </p:sp>
@@ -5123,392 +6045,342 @@
               <a:rPr lang="de-DE" dirty="0">
                 <a:hlinkClick r:id="rId2"/>
               </a:rPr>
-              <a:t>https://</a:t>
-            </a:r>
-            <a:r>
-              <a:rPr lang="de-DE" dirty="0" smtClean="0">
-                <a:hlinkClick r:id="rId2"/>
-              </a:rPr>
-              <a:t>gridwars.cern.ch/docs/getting-started</a:t>
-            </a:r>
-            <a:endParaRPr lang="de-DE" dirty="0" smtClean="0"/>
-          </a:p>
-          <a:p>
-            <a:r>
-              <a:rPr lang="de-DE" dirty="0" err="1" smtClean="0"/>
+              <a:t>https://gridwars.cern.ch/docs/getting-started</a:t>
+            </a:r>
+            <a:endParaRPr lang="de-DE" dirty="0"/>
+          </a:p>
+          <a:p>
+            <a:r>
+              <a:rPr lang="de-DE" dirty="0" err="1"/>
               <a:t>Programming</a:t>
             </a:r>
             <a:r>
-              <a:rPr lang="de-DE" dirty="0" smtClean="0"/>
-              <a:t> </a:t>
-            </a:r>
-            <a:r>
-              <a:rPr lang="de-DE" dirty="0" err="1" smtClean="0"/>
+              <a:rPr lang="de-DE" dirty="0"/>
+              <a:t> </a:t>
+            </a:r>
+            <a:r>
+              <a:rPr lang="de-DE" dirty="0" err="1"/>
               <a:t>language</a:t>
             </a:r>
             <a:r>
-              <a:rPr lang="de-DE" dirty="0" smtClean="0"/>
+              <a:rPr lang="de-DE" dirty="0"/>
               <a:t>: Java 8</a:t>
             </a:r>
           </a:p>
           <a:p>
             <a:r>
-              <a:rPr lang="de-DE" dirty="0" smtClean="0"/>
+              <a:rPr lang="de-DE" dirty="0"/>
               <a:t>Bots </a:t>
             </a:r>
             <a:r>
-              <a:rPr lang="de-DE" dirty="0" err="1" smtClean="0"/>
+              <a:rPr lang="de-DE" dirty="0" err="1"/>
               <a:t>are</a:t>
             </a:r>
             <a:r>
-              <a:rPr lang="de-DE" dirty="0" smtClean="0"/>
-              <a:t> </a:t>
-            </a:r>
-            <a:r>
-              <a:rPr lang="de-DE" dirty="0" err="1" smtClean="0"/>
+              <a:rPr lang="de-DE" dirty="0"/>
+              <a:t> </a:t>
+            </a:r>
+            <a:r>
+              <a:rPr lang="de-DE" dirty="0" err="1"/>
               <a:t>packaged</a:t>
             </a:r>
             <a:r>
-              <a:rPr lang="de-DE" dirty="0" smtClean="0"/>
-              <a:t> </a:t>
-            </a:r>
-            <a:r>
-              <a:rPr lang="de-DE" dirty="0" err="1" smtClean="0"/>
+              <a:rPr lang="de-DE" dirty="0"/>
+              <a:t> </a:t>
+            </a:r>
+            <a:r>
+              <a:rPr lang="de-DE" dirty="0" err="1"/>
               <a:t>and</a:t>
             </a:r>
             <a:r>
-              <a:rPr lang="de-DE" dirty="0" smtClean="0"/>
-              <a:t> </a:t>
-            </a:r>
-            <a:r>
-              <a:rPr lang="de-DE" dirty="0" err="1" smtClean="0"/>
+              <a:rPr lang="de-DE" dirty="0"/>
+              <a:t> </a:t>
+            </a:r>
+            <a:r>
+              <a:rPr lang="de-DE" dirty="0" err="1"/>
               <a:t>uploaded</a:t>
             </a:r>
             <a:r>
-              <a:rPr lang="de-DE" dirty="0" smtClean="0"/>
-              <a:t> </a:t>
-            </a:r>
-            <a:r>
-              <a:rPr lang="de-DE" dirty="0" err="1" smtClean="0"/>
+              <a:rPr lang="de-DE" dirty="0"/>
+              <a:t> </a:t>
+            </a:r>
+            <a:r>
+              <a:rPr lang="de-DE" dirty="0" err="1"/>
               <a:t>as</a:t>
             </a:r>
             <a:r>
-              <a:rPr lang="de-DE" dirty="0" smtClean="0"/>
+              <a:rPr lang="de-DE" dirty="0"/>
               <a:t> Java </a:t>
             </a:r>
             <a:r>
-              <a:rPr lang="de-DE" dirty="0" err="1" smtClean="0"/>
+              <a:rPr lang="de-DE" dirty="0" err="1"/>
               <a:t>jar</a:t>
             </a:r>
             <a:r>
-              <a:rPr lang="de-DE" dirty="0" smtClean="0"/>
-              <a:t> </a:t>
-            </a:r>
-            <a:r>
-              <a:rPr lang="de-DE" dirty="0" err="1" smtClean="0"/>
+              <a:rPr lang="de-DE" dirty="0"/>
+              <a:t> </a:t>
+            </a:r>
+            <a:r>
+              <a:rPr lang="de-DE" dirty="0" err="1"/>
               <a:t>files</a:t>
             </a:r>
-            <a:endParaRPr lang="de-DE" dirty="0" smtClean="0"/>
+            <a:endParaRPr lang="de-DE" dirty="0"/>
+          </a:p>
+          <a:p>
+            <a:r>
+              <a:rPr lang="de-DE" dirty="0"/>
+              <a:t>Server will </a:t>
+            </a:r>
+            <a:r>
+              <a:rPr lang="de-DE" dirty="0" err="1"/>
+              <a:t>generate</a:t>
+            </a:r>
+            <a:r>
+              <a:rPr lang="de-DE" dirty="0"/>
+              <a:t> and </a:t>
+            </a:r>
+            <a:r>
+              <a:rPr lang="de-DE" dirty="0" err="1"/>
+              <a:t>play</a:t>
+            </a:r>
+            <a:r>
+              <a:rPr lang="de-DE" dirty="0"/>
+              <a:t> </a:t>
+            </a:r>
+            <a:r>
+              <a:rPr lang="de-DE" dirty="0" err="1"/>
+              <a:t>matches</a:t>
+            </a:r>
+            <a:r>
+              <a:rPr lang="de-DE" dirty="0"/>
+              <a:t> </a:t>
+            </a:r>
+            <a:r>
+              <a:rPr lang="de-DE" dirty="0" err="1"/>
+              <a:t>against</a:t>
+            </a:r>
+            <a:r>
+              <a:rPr lang="de-DE" dirty="0"/>
+              <a:t> all </a:t>
+            </a:r>
+            <a:r>
+              <a:rPr lang="de-DE" dirty="0" err="1"/>
+              <a:t>other</a:t>
+            </a:r>
+            <a:r>
+              <a:rPr lang="de-DE" dirty="0"/>
+              <a:t> bots on </a:t>
+            </a:r>
+            <a:r>
+              <a:rPr lang="de-DE" dirty="0" err="1"/>
+              <a:t>upload</a:t>
+            </a:r>
+            <a:endParaRPr lang="de-DE" dirty="0"/>
+          </a:p>
+          <a:p>
+            <a:r>
+              <a:rPr lang="de-DE" dirty="0" err="1"/>
+              <a:t>Only</a:t>
+            </a:r>
+            <a:r>
+              <a:rPr lang="de-DE" dirty="0"/>
+              <a:t> </a:t>
+            </a:r>
+            <a:r>
+              <a:rPr lang="de-DE" dirty="0" err="1"/>
+              <a:t>one</a:t>
+            </a:r>
+            <a:r>
+              <a:rPr lang="de-DE" dirty="0"/>
+              <a:t> </a:t>
+            </a:r>
+            <a:r>
+              <a:rPr lang="de-DE" dirty="0" err="1"/>
+              <a:t>active</a:t>
+            </a:r>
+            <a:r>
+              <a:rPr lang="de-DE" dirty="0"/>
+              <a:t> bot at a time, will </a:t>
+            </a:r>
+            <a:r>
+              <a:rPr lang="de-DE" dirty="0" err="1"/>
+              <a:t>be</a:t>
+            </a:r>
+            <a:r>
+              <a:rPr lang="de-DE" dirty="0"/>
+              <a:t> </a:t>
+            </a:r>
+            <a:r>
+              <a:rPr lang="de-DE" dirty="0" err="1"/>
+              <a:t>replace</a:t>
+            </a:r>
+            <a:r>
+              <a:rPr lang="de-DE" dirty="0"/>
+              <a:t> </a:t>
+            </a:r>
+            <a:r>
+              <a:rPr lang="de-DE" dirty="0" err="1"/>
+              <a:t>with</a:t>
+            </a:r>
+            <a:r>
+              <a:rPr lang="de-DE" dirty="0"/>
+              <a:t> </a:t>
+            </a:r>
+            <a:r>
+              <a:rPr lang="de-DE" dirty="0" err="1"/>
+              <a:t>new</a:t>
+            </a:r>
+            <a:r>
+              <a:rPr lang="de-DE" dirty="0"/>
+              <a:t> </a:t>
+            </a:r>
+            <a:r>
+              <a:rPr lang="de-DE" dirty="0" err="1"/>
+              <a:t>upload</a:t>
+            </a:r>
+            <a:endParaRPr lang="de-DE" dirty="0"/>
           </a:p>
           <a:p>
             <a:pPr lvl="1"/>
             <a:r>
-              <a:rPr lang="de-DE" dirty="0" smtClean="0"/>
-              <a:t>1 bot = 1 </a:t>
-            </a:r>
-            <a:r>
-              <a:rPr lang="de-DE" dirty="0" err="1" smtClean="0"/>
-              <a:t>jar</a:t>
-            </a:r>
-            <a:r>
-              <a:rPr lang="de-DE" dirty="0" smtClean="0"/>
-              <a:t> </a:t>
-            </a:r>
-            <a:r>
-              <a:rPr lang="de-DE" dirty="0" err="1" smtClean="0"/>
-              <a:t>file</a:t>
-            </a:r>
-            <a:endParaRPr lang="de-DE" dirty="0" smtClean="0"/>
-          </a:p>
-          <a:p>
-            <a:r>
-              <a:rPr lang="de-DE" dirty="0" smtClean="0"/>
-              <a:t>Server will </a:t>
-            </a:r>
-            <a:r>
-              <a:rPr lang="de-DE" dirty="0" err="1" smtClean="0"/>
-              <a:t>generate</a:t>
-            </a:r>
-            <a:r>
-              <a:rPr lang="de-DE" dirty="0" smtClean="0"/>
-              <a:t> </a:t>
-            </a:r>
-            <a:r>
-              <a:rPr lang="de-DE" dirty="0" err="1" smtClean="0"/>
-              <a:t>and</a:t>
-            </a:r>
-            <a:r>
-              <a:rPr lang="de-DE" dirty="0" smtClean="0"/>
-              <a:t> </a:t>
-            </a:r>
-            <a:r>
-              <a:rPr lang="de-DE" dirty="0" err="1" smtClean="0"/>
-              <a:t>play</a:t>
-            </a:r>
-            <a:r>
-              <a:rPr lang="de-DE" dirty="0" smtClean="0"/>
-              <a:t> </a:t>
-            </a:r>
-            <a:r>
-              <a:rPr lang="de-DE" dirty="0" err="1" smtClean="0"/>
-              <a:t>matches</a:t>
-            </a:r>
-            <a:r>
-              <a:rPr lang="de-DE" dirty="0" smtClean="0"/>
-              <a:t> </a:t>
-            </a:r>
-            <a:r>
-              <a:rPr lang="de-DE" dirty="0" err="1" smtClean="0"/>
-              <a:t>against</a:t>
-            </a:r>
-            <a:r>
-              <a:rPr lang="de-DE" dirty="0" smtClean="0"/>
-              <a:t> all </a:t>
-            </a:r>
-            <a:r>
-              <a:rPr lang="de-DE" dirty="0" err="1" smtClean="0"/>
-              <a:t>other</a:t>
-            </a:r>
-            <a:r>
-              <a:rPr lang="de-DE" dirty="0" smtClean="0"/>
-              <a:t> </a:t>
-            </a:r>
-            <a:r>
-              <a:rPr lang="de-DE" dirty="0" err="1" smtClean="0"/>
-              <a:t>bots</a:t>
-            </a:r>
-            <a:r>
-              <a:rPr lang="de-DE" dirty="0" smtClean="0"/>
-              <a:t> on </a:t>
-            </a:r>
-            <a:r>
-              <a:rPr lang="de-DE" dirty="0" err="1" smtClean="0"/>
+              <a:rPr lang="de-DE" dirty="0" err="1"/>
+              <a:t>You</a:t>
+            </a:r>
+            <a:r>
+              <a:rPr lang="de-DE" dirty="0"/>
+              <a:t> </a:t>
+            </a:r>
+            <a:r>
+              <a:rPr lang="de-DE" dirty="0" err="1"/>
+              <a:t>can</a:t>
+            </a:r>
+            <a:r>
+              <a:rPr lang="de-DE" dirty="0"/>
+              <a:t> </a:t>
+            </a:r>
+            <a:r>
+              <a:rPr lang="de-DE" dirty="0" err="1"/>
               <a:t>upload</a:t>
             </a:r>
-            <a:endParaRPr lang="de-DE" dirty="0" smtClean="0"/>
-          </a:p>
-          <a:p>
-            <a:r>
-              <a:rPr lang="de-DE" dirty="0" err="1" smtClean="0"/>
-              <a:t>Only</a:t>
-            </a:r>
-            <a:r>
-              <a:rPr lang="de-DE" dirty="0" smtClean="0"/>
-              <a:t> </a:t>
-            </a:r>
-            <a:r>
-              <a:rPr lang="de-DE" dirty="0" err="1" smtClean="0"/>
-              <a:t>one</a:t>
-            </a:r>
-            <a:r>
-              <a:rPr lang="de-DE" dirty="0" smtClean="0"/>
-              <a:t> </a:t>
-            </a:r>
-            <a:r>
-              <a:rPr lang="de-DE" dirty="0" err="1" smtClean="0"/>
-              <a:t>active</a:t>
-            </a:r>
-            <a:r>
-              <a:rPr lang="de-DE" dirty="0" smtClean="0"/>
-              <a:t> bot per </a:t>
-            </a:r>
-            <a:r>
-              <a:rPr lang="de-DE" dirty="0" err="1" smtClean="0"/>
-              <a:t>team</a:t>
-            </a:r>
-            <a:r>
-              <a:rPr lang="de-DE" dirty="0" smtClean="0"/>
-              <a:t>, will </a:t>
-            </a:r>
-            <a:r>
-              <a:rPr lang="de-DE" dirty="0" err="1" smtClean="0"/>
-              <a:t>be</a:t>
-            </a:r>
-            <a:r>
-              <a:rPr lang="de-DE" dirty="0" smtClean="0"/>
-              <a:t> </a:t>
-            </a:r>
-            <a:r>
-              <a:rPr lang="de-DE" dirty="0" err="1" smtClean="0"/>
-              <a:t>replace</a:t>
-            </a:r>
-            <a:r>
-              <a:rPr lang="de-DE" dirty="0" smtClean="0"/>
-              <a:t> </a:t>
-            </a:r>
-            <a:r>
-              <a:rPr lang="de-DE" dirty="0" err="1" smtClean="0"/>
-              <a:t>with</a:t>
-            </a:r>
-            <a:r>
-              <a:rPr lang="de-DE" dirty="0" smtClean="0"/>
-              <a:t> </a:t>
-            </a:r>
-            <a:r>
-              <a:rPr lang="de-DE" dirty="0" err="1" smtClean="0"/>
+            <a:r>
+              <a:rPr lang="de-DE" dirty="0"/>
+              <a:t> </a:t>
+            </a:r>
+            <a:r>
+              <a:rPr lang="de-DE" dirty="0" err="1"/>
               <a:t>new</a:t>
             </a:r>
             <a:r>
-              <a:rPr lang="de-DE" dirty="0" smtClean="0"/>
-              <a:t> </a:t>
-            </a:r>
-            <a:r>
-              <a:rPr lang="de-DE" dirty="0" err="1" smtClean="0"/>
+              <a:rPr lang="de-DE" dirty="0"/>
+              <a:t> </a:t>
+            </a:r>
+            <a:r>
+              <a:rPr lang="de-DE" dirty="0" err="1"/>
+              <a:t>versions</a:t>
+            </a:r>
+            <a:r>
+              <a:rPr lang="de-DE" dirty="0"/>
+              <a:t> </a:t>
+            </a:r>
+            <a:r>
+              <a:rPr lang="de-DE" dirty="0" err="1"/>
+              <a:t>your</a:t>
+            </a:r>
+            <a:r>
+              <a:rPr lang="de-DE" dirty="0"/>
+              <a:t> bot </a:t>
+            </a:r>
+            <a:r>
+              <a:rPr lang="de-DE" dirty="0" err="1"/>
+              <a:t>as</a:t>
+            </a:r>
+            <a:r>
+              <a:rPr lang="de-DE" dirty="0"/>
+              <a:t> </a:t>
+            </a:r>
+            <a:r>
+              <a:rPr lang="de-DE" dirty="0" err="1"/>
+              <a:t>often</a:t>
+            </a:r>
+            <a:r>
+              <a:rPr lang="de-DE" dirty="0"/>
+              <a:t> </a:t>
+            </a:r>
+            <a:r>
+              <a:rPr lang="de-DE" dirty="0" err="1"/>
+              <a:t>as</a:t>
+            </a:r>
+            <a:r>
+              <a:rPr lang="de-DE" dirty="0"/>
+              <a:t> </a:t>
+            </a:r>
+            <a:r>
+              <a:rPr lang="de-DE" dirty="0" err="1"/>
+              <a:t>you</a:t>
+            </a:r>
+            <a:r>
+              <a:rPr lang="de-DE" dirty="0"/>
+              <a:t> </a:t>
+            </a:r>
+            <a:r>
+              <a:rPr lang="de-DE" dirty="0" err="1"/>
+              <a:t>want</a:t>
+            </a:r>
+            <a:endParaRPr lang="de-DE" dirty="0"/>
+          </a:p>
+          <a:p>
+            <a:r>
+              <a:rPr lang="de-DE" dirty="0"/>
+              <a:t>Final bot </a:t>
+            </a:r>
+            <a:r>
+              <a:rPr lang="de-DE" dirty="0" err="1"/>
               <a:t>upload</a:t>
             </a:r>
-            <a:endParaRPr lang="de-DE" dirty="0" smtClean="0"/>
-          </a:p>
-          <a:p>
-            <a:pPr lvl="1"/>
-            <a:r>
-              <a:rPr lang="de-DE" dirty="0" err="1"/>
-              <a:t>You</a:t>
-            </a:r>
-            <a:r>
-              <a:rPr lang="de-DE" dirty="0"/>
-              <a:t> </a:t>
-            </a:r>
-            <a:r>
-              <a:rPr lang="de-DE" dirty="0" err="1"/>
-              <a:t>can</a:t>
-            </a:r>
-            <a:r>
-              <a:rPr lang="de-DE" dirty="0"/>
-              <a:t> </a:t>
-            </a:r>
-            <a:r>
-              <a:rPr lang="de-DE" dirty="0" err="1"/>
-              <a:t>upload</a:t>
-            </a:r>
-            <a:r>
-              <a:rPr lang="de-DE" dirty="0"/>
-              <a:t> </a:t>
-            </a:r>
-            <a:r>
-              <a:rPr lang="de-DE" dirty="0" err="1"/>
-              <a:t>new</a:t>
-            </a:r>
-            <a:r>
-              <a:rPr lang="de-DE" dirty="0"/>
-              <a:t> </a:t>
-            </a:r>
-            <a:r>
-              <a:rPr lang="de-DE" dirty="0" err="1"/>
-              <a:t>versions</a:t>
-            </a:r>
-            <a:r>
-              <a:rPr lang="de-DE" dirty="0"/>
-              <a:t> </a:t>
-            </a:r>
-            <a:r>
-              <a:rPr lang="de-DE" dirty="0" err="1"/>
-              <a:t>your</a:t>
-            </a:r>
-            <a:r>
-              <a:rPr lang="de-DE" dirty="0"/>
-              <a:t> bot </a:t>
-            </a:r>
-            <a:r>
-              <a:rPr lang="de-DE" dirty="0" err="1"/>
-              <a:t>as</a:t>
-            </a:r>
-            <a:r>
-              <a:rPr lang="de-DE" dirty="0"/>
-              <a:t> </a:t>
-            </a:r>
-            <a:r>
-              <a:rPr lang="de-DE" dirty="0" err="1"/>
-              <a:t>often</a:t>
-            </a:r>
-            <a:r>
-              <a:rPr lang="de-DE" dirty="0"/>
-              <a:t> </a:t>
-            </a:r>
-            <a:r>
-              <a:rPr lang="de-DE" dirty="0" err="1"/>
-              <a:t>as</a:t>
-            </a:r>
-            <a:r>
-              <a:rPr lang="de-DE" dirty="0"/>
-              <a:t> </a:t>
-            </a:r>
-            <a:r>
-              <a:rPr lang="de-DE" dirty="0" err="1"/>
-              <a:t>you</a:t>
-            </a:r>
-            <a:r>
-              <a:rPr lang="de-DE" dirty="0"/>
-              <a:t> </a:t>
-            </a:r>
-            <a:r>
-              <a:rPr lang="de-DE" dirty="0" err="1" smtClean="0"/>
-              <a:t>want</a:t>
-            </a:r>
-            <a:endParaRPr lang="de-DE" dirty="0" smtClean="0"/>
-          </a:p>
-          <a:p>
-            <a:r>
-              <a:rPr lang="de-DE" dirty="0" smtClean="0"/>
-              <a:t>Final bot </a:t>
-            </a:r>
-            <a:r>
-              <a:rPr lang="de-DE" dirty="0" err="1" smtClean="0"/>
-              <a:t>upload</a:t>
-            </a:r>
-            <a:r>
-              <a:rPr lang="de-DE" dirty="0" smtClean="0"/>
-              <a:t> </a:t>
-            </a:r>
-            <a:r>
-              <a:rPr lang="de-DE" dirty="0" err="1" smtClean="0"/>
+            <a:r>
+              <a:rPr lang="de-DE" dirty="0"/>
+              <a:t> </a:t>
+            </a:r>
+            <a:r>
+              <a:rPr lang="de-DE" dirty="0" err="1"/>
               <a:t>deadline</a:t>
             </a:r>
             <a:r>
-              <a:rPr lang="de-DE" dirty="0" smtClean="0"/>
+              <a:rPr lang="de-DE" dirty="0"/>
               <a:t> at </a:t>
             </a:r>
             <a:r>
-              <a:rPr lang="de-DE" dirty="0" err="1" smtClean="0"/>
+              <a:rPr lang="de-DE" dirty="0" err="1"/>
               <a:t>the</a:t>
             </a:r>
             <a:r>
-              <a:rPr lang="de-DE" dirty="0" smtClean="0"/>
+              <a:rPr lang="de-DE" dirty="0"/>
               <a:t> end </a:t>
             </a:r>
             <a:r>
-              <a:rPr lang="de-DE" dirty="0" err="1" smtClean="0"/>
+              <a:rPr lang="de-DE" dirty="0" err="1"/>
               <a:t>of</a:t>
             </a:r>
             <a:r>
-              <a:rPr lang="de-DE" dirty="0" smtClean="0"/>
-              <a:t> </a:t>
-            </a:r>
-            <a:r>
-              <a:rPr lang="de-DE" dirty="0" err="1" smtClean="0"/>
+              <a:rPr lang="de-DE" dirty="0"/>
+              <a:t> </a:t>
+            </a:r>
+            <a:r>
+              <a:rPr lang="de-DE" dirty="0" err="1"/>
               <a:t>the</a:t>
             </a:r>
             <a:r>
-              <a:rPr lang="de-DE" dirty="0" smtClean="0"/>
-              <a:t> </a:t>
-            </a:r>
-            <a:r>
-              <a:rPr lang="de-DE" dirty="0" err="1" smtClean="0"/>
+              <a:rPr lang="de-DE" dirty="0"/>
+              <a:t> </a:t>
+            </a:r>
+            <a:r>
+              <a:rPr lang="de-DE" dirty="0" err="1"/>
               <a:t>competition</a:t>
             </a:r>
-            <a:endParaRPr lang="de-DE" dirty="0" smtClean="0"/>
-          </a:p>
-          <a:p>
-            <a:endParaRPr lang="de-DE" dirty="0" smtClean="0"/>
+            <a:endParaRPr lang="de-DE" dirty="0"/>
+          </a:p>
+          <a:p>
+            <a:endParaRPr lang="de-DE" dirty="0"/>
           </a:p>
         </p:txBody>
       </p:sp>
@@ -5559,10 +6431,9 @@
           <a:p>
             <a:pPr algn="ctr"/>
             <a:r>
-              <a:rPr lang="de-DE" b="1" dirty="0" smtClean="0"/>
-              <a:t>Schedule</a:t>
-            </a:r>
-            <a:endParaRPr lang="de-DE" b="1" dirty="0"/>
+              <a:rPr lang="de-DE" b="1" dirty="0"/>
+              <a:t>Bot Development</a:t>
+            </a:r>
           </a:p>
         </p:txBody>
       </p:sp>
@@ -5587,21 +6458,393 @@
           <a:lstStyle/>
           <a:p>
             <a:r>
-              <a:rPr lang="de-DE" dirty="0" smtClean="0"/>
-              <a:t>FILL </a:t>
-            </a:r>
-            <a:r>
-              <a:rPr lang="de-DE" dirty="0" err="1" smtClean="0"/>
-              <a:t>me</a:t>
-            </a:r>
-            <a:endParaRPr lang="de-DE" dirty="0" smtClean="0"/>
+              <a:rPr lang="de-DE" dirty="0"/>
+              <a:t>Do I </a:t>
+            </a:r>
+            <a:r>
+              <a:rPr lang="de-DE" dirty="0" err="1"/>
+              <a:t>need</a:t>
+            </a:r>
+            <a:r>
+              <a:rPr lang="de-DE" dirty="0"/>
+              <a:t> </a:t>
+            </a:r>
+            <a:r>
+              <a:rPr lang="de-DE" dirty="0" err="1"/>
+              <a:t>awesome</a:t>
+            </a:r>
+            <a:r>
+              <a:rPr lang="de-DE" dirty="0"/>
+              <a:t> </a:t>
+            </a:r>
+            <a:r>
+              <a:rPr lang="de-DE" dirty="0" err="1"/>
+              <a:t>programming</a:t>
+            </a:r>
+            <a:r>
+              <a:rPr lang="de-DE" dirty="0"/>
+              <a:t> </a:t>
+            </a:r>
+            <a:r>
+              <a:rPr lang="de-DE" dirty="0" err="1"/>
+              <a:t>skills</a:t>
+            </a:r>
+            <a:r>
+              <a:rPr lang="de-DE" dirty="0"/>
+              <a:t>?</a:t>
+            </a:r>
+          </a:p>
+          <a:p>
+            <a:pPr lvl="1"/>
+            <a:r>
+              <a:rPr lang="de-DE" dirty="0"/>
+              <a:t>Basic </a:t>
+            </a:r>
+            <a:r>
+              <a:rPr lang="de-DE" dirty="0" err="1"/>
+              <a:t>programming</a:t>
+            </a:r>
+            <a:r>
+              <a:rPr lang="de-DE" dirty="0"/>
+              <a:t> </a:t>
+            </a:r>
+            <a:r>
+              <a:rPr lang="de-DE" dirty="0" err="1"/>
+              <a:t>knowledge</a:t>
+            </a:r>
+            <a:r>
+              <a:rPr lang="de-DE" dirty="0"/>
+              <a:t> </a:t>
+            </a:r>
+            <a:r>
+              <a:rPr lang="de-DE" dirty="0" err="1"/>
+              <a:t>is</a:t>
+            </a:r>
+            <a:r>
+              <a:rPr lang="de-DE" dirty="0"/>
+              <a:t> </a:t>
+            </a:r>
+            <a:r>
+              <a:rPr lang="de-DE" dirty="0" err="1"/>
+              <a:t>enough</a:t>
+            </a:r>
+            <a:endParaRPr lang="de-DE" dirty="0"/>
+          </a:p>
+          <a:p>
+            <a:pPr lvl="1"/>
+            <a:r>
+              <a:rPr lang="de-DE" dirty="0"/>
+              <a:t>Simple </a:t>
+            </a:r>
+            <a:r>
+              <a:rPr lang="de-DE" dirty="0" err="1"/>
+              <a:t>examples</a:t>
+            </a:r>
+            <a:r>
+              <a:rPr lang="de-DE" dirty="0"/>
+              <a:t> </a:t>
+            </a:r>
+            <a:r>
+              <a:rPr lang="de-DE" dirty="0" err="1"/>
+              <a:t>are</a:t>
+            </a:r>
+            <a:r>
+              <a:rPr lang="de-DE" dirty="0"/>
+              <a:t> </a:t>
+            </a:r>
+            <a:r>
+              <a:rPr lang="de-DE" dirty="0" err="1"/>
+              <a:t>provided</a:t>
+            </a:r>
+            <a:endParaRPr lang="de-DE" dirty="0"/>
+          </a:p>
+          <a:p>
+            <a:pPr lvl="1"/>
+            <a:r>
+              <a:rPr lang="de-DE" dirty="0" err="1"/>
+              <a:t>Opportunity</a:t>
+            </a:r>
+            <a:r>
+              <a:rPr lang="de-DE" dirty="0"/>
+              <a:t> </a:t>
+            </a:r>
+            <a:r>
+              <a:rPr lang="de-DE" dirty="0" err="1"/>
+              <a:t>to</a:t>
+            </a:r>
+            <a:r>
+              <a:rPr lang="de-DE" dirty="0"/>
+              <a:t> </a:t>
+            </a:r>
+            <a:r>
+              <a:rPr lang="de-DE" dirty="0" err="1"/>
+              <a:t>learn</a:t>
+            </a:r>
+            <a:endParaRPr lang="de-DE" dirty="0"/>
+          </a:p>
+          <a:p>
+            <a:r>
+              <a:rPr lang="de-DE" dirty="0" err="1"/>
+              <a:t>What</a:t>
+            </a:r>
+            <a:r>
+              <a:rPr lang="de-DE" dirty="0"/>
+              <a:t> </a:t>
+            </a:r>
+            <a:r>
+              <a:rPr lang="de-DE" dirty="0" err="1"/>
+              <a:t>if</a:t>
+            </a:r>
+            <a:r>
+              <a:rPr lang="de-DE" dirty="0"/>
+              <a:t> I </a:t>
+            </a:r>
+            <a:r>
+              <a:rPr lang="de-DE" dirty="0" err="1"/>
+              <a:t>can‘t</a:t>
+            </a:r>
+            <a:r>
+              <a:rPr lang="de-DE" dirty="0"/>
+              <a:t> </a:t>
+            </a:r>
+            <a:r>
+              <a:rPr lang="de-DE" dirty="0" err="1"/>
+              <a:t>programm</a:t>
+            </a:r>
+            <a:r>
+              <a:rPr lang="de-DE" dirty="0"/>
+              <a:t> at all?</a:t>
+            </a:r>
+          </a:p>
+          <a:p>
+            <a:pPr lvl="1"/>
+            <a:r>
+              <a:rPr lang="de-DE" dirty="0"/>
+              <a:t>Find </a:t>
+            </a:r>
+            <a:r>
+              <a:rPr lang="de-DE" dirty="0" err="1"/>
+              <a:t>team</a:t>
+            </a:r>
+            <a:r>
+              <a:rPr lang="de-DE" dirty="0"/>
+              <a:t> </a:t>
+            </a:r>
+            <a:r>
+              <a:rPr lang="de-DE" dirty="0" err="1"/>
+              <a:t>with</a:t>
+            </a:r>
+            <a:r>
+              <a:rPr lang="de-DE" dirty="0"/>
+              <a:t> </a:t>
+            </a:r>
+            <a:r>
+              <a:rPr lang="de-DE" dirty="0" err="1"/>
+              <a:t>someone</a:t>
+            </a:r>
+            <a:r>
+              <a:rPr lang="de-DE" dirty="0"/>
+              <a:t> </a:t>
+            </a:r>
+            <a:r>
+              <a:rPr lang="de-DE" dirty="0" err="1"/>
+              <a:t>who</a:t>
+            </a:r>
+            <a:r>
+              <a:rPr lang="de-DE" dirty="0"/>
+              <a:t> </a:t>
+            </a:r>
+            <a:r>
+              <a:rPr lang="de-DE" dirty="0" err="1"/>
+              <a:t>knows</a:t>
+            </a:r>
+            <a:r>
+              <a:rPr lang="de-DE" dirty="0"/>
+              <a:t> </a:t>
+            </a:r>
+            <a:r>
+              <a:rPr lang="de-DE" dirty="0" err="1"/>
+              <a:t>how</a:t>
+            </a:r>
+            <a:r>
+              <a:rPr lang="de-DE" dirty="0"/>
+              <a:t> </a:t>
+            </a:r>
+            <a:r>
+              <a:rPr lang="de-DE" dirty="0" err="1"/>
+              <a:t>to</a:t>
+            </a:r>
+            <a:endParaRPr lang="de-DE" dirty="0"/>
+          </a:p>
+          <a:p>
+            <a:pPr lvl="1"/>
+            <a:r>
+              <a:rPr lang="de-DE" dirty="0" err="1"/>
+              <a:t>Programming</a:t>
+            </a:r>
+            <a:r>
+              <a:rPr lang="de-DE" dirty="0"/>
+              <a:t> </a:t>
+            </a:r>
+            <a:r>
+              <a:rPr lang="de-DE" dirty="0" err="1"/>
+              <a:t>is</a:t>
+            </a:r>
+            <a:r>
+              <a:rPr lang="de-DE" dirty="0"/>
+              <a:t> </a:t>
+            </a:r>
+            <a:r>
+              <a:rPr lang="de-DE" dirty="0" err="1"/>
+              <a:t>only</a:t>
+            </a:r>
+            <a:r>
+              <a:rPr lang="de-DE" dirty="0"/>
+              <a:t> </a:t>
+            </a:r>
+            <a:r>
+              <a:rPr lang="de-DE" dirty="0" err="1"/>
+              <a:t>one</a:t>
+            </a:r>
+            <a:r>
+              <a:rPr lang="de-DE" dirty="0"/>
+              <a:t> </a:t>
+            </a:r>
+            <a:r>
+              <a:rPr lang="de-DE" dirty="0" err="1"/>
+              <a:t>part</a:t>
+            </a:r>
+            <a:r>
+              <a:rPr lang="de-DE" dirty="0"/>
+              <a:t>, </a:t>
+            </a:r>
+            <a:r>
+              <a:rPr lang="de-DE" dirty="0" err="1"/>
+              <a:t>it‘s</a:t>
+            </a:r>
+            <a:r>
+              <a:rPr lang="de-DE" dirty="0"/>
+              <a:t> also </a:t>
+            </a:r>
+            <a:r>
+              <a:rPr lang="de-DE" dirty="0" err="1"/>
+              <a:t>important</a:t>
+            </a:r>
+            <a:r>
+              <a:rPr lang="de-DE" dirty="0"/>
+              <a:t> </a:t>
+            </a:r>
+            <a:r>
+              <a:rPr lang="de-DE" dirty="0" err="1"/>
+              <a:t>to</a:t>
+            </a:r>
+            <a:r>
+              <a:rPr lang="de-DE" dirty="0"/>
+              <a:t> </a:t>
+            </a:r>
+            <a:r>
+              <a:rPr lang="de-DE" dirty="0" err="1"/>
+              <a:t>come</a:t>
+            </a:r>
+            <a:r>
+              <a:rPr lang="de-DE" dirty="0"/>
+              <a:t> </a:t>
+            </a:r>
+            <a:r>
+              <a:rPr lang="de-DE" dirty="0" err="1"/>
+              <a:t>up</a:t>
+            </a:r>
+            <a:r>
+              <a:rPr lang="de-DE" dirty="0"/>
+              <a:t> </a:t>
+            </a:r>
+            <a:r>
+              <a:rPr lang="de-DE" dirty="0" err="1"/>
+              <a:t>with</a:t>
+            </a:r>
+            <a:r>
+              <a:rPr lang="de-DE" dirty="0"/>
+              <a:t> a </a:t>
+            </a:r>
+            <a:r>
+              <a:rPr lang="de-DE" dirty="0" err="1"/>
+              <a:t>good</a:t>
+            </a:r>
+            <a:r>
+              <a:rPr lang="de-DE" dirty="0"/>
+              <a:t> </a:t>
+            </a:r>
+            <a:r>
+              <a:rPr lang="de-DE" dirty="0" err="1"/>
+              <a:t>strategy</a:t>
+            </a:r>
+            <a:r>
+              <a:rPr lang="de-DE" dirty="0"/>
+              <a:t> and </a:t>
+            </a:r>
+            <a:r>
+              <a:rPr lang="de-DE" dirty="0" err="1"/>
+              <a:t>algorithms</a:t>
+            </a:r>
+            <a:r>
+              <a:rPr lang="de-DE" dirty="0"/>
+              <a:t>, </a:t>
+            </a:r>
+            <a:r>
+              <a:rPr lang="de-DE" dirty="0" err="1"/>
+              <a:t>can</a:t>
+            </a:r>
+            <a:r>
+              <a:rPr lang="de-DE" dirty="0"/>
+              <a:t> also </a:t>
+            </a:r>
+            <a:r>
+              <a:rPr lang="de-DE" dirty="0" err="1"/>
+              <a:t>be</a:t>
+            </a:r>
+            <a:r>
+              <a:rPr lang="de-DE" dirty="0"/>
+              <a:t> </a:t>
+            </a:r>
+            <a:r>
+              <a:rPr lang="de-DE" dirty="0" err="1"/>
+              <a:t>done</a:t>
+            </a:r>
+            <a:r>
+              <a:rPr lang="de-DE" dirty="0"/>
+              <a:t> </a:t>
+            </a:r>
+            <a:r>
+              <a:rPr lang="de-DE" dirty="0" err="1"/>
+              <a:t>with</a:t>
+            </a:r>
+            <a:r>
+              <a:rPr lang="de-DE" dirty="0"/>
+              <a:t> </a:t>
+            </a:r>
+            <a:r>
+              <a:rPr lang="de-DE" dirty="0" err="1"/>
+              <a:t>pen</a:t>
+            </a:r>
+            <a:r>
+              <a:rPr lang="de-DE" dirty="0"/>
+              <a:t> &amp; </a:t>
+            </a:r>
+            <a:r>
+              <a:rPr lang="de-DE" dirty="0" err="1"/>
+              <a:t>paper</a:t>
+            </a:r>
+            <a:endParaRPr lang="de-DE" dirty="0"/>
+          </a:p>
+          <a:p>
+            <a:endParaRPr lang="de-DE" dirty="0"/>
           </a:p>
         </p:txBody>
       </p:sp>
     </p:spTree>
     <p:extLst>
       <p:ext uri="{BB962C8B-B14F-4D97-AF65-F5344CB8AC3E}">
-        <p14:creationId xmlns:p14="http://schemas.microsoft.com/office/powerpoint/2010/main" val="3628761174"/>
+        <p14:creationId xmlns:p14="http://schemas.microsoft.com/office/powerpoint/2010/main" val="3960483778"/>
       </p:ext>
     </p:extLst>
   </p:cSld>

</xml_diff>

<commit_message>
Update GridWars intro slides
</commit_message>
<xml_diff>
--- a/presentation/gridwars-intro-2018.pptx
+++ b/presentation/gridwars-intro-2018.pptx
@@ -266,7 +266,7 @@
           <a:p>
             <a:fld id="{501609CE-931C-4F07-AA4D-7FAE46160216}" type="datetimeFigureOut">
               <a:rPr lang="de-DE" smtClean="0"/>
-              <a:t>21.04.2018</a:t>
+              <a:t>22.04.2018</a:t>
             </a:fld>
             <a:endParaRPr lang="de-DE"/>
           </a:p>
@@ -436,7 +436,7 @@
           <a:p>
             <a:fld id="{501609CE-931C-4F07-AA4D-7FAE46160216}" type="datetimeFigureOut">
               <a:rPr lang="de-DE" smtClean="0"/>
-              <a:t>21.04.2018</a:t>
+              <a:t>22.04.2018</a:t>
             </a:fld>
             <a:endParaRPr lang="de-DE"/>
           </a:p>
@@ -616,7 +616,7 @@
           <a:p>
             <a:fld id="{501609CE-931C-4F07-AA4D-7FAE46160216}" type="datetimeFigureOut">
               <a:rPr lang="de-DE" smtClean="0"/>
-              <a:t>21.04.2018</a:t>
+              <a:t>22.04.2018</a:t>
             </a:fld>
             <a:endParaRPr lang="de-DE"/>
           </a:p>
@@ -786,7 +786,7 @@
           <a:p>
             <a:fld id="{501609CE-931C-4F07-AA4D-7FAE46160216}" type="datetimeFigureOut">
               <a:rPr lang="de-DE" smtClean="0"/>
-              <a:t>21.04.2018</a:t>
+              <a:t>22.04.2018</a:t>
             </a:fld>
             <a:endParaRPr lang="de-DE"/>
           </a:p>
@@ -1037,7 +1037,7 @@
           <a:p>
             <a:fld id="{501609CE-931C-4F07-AA4D-7FAE46160216}" type="datetimeFigureOut">
               <a:rPr lang="de-DE" smtClean="0"/>
-              <a:t>21.04.2018</a:t>
+              <a:t>22.04.2018</a:t>
             </a:fld>
             <a:endParaRPr lang="de-DE"/>
           </a:p>
@@ -1269,7 +1269,7 @@
           <a:p>
             <a:fld id="{501609CE-931C-4F07-AA4D-7FAE46160216}" type="datetimeFigureOut">
               <a:rPr lang="de-DE" smtClean="0"/>
-              <a:t>21.04.2018</a:t>
+              <a:t>22.04.2018</a:t>
             </a:fld>
             <a:endParaRPr lang="de-DE"/>
           </a:p>
@@ -1616,7 +1616,7 @@
           <a:p>
             <a:fld id="{501609CE-931C-4F07-AA4D-7FAE46160216}" type="datetimeFigureOut">
               <a:rPr lang="de-DE" smtClean="0"/>
-              <a:t>21.04.2018</a:t>
+              <a:t>22.04.2018</a:t>
             </a:fld>
             <a:endParaRPr lang="de-DE"/>
           </a:p>
@@ -1734,7 +1734,7 @@
           <a:p>
             <a:fld id="{501609CE-931C-4F07-AA4D-7FAE46160216}" type="datetimeFigureOut">
               <a:rPr lang="de-DE" smtClean="0"/>
-              <a:t>21.04.2018</a:t>
+              <a:t>22.04.2018</a:t>
             </a:fld>
             <a:endParaRPr lang="de-DE"/>
           </a:p>
@@ -1852,7 +1852,7 @@
           <a:p>
             <a:fld id="{501609CE-931C-4F07-AA4D-7FAE46160216}" type="datetimeFigureOut">
               <a:rPr lang="de-DE" smtClean="0"/>
-              <a:t>21.04.2018</a:t>
+              <a:t>22.04.2018</a:t>
             </a:fld>
             <a:endParaRPr lang="de-DE"/>
           </a:p>
@@ -2136,7 +2136,7 @@
           <a:p>
             <a:fld id="{501609CE-931C-4F07-AA4D-7FAE46160216}" type="datetimeFigureOut">
               <a:rPr lang="de-DE" smtClean="0"/>
-              <a:t>21.04.2018</a:t>
+              <a:t>22.04.2018</a:t>
             </a:fld>
             <a:endParaRPr lang="de-DE"/>
           </a:p>
@@ -2400,7 +2400,7 @@
           <a:p>
             <a:fld id="{501609CE-931C-4F07-AA4D-7FAE46160216}" type="datetimeFigureOut">
               <a:rPr lang="de-DE" smtClean="0"/>
-              <a:t>21.04.2018</a:t>
+              <a:t>22.04.2018</a:t>
             </a:fld>
             <a:endParaRPr lang="de-DE"/>
           </a:p>
@@ -2614,7 +2614,7 @@
           <a:p>
             <a:fld id="{501609CE-931C-4F07-AA4D-7FAE46160216}" type="datetimeFigureOut">
               <a:rPr lang="de-DE" smtClean="0"/>
-              <a:t>21.04.2018</a:t>
+              <a:t>22.04.2018</a:t>
             </a:fld>
             <a:endParaRPr lang="de-DE"/>
           </a:p>
@@ -3736,7 +3736,7 @@
           <p:cNvPr id="4" name="Inhaltsplatzhalter 3">
             <a:extLst>
               <a:ext uri="{FF2B5EF4-FFF2-40B4-BE49-F238E27FC236}">
-                <a16:creationId xmlns:a16="http://schemas.microsoft.com/office/drawing/2014/main" id="{254ECB4F-16DC-4E09-BE63-ACD0AC3EE298}"/>
+                <a16:creationId xmlns:a16="http://schemas.microsoft.com/office/drawing/2014/main" xmlns="" id="{254ECB4F-16DC-4E09-BE63-ACD0AC3EE298}"/>
               </a:ext>
             </a:extLst>
           </p:cNvPr>
@@ -3747,14 +3747,14 @@
             <p:ph idx="1"/>
             <p:extLst>
               <p:ext uri="{D42A27DB-BD31-4B8C-83A1-F6EECF244321}">
-                <p14:modId xmlns:p14="http://schemas.microsoft.com/office/powerpoint/2010/main" val="3643208384"/>
+                <p14:modId xmlns:p14="http://schemas.microsoft.com/office/powerpoint/2010/main" val="593862664"/>
               </p:ext>
             </p:extLst>
           </p:nvPr>
         </p:nvGraphicFramePr>
         <p:xfrm>
-          <a:off x="2914135" y="1690688"/>
-          <a:ext cx="6363730" cy="2225040"/>
+          <a:off x="1060123" y="1691322"/>
+          <a:ext cx="10071754" cy="3384720"/>
         </p:xfrm>
         <a:graphic>
           <a:graphicData uri="http://schemas.openxmlformats.org/drawingml/2006/table">
@@ -3763,22 +3763,22 @@
                 <a:tableStyleId>{5C22544A-7EE6-4342-B048-85BDC9FD1C3A}</a:tableStyleId>
               </a:tblPr>
               <a:tblGrid>
-                <a:gridCol w="3179515">
+                <a:gridCol w="5035877">
                   <a:extLst>
                     <a:ext uri="{9D8B030D-6E8A-4147-A177-3AD203B41FA5}">
-                      <a16:colId xmlns:a16="http://schemas.microsoft.com/office/drawing/2014/main" val="2290721960"/>
+                      <a16:colId xmlns:a16="http://schemas.microsoft.com/office/drawing/2014/main" xmlns="" val="2290721960"/>
                     </a:ext>
                   </a:extLst>
                 </a:gridCol>
-                <a:gridCol w="3184215">
+                <a:gridCol w="5035877">
                   <a:extLst>
                     <a:ext uri="{9D8B030D-6E8A-4147-A177-3AD203B41FA5}">
-                      <a16:colId xmlns:a16="http://schemas.microsoft.com/office/drawing/2014/main" val="3290447473"/>
+                      <a16:colId xmlns:a16="http://schemas.microsoft.com/office/drawing/2014/main" xmlns="" val="3290447473"/>
                     </a:ext>
                   </a:extLst>
                 </a:gridCol>
               </a:tblGrid>
-              <a:tr h="370840">
+              <a:tr h="564120">
                 <a:tc>
                   <a:txBody>
                     <a:bodyPr/>
@@ -3786,10 +3786,10 @@
                     <a:p>
                       <a:pPr algn="ctr"/>
                       <a:r>
-                        <a:rPr lang="de-DE" dirty="0" err="1"/>
+                        <a:rPr lang="de-DE" sz="2800" dirty="0" err="1"/>
                         <a:t>When</a:t>
                       </a:r>
-                      <a:endParaRPr lang="de-DE" dirty="0"/>
+                      <a:endParaRPr lang="de-DE" sz="2800" dirty="0"/>
                     </a:p>
                   </a:txBody>
                   <a:tcPr/>
@@ -3801,30 +3801,43 @@
                     <a:p>
                       <a:pPr algn="ctr"/>
                       <a:r>
-                        <a:rPr lang="de-DE" dirty="0" err="1"/>
+                        <a:rPr lang="de-DE" sz="2800" dirty="0" err="1"/>
                         <a:t>What</a:t>
                       </a:r>
-                      <a:endParaRPr lang="de-DE" dirty="0"/>
+                      <a:endParaRPr lang="de-DE" sz="2800" dirty="0"/>
                     </a:p>
                   </a:txBody>
                   <a:tcPr/>
                 </a:tc>
                 <a:extLst>
                   <a:ext uri="{0D108BD9-81ED-4DB2-BD59-A6C34878D82A}">
-                    <a16:rowId xmlns:a16="http://schemas.microsoft.com/office/drawing/2014/main" val="1666283748"/>
+                    <a16:rowId xmlns:a16="http://schemas.microsoft.com/office/drawing/2014/main" xmlns="" val="1666283748"/>
                   </a:ext>
                 </a:extLst>
               </a:tr>
-              <a:tr h="370840">
+              <a:tr h="564120">
                 <a:tc>
                   <a:txBody>
                     <a:bodyPr/>
                     <a:lstStyle/>
                     <a:p>
                       <a:r>
-                        <a:rPr lang="de-DE" dirty="0"/>
-                        <a:t>Today, after lunch time</a:t>
+                        <a:rPr lang="de-DE" sz="2800" dirty="0"/>
+                        <a:t>Today, </a:t>
                       </a:r>
+                      <a:r>
+                        <a:rPr lang="de-DE" sz="2800" dirty="0" smtClean="0"/>
+                        <a:t>at</a:t>
+                      </a:r>
+                      <a:r>
+                        <a:rPr lang="de-DE" sz="2800" baseline="0" dirty="0" smtClean="0"/>
+                        <a:t> </a:t>
+                      </a:r>
+                      <a:r>
+                        <a:rPr lang="de-DE" sz="2800" dirty="0" smtClean="0"/>
+                        <a:t>lunch break</a:t>
+                      </a:r>
+                      <a:endParaRPr lang="de-DE" sz="2800" dirty="0"/>
                     </a:p>
                   </a:txBody>
                   <a:tcPr/>
@@ -3835,39 +3848,36 @@
                     <a:lstStyle/>
                     <a:p>
                       <a:r>
-                        <a:rPr lang="de-DE" dirty="0" err="1"/>
+                        <a:rPr lang="de-DE" sz="2800" dirty="0" err="1"/>
                         <a:t>Registrations</a:t>
                       </a:r>
                       <a:r>
-                        <a:rPr lang="de-DE" dirty="0"/>
+                        <a:rPr lang="de-DE" sz="2800" dirty="0"/>
                         <a:t> will </a:t>
                       </a:r>
                       <a:r>
-                        <a:rPr lang="de-DE" dirty="0" err="1"/>
-                        <a:t>be</a:t>
+                        <a:rPr lang="de-DE" sz="2800" dirty="0" smtClean="0"/>
+                        <a:t>open</a:t>
                       </a:r>
-                      <a:r>
-                        <a:rPr lang="de-DE" dirty="0"/>
-                        <a:t> open</a:t>
-                      </a:r>
+                      <a:endParaRPr lang="de-DE" sz="2800" dirty="0"/>
                     </a:p>
                   </a:txBody>
                   <a:tcPr/>
                 </a:tc>
                 <a:extLst>
                   <a:ext uri="{0D108BD9-81ED-4DB2-BD59-A6C34878D82A}">
-                    <a16:rowId xmlns:a16="http://schemas.microsoft.com/office/drawing/2014/main" val="219365017"/>
+                    <a16:rowId xmlns:a16="http://schemas.microsoft.com/office/drawing/2014/main" xmlns="" val="219365017"/>
                   </a:ext>
                 </a:extLst>
               </a:tr>
-              <a:tr h="370840">
+              <a:tr h="564120">
                 <a:tc>
                   <a:txBody>
                     <a:bodyPr/>
                     <a:lstStyle/>
                     <a:p>
                       <a:r>
-                        <a:rPr lang="de-DE" dirty="0"/>
+                        <a:rPr lang="de-DE" sz="2800" dirty="0"/>
                         <a:t>Tuesday, 18h45 – 19h45</a:t>
                       </a:r>
                     </a:p>
@@ -3880,7 +3890,7 @@
                     <a:lstStyle/>
                     <a:p>
                       <a:r>
-                        <a:rPr lang="de-DE" dirty="0"/>
+                        <a:rPr lang="de-DE" sz="2800" dirty="0"/>
                         <a:t>Hackathon</a:t>
                       </a:r>
                     </a:p>
@@ -3889,18 +3899,18 @@
                 </a:tc>
                 <a:extLst>
                   <a:ext uri="{0D108BD9-81ED-4DB2-BD59-A6C34878D82A}">
-                    <a16:rowId xmlns:a16="http://schemas.microsoft.com/office/drawing/2014/main" val="3352012886"/>
+                    <a16:rowId xmlns:a16="http://schemas.microsoft.com/office/drawing/2014/main" xmlns="" val="3352012886"/>
                   </a:ext>
                 </a:extLst>
               </a:tr>
-              <a:tr h="370840">
+              <a:tr h="564120">
                 <a:tc>
                   <a:txBody>
                     <a:bodyPr/>
                     <a:lstStyle/>
                     <a:p>
                       <a:r>
-                        <a:rPr lang="de-DE" dirty="0"/>
+                        <a:rPr lang="de-DE" sz="2800" dirty="0"/>
                         <a:t>Wednesday, 18h45 – 19h45</a:t>
                       </a:r>
                     </a:p>
@@ -3913,7 +3923,7 @@
                     <a:lstStyle/>
                     <a:p>
                       <a:r>
-                        <a:rPr lang="de-DE" dirty="0"/>
+                        <a:rPr lang="de-DE" sz="2800" dirty="0"/>
                         <a:t>Hackathon</a:t>
                       </a:r>
                     </a:p>
@@ -3922,30 +3932,30 @@
                 </a:tc>
                 <a:extLst>
                   <a:ext uri="{0D108BD9-81ED-4DB2-BD59-A6C34878D82A}">
-                    <a16:rowId xmlns:a16="http://schemas.microsoft.com/office/drawing/2014/main" val="4269047107"/>
+                    <a16:rowId xmlns:a16="http://schemas.microsoft.com/office/drawing/2014/main" xmlns="" val="4269047107"/>
                   </a:ext>
                 </a:extLst>
               </a:tr>
-              <a:tr h="370840">
+              <a:tr h="564120">
                 <a:tc>
                   <a:txBody>
                     <a:bodyPr/>
                     <a:lstStyle/>
                     <a:p>
                       <a:r>
-                        <a:rPr lang="de-DE" dirty="0" err="1"/>
+                        <a:rPr lang="de-DE" sz="2800" dirty="0" err="1"/>
                         <a:t>Thursday</a:t>
                       </a:r>
                       <a:r>
-                        <a:rPr lang="de-DE" dirty="0"/>
+                        <a:rPr lang="de-DE" sz="2800" dirty="0"/>
                         <a:t>, </a:t>
                       </a:r>
                       <a:r>
-                        <a:rPr lang="de-DE" dirty="0" err="1"/>
+                        <a:rPr lang="de-DE" sz="2800" dirty="0" err="1"/>
                         <a:t>around</a:t>
                       </a:r>
                       <a:r>
-                        <a:rPr lang="de-DE" dirty="0"/>
+                        <a:rPr lang="de-DE" sz="2800" dirty="0"/>
                         <a:t> lunch time</a:t>
                       </a:r>
                     </a:p>
@@ -3958,52 +3968,52 @@
                     <a:lstStyle/>
                     <a:p>
                       <a:r>
-                        <a:rPr lang="de-DE" dirty="0"/>
+                        <a:rPr lang="de-DE" sz="2800" dirty="0"/>
                         <a:t>Closing </a:t>
                       </a:r>
                       <a:r>
-                        <a:rPr lang="de-DE" dirty="0" err="1"/>
+                        <a:rPr lang="de-DE" sz="2800" dirty="0" err="1"/>
                         <a:t>of</a:t>
                       </a:r>
                       <a:r>
-                        <a:rPr lang="de-DE" dirty="0"/>
+                        <a:rPr lang="de-DE" sz="2800" dirty="0"/>
                         <a:t> bot </a:t>
                       </a:r>
                       <a:r>
-                        <a:rPr lang="de-DE" dirty="0" err="1"/>
+                        <a:rPr lang="de-DE" sz="2800" dirty="0" err="1"/>
                         <a:t>upload</a:t>
                       </a:r>
                       <a:r>
-                        <a:rPr lang="de-DE" dirty="0"/>
+                        <a:rPr lang="de-DE" sz="2800" dirty="0"/>
                         <a:t>, </a:t>
                       </a:r>
                       <a:r>
-                        <a:rPr lang="de-DE" dirty="0" err="1"/>
+                        <a:rPr lang="de-DE" sz="2800" dirty="0" err="1"/>
                         <a:t>playoffs</a:t>
                       </a:r>
-                      <a:endParaRPr lang="de-DE" dirty="0"/>
+                      <a:endParaRPr lang="de-DE" sz="2800" dirty="0"/>
                     </a:p>
                   </a:txBody>
                   <a:tcPr/>
                 </a:tc>
                 <a:extLst>
                   <a:ext uri="{0D108BD9-81ED-4DB2-BD59-A6C34878D82A}">
-                    <a16:rowId xmlns:a16="http://schemas.microsoft.com/office/drawing/2014/main" val="3586547574"/>
+                    <a16:rowId xmlns:a16="http://schemas.microsoft.com/office/drawing/2014/main" xmlns="" val="3586547574"/>
                   </a:ext>
                 </a:extLst>
               </a:tr>
-              <a:tr h="370840">
+              <a:tr h="564120">
                 <a:tc>
                   <a:txBody>
                     <a:bodyPr/>
                     <a:lstStyle/>
                     <a:p>
                       <a:r>
-                        <a:rPr lang="de-DE" dirty="0" err="1"/>
+                        <a:rPr lang="de-DE" sz="2800" dirty="0" err="1"/>
                         <a:t>Thursday</a:t>
                       </a:r>
                       <a:r>
-                        <a:rPr lang="de-DE" dirty="0"/>
+                        <a:rPr lang="de-DE" sz="2800" dirty="0"/>
                         <a:t>, 16h15</a:t>
                       </a:r>
                     </a:p>
@@ -4016,33 +4026,33 @@
                     <a:lstStyle/>
                     <a:p>
                       <a:r>
-                        <a:rPr lang="de-DE" dirty="0" err="1"/>
+                        <a:rPr lang="de-DE" sz="2800" dirty="0" err="1"/>
                         <a:t>Results</a:t>
                       </a:r>
                       <a:r>
-                        <a:rPr lang="de-DE" dirty="0"/>
+                        <a:rPr lang="de-DE" sz="2800" dirty="0"/>
                         <a:t> &amp; </a:t>
                       </a:r>
                       <a:r>
-                        <a:rPr lang="de-DE" dirty="0" err="1"/>
-                        <a:t>winner</a:t>
+                        <a:rPr lang="de-DE" sz="2800" dirty="0" err="1" smtClean="0"/>
+                        <a:t>price</a:t>
                       </a:r>
                       <a:r>
-                        <a:rPr lang="de-DE" dirty="0"/>
+                        <a:rPr lang="de-DE" sz="2800" dirty="0" smtClean="0"/>
                         <a:t> </a:t>
                       </a:r>
                       <a:r>
-                        <a:rPr lang="de-DE" dirty="0" err="1"/>
+                        <a:rPr lang="de-DE" sz="2800" dirty="0" err="1"/>
                         <a:t>ceremony</a:t>
                       </a:r>
-                      <a:endParaRPr lang="de-DE" dirty="0"/>
+                      <a:endParaRPr lang="de-DE" sz="2800" dirty="0"/>
                     </a:p>
                   </a:txBody>
                   <a:tcPr/>
                 </a:tc>
                 <a:extLst>
                   <a:ext uri="{0D108BD9-81ED-4DB2-BD59-A6C34878D82A}">
-                    <a16:rowId xmlns:a16="http://schemas.microsoft.com/office/drawing/2014/main" val="3478169864"/>
+                    <a16:rowId xmlns:a16="http://schemas.microsoft.com/office/drawing/2014/main" xmlns="" val="3478169864"/>
                   </a:ext>
                 </a:extLst>
               </a:tr>
@@ -4050,6 +4060,69 @@
           </a:graphicData>
         </a:graphic>
       </p:graphicFrame>
+      <p:sp>
+        <p:nvSpPr>
+          <p:cNvPr id="3" name="Textfeld 2"/>
+          <p:cNvSpPr txBox="1"/>
+          <p:nvPr/>
+        </p:nvSpPr>
+        <p:spPr>
+          <a:xfrm>
+            <a:off x="3144898" y="5343182"/>
+            <a:ext cx="5916058" cy="461665"/>
+          </a:xfrm>
+          <a:prstGeom prst="rect">
+            <a:avLst/>
+          </a:prstGeom>
+          <a:noFill/>
+        </p:spPr>
+        <p:txBody>
+          <a:bodyPr wrap="square" rtlCol="0">
+            <a:spAutoFit/>
+          </a:bodyPr>
+          <a:lstStyle/>
+          <a:p>
+            <a:pPr algn="ctr"/>
+            <a:r>
+              <a:rPr lang="de-DE" sz="2400" dirty="0" err="1" smtClean="0"/>
+              <a:t>Hackathons</a:t>
+            </a:r>
+            <a:r>
+              <a:rPr lang="de-DE" sz="2400" dirty="0" smtClean="0"/>
+              <a:t> will </a:t>
+            </a:r>
+            <a:r>
+              <a:rPr lang="de-DE" sz="2400" dirty="0" err="1" smtClean="0"/>
+              <a:t>take</a:t>
+            </a:r>
+            <a:r>
+              <a:rPr lang="de-DE" sz="2400" dirty="0" smtClean="0"/>
+              <a:t> </a:t>
+            </a:r>
+            <a:r>
+              <a:rPr lang="de-DE" sz="2400" dirty="0" err="1" smtClean="0"/>
+              <a:t>place</a:t>
+            </a:r>
+            <a:r>
+              <a:rPr lang="de-DE" sz="2400" dirty="0" smtClean="0"/>
+              <a:t> in </a:t>
+            </a:r>
+            <a:r>
+              <a:rPr lang="de-DE" sz="2400" dirty="0" err="1" smtClean="0"/>
+              <a:t>the</a:t>
+            </a:r>
+            <a:r>
+              <a:rPr lang="de-DE" sz="2400" dirty="0" smtClean="0"/>
+              <a:t> </a:t>
+            </a:r>
+            <a:r>
+              <a:rPr lang="de-DE" sz="2400" dirty="0" err="1" smtClean="0"/>
+              <a:t>library</a:t>
+            </a:r>
+            <a:endParaRPr lang="de-DE" sz="2400" dirty="0"/>
+          </a:p>
+        </p:txBody>
+      </p:sp>
     </p:spTree>
     <p:extLst>
       <p:ext uri="{BB962C8B-B14F-4D97-AF65-F5344CB8AC3E}">

</xml_diff>

<commit_message>
Update slides and change registration password
</commit_message>
<xml_diff>
--- a/presentation/gridwars-intro-2018.pptx
+++ b/presentation/gridwars-intro-2018.pptx
@@ -266,7 +266,7 @@
           <a:p>
             <a:fld id="{501609CE-931C-4F07-AA4D-7FAE46160216}" type="datetimeFigureOut">
               <a:rPr lang="de-DE" smtClean="0"/>
-              <a:t>22.04.2018</a:t>
+              <a:t>23.04.2018</a:t>
             </a:fld>
             <a:endParaRPr lang="de-DE"/>
           </a:p>
@@ -436,7 +436,7 @@
           <a:p>
             <a:fld id="{501609CE-931C-4F07-AA4D-7FAE46160216}" type="datetimeFigureOut">
               <a:rPr lang="de-DE" smtClean="0"/>
-              <a:t>22.04.2018</a:t>
+              <a:t>23.04.2018</a:t>
             </a:fld>
             <a:endParaRPr lang="de-DE"/>
           </a:p>
@@ -616,7 +616,7 @@
           <a:p>
             <a:fld id="{501609CE-931C-4F07-AA4D-7FAE46160216}" type="datetimeFigureOut">
               <a:rPr lang="de-DE" smtClean="0"/>
-              <a:t>22.04.2018</a:t>
+              <a:t>23.04.2018</a:t>
             </a:fld>
             <a:endParaRPr lang="de-DE"/>
           </a:p>
@@ -786,7 +786,7 @@
           <a:p>
             <a:fld id="{501609CE-931C-4F07-AA4D-7FAE46160216}" type="datetimeFigureOut">
               <a:rPr lang="de-DE" smtClean="0"/>
-              <a:t>22.04.2018</a:t>
+              <a:t>23.04.2018</a:t>
             </a:fld>
             <a:endParaRPr lang="de-DE"/>
           </a:p>
@@ -1037,7 +1037,7 @@
           <a:p>
             <a:fld id="{501609CE-931C-4F07-AA4D-7FAE46160216}" type="datetimeFigureOut">
               <a:rPr lang="de-DE" smtClean="0"/>
-              <a:t>22.04.2018</a:t>
+              <a:t>23.04.2018</a:t>
             </a:fld>
             <a:endParaRPr lang="de-DE"/>
           </a:p>
@@ -1269,7 +1269,7 @@
           <a:p>
             <a:fld id="{501609CE-931C-4F07-AA4D-7FAE46160216}" type="datetimeFigureOut">
               <a:rPr lang="de-DE" smtClean="0"/>
-              <a:t>22.04.2018</a:t>
+              <a:t>23.04.2018</a:t>
             </a:fld>
             <a:endParaRPr lang="de-DE"/>
           </a:p>
@@ -1616,7 +1616,7 @@
           <a:p>
             <a:fld id="{501609CE-931C-4F07-AA4D-7FAE46160216}" type="datetimeFigureOut">
               <a:rPr lang="de-DE" smtClean="0"/>
-              <a:t>22.04.2018</a:t>
+              <a:t>23.04.2018</a:t>
             </a:fld>
             <a:endParaRPr lang="de-DE"/>
           </a:p>
@@ -1734,7 +1734,7 @@
           <a:p>
             <a:fld id="{501609CE-931C-4F07-AA4D-7FAE46160216}" type="datetimeFigureOut">
               <a:rPr lang="de-DE" smtClean="0"/>
-              <a:t>22.04.2018</a:t>
+              <a:t>23.04.2018</a:t>
             </a:fld>
             <a:endParaRPr lang="de-DE"/>
           </a:p>
@@ -1852,7 +1852,7 @@
           <a:p>
             <a:fld id="{501609CE-931C-4F07-AA4D-7FAE46160216}" type="datetimeFigureOut">
               <a:rPr lang="de-DE" smtClean="0"/>
-              <a:t>22.04.2018</a:t>
+              <a:t>23.04.2018</a:t>
             </a:fld>
             <a:endParaRPr lang="de-DE"/>
           </a:p>
@@ -2136,7 +2136,7 @@
           <a:p>
             <a:fld id="{501609CE-931C-4F07-AA4D-7FAE46160216}" type="datetimeFigureOut">
               <a:rPr lang="de-DE" smtClean="0"/>
-              <a:t>22.04.2018</a:t>
+              <a:t>23.04.2018</a:t>
             </a:fld>
             <a:endParaRPr lang="de-DE"/>
           </a:p>
@@ -2400,7 +2400,7 @@
           <a:p>
             <a:fld id="{501609CE-931C-4F07-AA4D-7FAE46160216}" type="datetimeFigureOut">
               <a:rPr lang="de-DE" smtClean="0"/>
-              <a:t>22.04.2018</a:t>
+              <a:t>23.04.2018</a:t>
             </a:fld>
             <a:endParaRPr lang="de-DE"/>
           </a:p>
@@ -2614,7 +2614,7 @@
           <a:p>
             <a:fld id="{501609CE-931C-4F07-AA4D-7FAE46160216}" type="datetimeFigureOut">
               <a:rPr lang="de-DE" smtClean="0"/>
-              <a:t>22.04.2018</a:t>
+              <a:t>23.04.2018</a:t>
             </a:fld>
             <a:endParaRPr lang="de-DE"/>
           </a:p>
@@ -3020,22 +3020,24 @@
         </p:nvSpPr>
         <p:spPr/>
         <p:txBody>
-          <a:bodyPr/>
-          <a:lstStyle/>
-          <a:p>
-            <a:r>
-              <a:rPr lang="de-DE" b="1" dirty="0" err="1"/>
+          <a:bodyPr>
+            <a:normAutofit/>
+          </a:bodyPr>
+          <a:lstStyle/>
+          <a:p>
+            <a:r>
+              <a:rPr lang="de-DE" sz="6600" b="1" dirty="0" err="1"/>
               <a:t>Grid</a:t>
             </a:r>
             <a:r>
-              <a:rPr lang="de-DE" b="1" dirty="0"/>
-              <a:t> </a:t>
-            </a:r>
-            <a:r>
-              <a:rPr lang="de-DE" b="1" dirty="0" err="1"/>
+              <a:rPr lang="de-DE" sz="6600" b="1" dirty="0"/>
+              <a:t> </a:t>
+            </a:r>
+            <a:r>
+              <a:rPr lang="de-DE" sz="6600" b="1" dirty="0" err="1"/>
               <a:t>Wars</a:t>
             </a:r>
-            <a:endParaRPr lang="de-DE" b="1" dirty="0"/>
+            <a:endParaRPr lang="de-DE" sz="6600" b="1" dirty="0"/>
           </a:p>
         </p:txBody>
       </p:sp>
@@ -3056,33 +3058,35 @@
           </a:xfrm>
         </p:spPr>
         <p:txBody>
-          <a:bodyPr/>
-          <a:lstStyle/>
-          <a:p>
-            <a:r>
-              <a:rPr lang="de-DE" dirty="0"/>
+          <a:bodyPr>
+            <a:normAutofit/>
+          </a:bodyPr>
+          <a:lstStyle/>
+          <a:p>
+            <a:r>
+              <a:rPr lang="de-DE" sz="3200" dirty="0"/>
               <a:t>A Game AI </a:t>
             </a:r>
             <a:r>
-              <a:rPr lang="de-DE" dirty="0" err="1"/>
+              <a:rPr lang="de-DE" sz="3200" dirty="0" err="1"/>
               <a:t>Coding</a:t>
             </a:r>
             <a:r>
-              <a:rPr lang="de-DE" dirty="0"/>
-              <a:t> </a:t>
-            </a:r>
-            <a:r>
-              <a:rPr lang="de-DE" dirty="0" err="1"/>
+              <a:rPr lang="de-DE" sz="3200" dirty="0"/>
+              <a:t> </a:t>
+            </a:r>
+            <a:r>
+              <a:rPr lang="de-DE" sz="3200" dirty="0" err="1"/>
               <a:t>Competition</a:t>
             </a:r>
-            <a:endParaRPr lang="de-DE" dirty="0"/>
-          </a:p>
-          <a:p>
-            <a:endParaRPr lang="de-DE" dirty="0"/>
-          </a:p>
-          <a:p>
-            <a:r>
-              <a:rPr lang="de-DE" dirty="0"/>
+            <a:endParaRPr lang="de-DE" sz="3200" dirty="0"/>
+          </a:p>
+          <a:p>
+            <a:endParaRPr lang="de-DE" sz="3200" dirty="0"/>
+          </a:p>
+          <a:p>
+            <a:r>
+              <a:rPr lang="de-DE" sz="3200" dirty="0"/>
               <a:t>Benjamin Wolff (CERN/AIS)</a:t>
             </a:r>
           </a:p>
@@ -3736,7 +3740,7 @@
           <p:cNvPr id="4" name="Inhaltsplatzhalter 3">
             <a:extLst>
               <a:ext uri="{FF2B5EF4-FFF2-40B4-BE49-F238E27FC236}">
-                <a16:creationId xmlns:a16="http://schemas.microsoft.com/office/drawing/2014/main" xmlns="" id="{254ECB4F-16DC-4E09-BE63-ACD0AC3EE298}"/>
+                <a16:creationId xmlns="" xmlns:a16="http://schemas.microsoft.com/office/drawing/2014/main" id="{254ECB4F-16DC-4E09-BE63-ACD0AC3EE298}"/>
               </a:ext>
             </a:extLst>
           </p:cNvPr>
@@ -3766,14 +3770,14 @@
                 <a:gridCol w="5035877">
                   <a:extLst>
                     <a:ext uri="{9D8B030D-6E8A-4147-A177-3AD203B41FA5}">
-                      <a16:colId xmlns:a16="http://schemas.microsoft.com/office/drawing/2014/main" xmlns="" val="2290721960"/>
+                      <a16:colId xmlns="" xmlns:a16="http://schemas.microsoft.com/office/drawing/2014/main" val="2290721960"/>
                     </a:ext>
                   </a:extLst>
                 </a:gridCol>
                 <a:gridCol w="5035877">
                   <a:extLst>
                     <a:ext uri="{9D8B030D-6E8A-4147-A177-3AD203B41FA5}">
-                      <a16:colId xmlns:a16="http://schemas.microsoft.com/office/drawing/2014/main" xmlns="" val="3290447473"/>
+                      <a16:colId xmlns="" xmlns:a16="http://schemas.microsoft.com/office/drawing/2014/main" val="3290447473"/>
                     </a:ext>
                   </a:extLst>
                 </a:gridCol>
@@ -3811,7 +3815,7 @@
                 </a:tc>
                 <a:extLst>
                   <a:ext uri="{0D108BD9-81ED-4DB2-BD59-A6C34878D82A}">
-                    <a16:rowId xmlns:a16="http://schemas.microsoft.com/office/drawing/2014/main" xmlns="" val="1666283748"/>
+                    <a16:rowId xmlns="" xmlns:a16="http://schemas.microsoft.com/office/drawing/2014/main" val="1666283748"/>
                   </a:ext>
                 </a:extLst>
               </a:tr>
@@ -3866,7 +3870,7 @@
                 </a:tc>
                 <a:extLst>
                   <a:ext uri="{0D108BD9-81ED-4DB2-BD59-A6C34878D82A}">
-                    <a16:rowId xmlns:a16="http://schemas.microsoft.com/office/drawing/2014/main" xmlns="" val="219365017"/>
+                    <a16:rowId xmlns="" xmlns:a16="http://schemas.microsoft.com/office/drawing/2014/main" val="219365017"/>
                   </a:ext>
                 </a:extLst>
               </a:tr>
@@ -3899,7 +3903,7 @@
                 </a:tc>
                 <a:extLst>
                   <a:ext uri="{0D108BD9-81ED-4DB2-BD59-A6C34878D82A}">
-                    <a16:rowId xmlns:a16="http://schemas.microsoft.com/office/drawing/2014/main" xmlns="" val="3352012886"/>
+                    <a16:rowId xmlns="" xmlns:a16="http://schemas.microsoft.com/office/drawing/2014/main" val="3352012886"/>
                   </a:ext>
                 </a:extLst>
               </a:tr>
@@ -3932,7 +3936,7 @@
                 </a:tc>
                 <a:extLst>
                   <a:ext uri="{0D108BD9-81ED-4DB2-BD59-A6C34878D82A}">
-                    <a16:rowId xmlns:a16="http://schemas.microsoft.com/office/drawing/2014/main" xmlns="" val="4269047107"/>
+                    <a16:rowId xmlns="" xmlns:a16="http://schemas.microsoft.com/office/drawing/2014/main" val="4269047107"/>
                   </a:ext>
                 </a:extLst>
               </a:tr>
@@ -3998,7 +4002,7 @@
                 </a:tc>
                 <a:extLst>
                   <a:ext uri="{0D108BD9-81ED-4DB2-BD59-A6C34878D82A}">
-                    <a16:rowId xmlns:a16="http://schemas.microsoft.com/office/drawing/2014/main" xmlns="" val="3586547574"/>
+                    <a16:rowId xmlns="" xmlns:a16="http://schemas.microsoft.com/office/drawing/2014/main" val="3586547574"/>
                   </a:ext>
                 </a:extLst>
               </a:tr>
@@ -4052,7 +4056,7 @@
                 </a:tc>
                 <a:extLst>
                   <a:ext uri="{0D108BD9-81ED-4DB2-BD59-A6C34878D82A}">
-                    <a16:rowId xmlns:a16="http://schemas.microsoft.com/office/drawing/2014/main" xmlns="" val="3478169864"/>
+                    <a16:rowId xmlns="" xmlns:a16="http://schemas.microsoft.com/office/drawing/2014/main" val="3478169864"/>
                   </a:ext>
                 </a:extLst>
               </a:tr>
@@ -4068,8 +4072,8 @@
         </p:nvSpPr>
         <p:spPr>
           <a:xfrm>
-            <a:off x="3144898" y="5343182"/>
-            <a:ext cx="5916058" cy="461665"/>
+            <a:off x="0" y="5387250"/>
+            <a:ext cx="12192000" cy="461665"/>
           </a:xfrm>
           <a:prstGeom prst="rect">
             <a:avLst/>
@@ -4117,7 +4121,35 @@
             </a:r>
             <a:r>
               <a:rPr lang="de-DE" sz="2400" dirty="0" err="1" smtClean="0"/>
+              <a:t>scientific</a:t>
+            </a:r>
+            <a:r>
+              <a:rPr lang="de-DE" sz="2400" dirty="0" smtClean="0"/>
+              <a:t> </a:t>
+            </a:r>
+            <a:r>
+              <a:rPr lang="de-DE" sz="2400" dirty="0" err="1" smtClean="0"/>
               <a:t>library</a:t>
+            </a:r>
+            <a:r>
+              <a:rPr lang="de-DE" sz="2400" dirty="0" smtClean="0"/>
+              <a:t> (</a:t>
+            </a:r>
+            <a:r>
+              <a:rPr lang="de-DE" sz="2400" dirty="0" err="1" smtClean="0"/>
+              <a:t>rooms</a:t>
+            </a:r>
+            <a:r>
+              <a:rPr lang="de-DE" sz="2400" dirty="0" smtClean="0"/>
+              <a:t> on 2nd </a:t>
+            </a:r>
+            <a:r>
+              <a:rPr lang="de-DE" sz="2400" dirty="0" err="1" smtClean="0"/>
+              <a:t>floor</a:t>
+            </a:r>
+            <a:r>
+              <a:rPr lang="de-DE" sz="2400" dirty="0" smtClean="0"/>
+              <a:t>)</a:t>
             </a:r>
             <a:endParaRPr lang="de-DE" sz="2400" dirty="0"/>
           </a:p>
@@ -5884,8 +5916,16 @@
               <a:t>: </a:t>
             </a:r>
             <a:r>
+              <a:rPr lang="de-DE" sz="2800" b="1" dirty="0" smtClean="0"/>
+              <a:t>!</a:t>
+            </a:r>
+            <a:r>
+              <a:rPr lang="de-DE" sz="2800" b="1" dirty="0" smtClean="0"/>
+              <a:t>SpringCampus2018</a:t>
+            </a:r>
+            <a:r>
               <a:rPr lang="de-DE" sz="2800" b="1" dirty="0"/>
-              <a:t>5pr1ngC4mpu52018!</a:t>
+              <a:t>!</a:t>
             </a:r>
           </a:p>
           <a:p>

</xml_diff>

<commit_message>
Update presentation and changed package slides only in starter project and not in the web app
</commit_message>
<xml_diff>
--- a/presentation/gridwars-intro-2018.pptx
+++ b/presentation/gridwars-intro-2018.pptx
@@ -3740,7 +3740,7 @@
           <p:cNvPr id="4" name="Inhaltsplatzhalter 3">
             <a:extLst>
               <a:ext uri="{FF2B5EF4-FFF2-40B4-BE49-F238E27FC236}">
-                <a16:creationId xmlns="" xmlns:a16="http://schemas.microsoft.com/office/drawing/2014/main" id="{254ECB4F-16DC-4E09-BE63-ACD0AC3EE298}"/>
+                <a16:creationId xmlns:a16="http://schemas.microsoft.com/office/drawing/2014/main" xmlns="" id="{254ECB4F-16DC-4E09-BE63-ACD0AC3EE298}"/>
               </a:ext>
             </a:extLst>
           </p:cNvPr>
@@ -3751,7 +3751,7 @@
             <p:ph idx="1"/>
             <p:extLst>
               <p:ext uri="{D42A27DB-BD31-4B8C-83A1-F6EECF244321}">
-                <p14:modId xmlns:p14="http://schemas.microsoft.com/office/powerpoint/2010/main" val="593862664"/>
+                <p14:modId xmlns:p14="http://schemas.microsoft.com/office/powerpoint/2010/main" val="4123637117"/>
               </p:ext>
             </p:extLst>
           </p:nvPr>
@@ -3770,14 +3770,14 @@
                 <a:gridCol w="5035877">
                   <a:extLst>
                     <a:ext uri="{9D8B030D-6E8A-4147-A177-3AD203B41FA5}">
-                      <a16:colId xmlns="" xmlns:a16="http://schemas.microsoft.com/office/drawing/2014/main" val="2290721960"/>
+                      <a16:colId xmlns:a16="http://schemas.microsoft.com/office/drawing/2014/main" xmlns="" val="2290721960"/>
                     </a:ext>
                   </a:extLst>
                 </a:gridCol>
                 <a:gridCol w="5035877">
                   <a:extLst>
                     <a:ext uri="{9D8B030D-6E8A-4147-A177-3AD203B41FA5}">
-                      <a16:colId xmlns="" xmlns:a16="http://schemas.microsoft.com/office/drawing/2014/main" val="3290447473"/>
+                      <a16:colId xmlns:a16="http://schemas.microsoft.com/office/drawing/2014/main" xmlns="" val="3290447473"/>
                     </a:ext>
                   </a:extLst>
                 </a:gridCol>
@@ -3815,7 +3815,7 @@
                 </a:tc>
                 <a:extLst>
                   <a:ext uri="{0D108BD9-81ED-4DB2-BD59-A6C34878D82A}">
-                    <a16:rowId xmlns="" xmlns:a16="http://schemas.microsoft.com/office/drawing/2014/main" val="1666283748"/>
+                    <a16:rowId xmlns:a16="http://schemas.microsoft.com/office/drawing/2014/main" xmlns="" val="1666283748"/>
                   </a:ext>
                 </a:extLst>
               </a:tr>
@@ -3870,7 +3870,7 @@
                 </a:tc>
                 <a:extLst>
                   <a:ext uri="{0D108BD9-81ED-4DB2-BD59-A6C34878D82A}">
-                    <a16:rowId xmlns="" xmlns:a16="http://schemas.microsoft.com/office/drawing/2014/main" val="219365017"/>
+                    <a16:rowId xmlns:a16="http://schemas.microsoft.com/office/drawing/2014/main" xmlns="" val="219365017"/>
                   </a:ext>
                 </a:extLst>
               </a:tr>
@@ -3882,8 +3882,21 @@
                     <a:p>
                       <a:r>
                         <a:rPr lang="de-DE" sz="2800" dirty="0"/>
-                        <a:t>Tuesday, 18h45 – 19h45</a:t>
+                        <a:t>Tuesday, </a:t>
                       </a:r>
+                      <a:r>
+                        <a:rPr lang="de-DE" sz="2800" dirty="0" smtClean="0"/>
+                        <a:t>17h45 </a:t>
+                      </a:r>
+                      <a:r>
+                        <a:rPr lang="de-DE" sz="2800"/>
+                        <a:t>– </a:t>
+                      </a:r>
+                      <a:r>
+                        <a:rPr lang="de-DE" sz="2800" smtClean="0"/>
+                        <a:t>18h45</a:t>
+                      </a:r>
+                      <a:endParaRPr lang="de-DE" sz="2800" dirty="0"/>
                     </a:p>
                   </a:txBody>
                   <a:tcPr/>
@@ -3903,7 +3916,7 @@
                 </a:tc>
                 <a:extLst>
                   <a:ext uri="{0D108BD9-81ED-4DB2-BD59-A6C34878D82A}">
-                    <a16:rowId xmlns="" xmlns:a16="http://schemas.microsoft.com/office/drawing/2014/main" val="3352012886"/>
+                    <a16:rowId xmlns:a16="http://schemas.microsoft.com/office/drawing/2014/main" xmlns="" val="3352012886"/>
                   </a:ext>
                 </a:extLst>
               </a:tr>
@@ -3915,8 +3928,21 @@
                     <a:p>
                       <a:r>
                         <a:rPr lang="de-DE" sz="2800" dirty="0"/>
-                        <a:t>Wednesday, 18h45 – 19h45</a:t>
+                        <a:t>Wednesday, </a:t>
                       </a:r>
+                      <a:r>
+                        <a:rPr lang="de-DE" sz="2800" dirty="0" smtClean="0"/>
+                        <a:t>17h45 </a:t>
+                      </a:r>
+                      <a:r>
+                        <a:rPr lang="de-DE" sz="2800" dirty="0"/>
+                        <a:t>– </a:t>
+                      </a:r>
+                      <a:r>
+                        <a:rPr lang="de-DE" sz="2800" dirty="0" smtClean="0"/>
+                        <a:t>18h45</a:t>
+                      </a:r>
+                      <a:endParaRPr lang="de-DE" sz="2800" dirty="0"/>
                     </a:p>
                   </a:txBody>
                   <a:tcPr/>
@@ -3936,7 +3962,7 @@
                 </a:tc>
                 <a:extLst>
                   <a:ext uri="{0D108BD9-81ED-4DB2-BD59-A6C34878D82A}">
-                    <a16:rowId xmlns="" xmlns:a16="http://schemas.microsoft.com/office/drawing/2014/main" val="4269047107"/>
+                    <a16:rowId xmlns:a16="http://schemas.microsoft.com/office/drawing/2014/main" xmlns="" val="4269047107"/>
                   </a:ext>
                 </a:extLst>
               </a:tr>
@@ -4002,7 +4028,7 @@
                 </a:tc>
                 <a:extLst>
                   <a:ext uri="{0D108BD9-81ED-4DB2-BD59-A6C34878D82A}">
-                    <a16:rowId xmlns="" xmlns:a16="http://schemas.microsoft.com/office/drawing/2014/main" val="3586547574"/>
+                    <a16:rowId xmlns:a16="http://schemas.microsoft.com/office/drawing/2014/main" xmlns="" val="3586547574"/>
                   </a:ext>
                 </a:extLst>
               </a:tr>
@@ -4056,7 +4082,7 @@
                 </a:tc>
                 <a:extLst>
                   <a:ext uri="{0D108BD9-81ED-4DB2-BD59-A6C34878D82A}">
-                    <a16:rowId xmlns="" xmlns:a16="http://schemas.microsoft.com/office/drawing/2014/main" val="3478169864"/>
+                    <a16:rowId xmlns:a16="http://schemas.microsoft.com/office/drawing/2014/main" xmlns="" val="3478169864"/>
                   </a:ext>
                 </a:extLst>
               </a:tr>
@@ -4064,97 +4090,6 @@
           </a:graphicData>
         </a:graphic>
       </p:graphicFrame>
-      <p:sp>
-        <p:nvSpPr>
-          <p:cNvPr id="3" name="Textfeld 2"/>
-          <p:cNvSpPr txBox="1"/>
-          <p:nvPr/>
-        </p:nvSpPr>
-        <p:spPr>
-          <a:xfrm>
-            <a:off x="0" y="5387250"/>
-            <a:ext cx="12192000" cy="461665"/>
-          </a:xfrm>
-          <a:prstGeom prst="rect">
-            <a:avLst/>
-          </a:prstGeom>
-          <a:noFill/>
-        </p:spPr>
-        <p:txBody>
-          <a:bodyPr wrap="square" rtlCol="0">
-            <a:spAutoFit/>
-          </a:bodyPr>
-          <a:lstStyle/>
-          <a:p>
-            <a:pPr algn="ctr"/>
-            <a:r>
-              <a:rPr lang="de-DE" sz="2400" dirty="0" err="1" smtClean="0"/>
-              <a:t>Hackathons</a:t>
-            </a:r>
-            <a:r>
-              <a:rPr lang="de-DE" sz="2400" dirty="0" smtClean="0"/>
-              <a:t> will </a:t>
-            </a:r>
-            <a:r>
-              <a:rPr lang="de-DE" sz="2400" dirty="0" err="1" smtClean="0"/>
-              <a:t>take</a:t>
-            </a:r>
-            <a:r>
-              <a:rPr lang="de-DE" sz="2400" dirty="0" smtClean="0"/>
-              <a:t> </a:t>
-            </a:r>
-            <a:r>
-              <a:rPr lang="de-DE" sz="2400" dirty="0" err="1" smtClean="0"/>
-              <a:t>place</a:t>
-            </a:r>
-            <a:r>
-              <a:rPr lang="de-DE" sz="2400" dirty="0" smtClean="0"/>
-              <a:t> in </a:t>
-            </a:r>
-            <a:r>
-              <a:rPr lang="de-DE" sz="2400" dirty="0" err="1" smtClean="0"/>
-              <a:t>the</a:t>
-            </a:r>
-            <a:r>
-              <a:rPr lang="de-DE" sz="2400" dirty="0" smtClean="0"/>
-              <a:t> </a:t>
-            </a:r>
-            <a:r>
-              <a:rPr lang="de-DE" sz="2400" dirty="0" err="1" smtClean="0"/>
-              <a:t>scientific</a:t>
-            </a:r>
-            <a:r>
-              <a:rPr lang="de-DE" sz="2400" dirty="0" smtClean="0"/>
-              <a:t> </a:t>
-            </a:r>
-            <a:r>
-              <a:rPr lang="de-DE" sz="2400" dirty="0" err="1" smtClean="0"/>
-              <a:t>library</a:t>
-            </a:r>
-            <a:r>
-              <a:rPr lang="de-DE" sz="2400" dirty="0" smtClean="0"/>
-              <a:t> (</a:t>
-            </a:r>
-            <a:r>
-              <a:rPr lang="de-DE" sz="2400" dirty="0" err="1" smtClean="0"/>
-              <a:t>rooms</a:t>
-            </a:r>
-            <a:r>
-              <a:rPr lang="de-DE" sz="2400" dirty="0" smtClean="0"/>
-              <a:t> on 2nd </a:t>
-            </a:r>
-            <a:r>
-              <a:rPr lang="de-DE" sz="2400" dirty="0" err="1" smtClean="0"/>
-              <a:t>floor</a:t>
-            </a:r>
-            <a:r>
-              <a:rPr lang="de-DE" sz="2400" dirty="0" smtClean="0"/>
-              <a:t>)</a:t>
-            </a:r>
-            <a:endParaRPr lang="de-DE" sz="2400" dirty="0"/>
-          </a:p>
-        </p:txBody>
-      </p:sp>
     </p:spTree>
     <p:extLst>
       <p:ext uri="{BB962C8B-B14F-4D97-AF65-F5344CB8AC3E}">
@@ -5917,11 +5852,7 @@
             </a:r>
             <a:r>
               <a:rPr lang="de-DE" sz="2800" b="1" dirty="0" smtClean="0"/>
-              <a:t>!</a:t>
-            </a:r>
-            <a:r>
-              <a:rPr lang="de-DE" sz="2800" b="1" dirty="0" smtClean="0"/>
-              <a:t>SpringCampus2018</a:t>
+              <a:t>!SpringCampus2018</a:t>
             </a:r>
             <a:r>
               <a:rPr lang="de-DE" sz="2800" b="1" dirty="0"/>

</xml_diff>